<commit_message>
Exception handling presentation edited
</commit_message>
<xml_diff>
--- a/education/Exception_Handling_In_Core_Puhach_Ivan.pptx
+++ b/education/Exception_Handling_In_Core_Puhach_Ivan.pptx
@@ -7,10 +7,10 @@
     <p:sldMasterId id="2147483686" r:id="rId3"/>
   </p:sldMasterIdLst>
   <p:notesMasterIdLst>
-    <p:notesMasterId r:id="rId11"/>
+    <p:notesMasterId r:id="rId13"/>
   </p:notesMasterIdLst>
   <p:handoutMasterIdLst>
-    <p:handoutMasterId r:id="rId12"/>
+    <p:handoutMasterId r:id="rId14"/>
   </p:handoutMasterIdLst>
   <p:sldIdLst>
     <p:sldId id="287" r:id="rId4"/>
@@ -19,7 +19,9 @@
     <p:sldId id="281" r:id="rId7"/>
     <p:sldId id="282" r:id="rId8"/>
     <p:sldId id="270" r:id="rId9"/>
-    <p:sldId id="262" r:id="rId10"/>
+    <p:sldId id="288" r:id="rId10"/>
+    <p:sldId id="289" r:id="rId11"/>
+    <p:sldId id="262" r:id="rId12"/>
   </p:sldIdLst>
   <p:sldSz cx="9144000" cy="6858000" type="screen4x3"/>
   <p:notesSz cx="6858000" cy="9144000"/>
@@ -704,6 +706,45 @@
           <a:bodyPr/>
           <a:lstStyle/>
           <a:p>
+            <a:r>
+              <a:rPr lang="en-US" dirty="0" smtClean="0"/>
+              <a:t>First of all, these are sites that we’re making, not console applications. Web has a lot of dependencies, and correlation between different languages as well(e.g. react on </a:t>
+            </a:r>
+            <a:r>
+              <a:rPr lang="en-US" dirty="0" err="1" smtClean="0"/>
+              <a:t>javascript</a:t>
+            </a:r>
+            <a:r>
+              <a:rPr lang="en-US" dirty="0" smtClean="0"/>
+              <a:t>).</a:t>
+            </a:r>
+          </a:p>
+          <a:p>
+            <a:r>
+              <a:rPr lang="en-US" dirty="0" smtClean="0"/>
+              <a:t>Second of all you never </a:t>
+            </a:r>
+            <a:r>
+              <a:rPr lang="en-US" dirty="0" err="1" smtClean="0"/>
+              <a:t>gonna</a:t>
+            </a:r>
+            <a:r>
+              <a:rPr lang="en-US" dirty="0" smtClean="0"/>
+              <a:t> be fully safe with all of your error handlers, cause there are a lot of unmanaged exceptions waiting for you around the corners</a:t>
+            </a:r>
+          </a:p>
+          <a:p>
+            <a:r>
+              <a:rPr lang="en-US" dirty="0" err="1" smtClean="0"/>
+              <a:t>ASP.Net</a:t>
+            </a:r>
+            <a:r>
+              <a:rPr lang="en-US" dirty="0" smtClean="0"/>
+              <a:t> Core is fully modular system it has it’s advantages, so you can install a lot of error handling modules which we will discuss later on.</a:t>
+            </a:r>
+            <a:endParaRPr lang="uk-UA" dirty="0" smtClean="0"/>
+          </a:p>
+          <a:p>
             <a:endParaRPr lang="en-US" dirty="0"/>
           </a:p>
         </p:txBody>
@@ -735,6 +776,648 @@
     <p:extLst>
       <p:ext uri="{BB962C8B-B14F-4D97-AF65-F5344CB8AC3E}">
         <p14:creationId xmlns:p14="http://schemas.microsoft.com/office/powerpoint/2010/main" val="3753301473"/>
+      </p:ext>
+    </p:extLst>
+  </p:cSld>
+  <p:clrMapOvr>
+    <a:masterClrMapping/>
+  </p:clrMapOvr>
+</p:notes>
+</file>
+
+<file path=ppt/notesSlides/notesSlide2.xml><?xml version="1.0" encoding="utf-8"?>
+<p:notes xmlns:a="http://schemas.openxmlformats.org/drawingml/2006/main" xmlns:r="http://schemas.openxmlformats.org/officeDocument/2006/relationships" xmlns:p="http://schemas.openxmlformats.org/presentationml/2006/main">
+  <p:cSld>
+    <p:spTree>
+      <p:nvGrpSpPr>
+        <p:cNvPr id="1" name=""/>
+        <p:cNvGrpSpPr/>
+        <p:nvPr/>
+      </p:nvGrpSpPr>
+      <p:grpSpPr>
+        <a:xfrm>
+          <a:off x="0" y="0"/>
+          <a:ext cx="0" cy="0"/>
+          <a:chOff x="0" y="0"/>
+          <a:chExt cx="0" cy="0"/>
+        </a:xfrm>
+      </p:grpSpPr>
+      <p:sp>
+        <p:nvSpPr>
+          <p:cNvPr id="2" name="Образ слайда 1"/>
+          <p:cNvSpPr>
+            <a:spLocks noGrp="1" noRot="1" noChangeAspect="1"/>
+          </p:cNvSpPr>
+          <p:nvPr>
+            <p:ph type="sldImg"/>
+          </p:nvPr>
+        </p:nvSpPr>
+        <p:spPr/>
+      </p:sp>
+      <p:sp>
+        <p:nvSpPr>
+          <p:cNvPr id="3" name="Заметки 2"/>
+          <p:cNvSpPr>
+            <a:spLocks noGrp="1"/>
+          </p:cNvSpPr>
+          <p:nvPr>
+            <p:ph type="body" idx="1"/>
+          </p:nvPr>
+        </p:nvSpPr>
+        <p:spPr/>
+        <p:txBody>
+          <a:bodyPr/>
+          <a:lstStyle/>
+          <a:p>
+            <a:pPr marL="0" marR="0" indent="0" algn="l" defTabSz="914400" rtl="0" eaLnBrk="1" fontAlgn="auto" latinLnBrk="0" hangingPunct="1">
+              <a:lnSpc>
+                <a:spcPct val="100000"/>
+              </a:lnSpc>
+              <a:spcBef>
+                <a:spcPts val="0"/>
+              </a:spcBef>
+              <a:spcAft>
+                <a:spcPts val="0"/>
+              </a:spcAft>
+              <a:buClrTx/>
+              <a:buSzTx/>
+              <a:buFontTx/>
+              <a:buNone/>
+              <a:tabLst/>
+              <a:defRPr/>
+            </a:pPr>
+            <a:r>
+              <a:rPr lang="en-US" dirty="0" smtClean="0"/>
+              <a:t>Are you surprised that you already got a error handler running? Don’t be so happy about it, it’s not all that </a:t>
+            </a:r>
+            <a:r>
+              <a:rPr lang="en-US" dirty="0" err="1" smtClean="0"/>
+              <a:t>kneet’n’shiny</a:t>
+            </a:r>
+            <a:r>
+              <a:rPr lang="en-US" dirty="0" smtClean="0"/>
+              <a:t>. Where were we, right, that’s where they are announced.</a:t>
+            </a:r>
+            <a:endParaRPr lang="uk-UA" dirty="0" smtClean="0"/>
+          </a:p>
+          <a:p>
+            <a:endParaRPr lang="en-US" dirty="0"/>
+          </a:p>
+        </p:txBody>
+      </p:sp>
+      <p:sp>
+        <p:nvSpPr>
+          <p:cNvPr id="4" name="Номер слайда 3"/>
+          <p:cNvSpPr>
+            <a:spLocks noGrp="1"/>
+          </p:cNvSpPr>
+          <p:nvPr>
+            <p:ph type="sldNum" sz="quarter" idx="10"/>
+          </p:nvPr>
+        </p:nvSpPr>
+        <p:spPr/>
+        <p:txBody>
+          <a:bodyPr/>
+          <a:lstStyle/>
+          <a:p>
+            <a:fld id="{26F4D375-ABE6-4939-A45D-A523BC6E81D7}" type="slidenum">
+              <a:rPr lang="en-US" smtClean="0"/>
+              <a:t>4</a:t>
+            </a:fld>
+            <a:endParaRPr lang="en-US"/>
+          </a:p>
+        </p:txBody>
+      </p:sp>
+    </p:spTree>
+    <p:extLst>
+      <p:ext uri="{BB962C8B-B14F-4D97-AF65-F5344CB8AC3E}">
+        <p14:creationId xmlns:p14="http://schemas.microsoft.com/office/powerpoint/2010/main" val="1876722055"/>
+      </p:ext>
+    </p:extLst>
+  </p:cSld>
+  <p:clrMapOvr>
+    <a:masterClrMapping/>
+  </p:clrMapOvr>
+</p:notes>
+</file>
+
+<file path=ppt/notesSlides/notesSlide3.xml><?xml version="1.0" encoding="utf-8"?>
+<p:notes xmlns:a="http://schemas.openxmlformats.org/drawingml/2006/main" xmlns:r="http://schemas.openxmlformats.org/officeDocument/2006/relationships" xmlns:p="http://schemas.openxmlformats.org/presentationml/2006/main">
+  <p:cSld>
+    <p:spTree>
+      <p:nvGrpSpPr>
+        <p:cNvPr id="1" name=""/>
+        <p:cNvGrpSpPr/>
+        <p:nvPr/>
+      </p:nvGrpSpPr>
+      <p:grpSpPr>
+        <a:xfrm>
+          <a:off x="0" y="0"/>
+          <a:ext cx="0" cy="0"/>
+          <a:chOff x="0" y="0"/>
+          <a:chExt cx="0" cy="0"/>
+        </a:xfrm>
+      </p:grpSpPr>
+      <p:sp>
+        <p:nvSpPr>
+          <p:cNvPr id="2" name="Образ слайда 1"/>
+          <p:cNvSpPr>
+            <a:spLocks noGrp="1" noRot="1" noChangeAspect="1"/>
+          </p:cNvSpPr>
+          <p:nvPr>
+            <p:ph type="sldImg"/>
+          </p:nvPr>
+        </p:nvSpPr>
+        <p:spPr/>
+      </p:sp>
+      <p:sp>
+        <p:nvSpPr>
+          <p:cNvPr id="3" name="Заметки 2"/>
+          <p:cNvSpPr>
+            <a:spLocks noGrp="1"/>
+          </p:cNvSpPr>
+          <p:nvPr>
+            <p:ph type="body" idx="1"/>
+          </p:nvPr>
+        </p:nvSpPr>
+        <p:spPr/>
+        <p:txBody>
+          <a:bodyPr/>
+          <a:lstStyle/>
+          <a:p>
+            <a:pPr marL="0" marR="0" indent="0" algn="l" defTabSz="914400" rtl="0" eaLnBrk="1" fontAlgn="auto" latinLnBrk="0" hangingPunct="1">
+              <a:lnSpc>
+                <a:spcPct val="100000"/>
+              </a:lnSpc>
+              <a:spcBef>
+                <a:spcPts val="0"/>
+              </a:spcBef>
+              <a:spcAft>
+                <a:spcPts val="0"/>
+              </a:spcAft>
+              <a:buClrTx/>
+              <a:buSzTx/>
+              <a:buFontTx/>
+              <a:buNone/>
+              <a:tabLst/>
+              <a:defRPr/>
+            </a:pPr>
+            <a:r>
+              <a:rPr lang="en-US" dirty="0" smtClean="0">
+                <a:solidFill>
+                  <a:srgbClr val="000000"/>
+                </a:solidFill>
+              </a:rPr>
+              <a:t>such as configuring exception filters and performing model validation.</a:t>
+            </a:r>
+          </a:p>
+          <a:p>
+            <a:endParaRPr lang="en-US" dirty="0" smtClean="0">
+              <a:solidFill>
+                <a:srgbClr val="000000"/>
+              </a:solidFill>
+            </a:endParaRPr>
+          </a:p>
+          <a:p>
+            <a:r>
+              <a:rPr lang="en-US" dirty="0" smtClean="0">
+                <a:solidFill>
+                  <a:srgbClr val="000000"/>
+                </a:solidFill>
+              </a:rPr>
+              <a:t>Exception filters you might use in some specific situations when you have different scenarios for different incoming data, it should occur mostly within MVC actions, because it has less flexibility rather than error handling middleware.</a:t>
+            </a:r>
+          </a:p>
+          <a:p>
+            <a:endParaRPr lang="en-US" dirty="0" smtClean="0">
+              <a:solidFill>
+                <a:srgbClr val="000000"/>
+              </a:solidFill>
+            </a:endParaRPr>
+          </a:p>
+          <a:p>
+            <a:r>
+              <a:rPr lang="en-US" dirty="0" smtClean="0">
+                <a:solidFill>
+                  <a:srgbClr val="000000"/>
+                </a:solidFill>
+              </a:rPr>
+              <a:t>Model validation occurs prior to each controller action being invoked, and it is the action method’s responsibility to inspect </a:t>
+            </a:r>
+            <a:r>
+              <a:rPr lang="en-US" dirty="0" err="1" smtClean="0">
+                <a:solidFill>
+                  <a:srgbClr val="000000"/>
+                </a:solidFill>
+              </a:rPr>
+              <a:t>ModelState.IsValid</a:t>
+            </a:r>
+            <a:r>
+              <a:rPr lang="en-US" dirty="0" smtClean="0">
+                <a:solidFill>
+                  <a:srgbClr val="000000"/>
+                </a:solidFill>
+              </a:rPr>
+              <a:t> and react appropriately. In many cases, the appropriate reaction is to return some kind of error response, ideally detailing the reason why model validation failed.</a:t>
+            </a:r>
+          </a:p>
+          <a:p>
+            <a:endParaRPr lang="en-US" dirty="0"/>
+          </a:p>
+        </p:txBody>
+      </p:sp>
+      <p:sp>
+        <p:nvSpPr>
+          <p:cNvPr id="4" name="Номер слайда 3"/>
+          <p:cNvSpPr>
+            <a:spLocks noGrp="1"/>
+          </p:cNvSpPr>
+          <p:nvPr>
+            <p:ph type="sldNum" sz="quarter" idx="10"/>
+          </p:nvPr>
+        </p:nvSpPr>
+        <p:spPr/>
+        <p:txBody>
+          <a:bodyPr/>
+          <a:lstStyle/>
+          <a:p>
+            <a:fld id="{26F4D375-ABE6-4939-A45D-A523BC6E81D7}" type="slidenum">
+              <a:rPr lang="en-US" smtClean="0"/>
+              <a:t>5</a:t>
+            </a:fld>
+            <a:endParaRPr lang="en-US"/>
+          </a:p>
+        </p:txBody>
+      </p:sp>
+    </p:spTree>
+    <p:extLst>
+      <p:ext uri="{BB962C8B-B14F-4D97-AF65-F5344CB8AC3E}">
+        <p14:creationId xmlns:p14="http://schemas.microsoft.com/office/powerpoint/2010/main" val="400917926"/>
+      </p:ext>
+    </p:extLst>
+  </p:cSld>
+  <p:clrMapOvr>
+    <a:masterClrMapping/>
+  </p:clrMapOvr>
+</p:notes>
+</file>
+
+<file path=ppt/notesSlides/notesSlide4.xml><?xml version="1.0" encoding="utf-8"?>
+<p:notes xmlns:a="http://schemas.openxmlformats.org/drawingml/2006/main" xmlns:r="http://schemas.openxmlformats.org/officeDocument/2006/relationships" xmlns:p="http://schemas.openxmlformats.org/presentationml/2006/main">
+  <p:cSld>
+    <p:spTree>
+      <p:nvGrpSpPr>
+        <p:cNvPr id="1" name=""/>
+        <p:cNvGrpSpPr/>
+        <p:nvPr/>
+      </p:nvGrpSpPr>
+      <p:grpSpPr>
+        <a:xfrm>
+          <a:off x="0" y="0"/>
+          <a:ext cx="0" cy="0"/>
+          <a:chOff x="0" y="0"/>
+          <a:chExt cx="0" cy="0"/>
+        </a:xfrm>
+      </p:grpSpPr>
+      <p:sp>
+        <p:nvSpPr>
+          <p:cNvPr id="2" name="Образ слайда 1"/>
+          <p:cNvSpPr>
+            <a:spLocks noGrp="1" noRot="1" noChangeAspect="1"/>
+          </p:cNvSpPr>
+          <p:nvPr>
+            <p:ph type="sldImg"/>
+          </p:nvPr>
+        </p:nvSpPr>
+        <p:spPr/>
+      </p:sp>
+      <p:sp>
+        <p:nvSpPr>
+          <p:cNvPr id="3" name="Заметки 2"/>
+          <p:cNvSpPr>
+            <a:spLocks noGrp="1"/>
+          </p:cNvSpPr>
+          <p:nvPr>
+            <p:ph type="body" idx="1"/>
+          </p:nvPr>
+        </p:nvSpPr>
+        <p:spPr/>
+        <p:txBody>
+          <a:bodyPr/>
+          <a:lstStyle/>
+          <a:p>
+            <a:r>
+              <a:rPr lang="en-US" dirty="0" smtClean="0"/>
+              <a:t>v</a:t>
+            </a:r>
+            <a:endParaRPr lang="en-US" dirty="0"/>
+          </a:p>
+        </p:txBody>
+      </p:sp>
+      <p:sp>
+        <p:nvSpPr>
+          <p:cNvPr id="4" name="Номер слайда 3"/>
+          <p:cNvSpPr>
+            <a:spLocks noGrp="1"/>
+          </p:cNvSpPr>
+          <p:nvPr>
+            <p:ph type="sldNum" sz="quarter" idx="10"/>
+          </p:nvPr>
+        </p:nvSpPr>
+        <p:spPr/>
+        <p:txBody>
+          <a:bodyPr/>
+          <a:lstStyle/>
+          <a:p>
+            <a:fld id="{26F4D375-ABE6-4939-A45D-A523BC6E81D7}" type="slidenum">
+              <a:rPr lang="en-US" smtClean="0"/>
+              <a:t>6</a:t>
+            </a:fld>
+            <a:endParaRPr lang="en-US"/>
+          </a:p>
+        </p:txBody>
+      </p:sp>
+    </p:spTree>
+    <p:extLst>
+      <p:ext uri="{BB962C8B-B14F-4D97-AF65-F5344CB8AC3E}">
+        <p14:creationId xmlns:p14="http://schemas.microsoft.com/office/powerpoint/2010/main" val="2850307519"/>
+      </p:ext>
+    </p:extLst>
+  </p:cSld>
+  <p:clrMapOvr>
+    <a:masterClrMapping/>
+  </p:clrMapOvr>
+</p:notes>
+</file>
+
+<file path=ppt/notesSlides/notesSlide5.xml><?xml version="1.0" encoding="utf-8"?>
+<p:notes xmlns:a="http://schemas.openxmlformats.org/drawingml/2006/main" xmlns:r="http://schemas.openxmlformats.org/officeDocument/2006/relationships" xmlns:p="http://schemas.openxmlformats.org/presentationml/2006/main">
+  <p:cSld>
+    <p:spTree>
+      <p:nvGrpSpPr>
+        <p:cNvPr id="1" name=""/>
+        <p:cNvGrpSpPr/>
+        <p:nvPr/>
+      </p:nvGrpSpPr>
+      <p:grpSpPr>
+        <a:xfrm>
+          <a:off x="0" y="0"/>
+          <a:ext cx="0" cy="0"/>
+          <a:chOff x="0" y="0"/>
+          <a:chExt cx="0" cy="0"/>
+        </a:xfrm>
+      </p:grpSpPr>
+      <p:sp>
+        <p:nvSpPr>
+          <p:cNvPr id="2" name="Образ слайда 1"/>
+          <p:cNvSpPr>
+            <a:spLocks noGrp="1" noRot="1" noChangeAspect="1"/>
+          </p:cNvSpPr>
+          <p:nvPr>
+            <p:ph type="sldImg"/>
+          </p:nvPr>
+        </p:nvSpPr>
+        <p:spPr/>
+      </p:sp>
+      <p:sp>
+        <p:nvSpPr>
+          <p:cNvPr id="3" name="Заметки 2"/>
+          <p:cNvSpPr>
+            <a:spLocks noGrp="1"/>
+          </p:cNvSpPr>
+          <p:nvPr>
+            <p:ph type="body" idx="1"/>
+          </p:nvPr>
+        </p:nvSpPr>
+        <p:spPr/>
+        <p:txBody>
+          <a:bodyPr/>
+          <a:lstStyle/>
+          <a:p>
+            <a:r>
+              <a:rPr lang="en-US" sz="1200" b="0" i="0" kern="1200" dirty="0" smtClean="0">
+                <a:solidFill>
+                  <a:schemeClr val="tx1"/>
+                </a:solidFill>
+                <a:effectLst/>
+                <a:latin typeface="+mn-lt"/>
+                <a:ea typeface="+mn-ea"/>
+                <a:cs typeface="+mn-cs"/>
+              </a:rPr>
+              <a:t>ELMAH (Error Logging Modules and Handlers) is an application-wide error logging facility that is completely pluggable. It can be dynamically added to a running </a:t>
+            </a:r>
+            <a:r>
+              <a:rPr lang="en-US" sz="1200" b="0" i="0" u="none" strike="noStrike" kern="1200" dirty="0" smtClean="0">
+                <a:solidFill>
+                  <a:schemeClr val="tx1"/>
+                </a:solidFill>
+                <a:effectLst/>
+                <a:latin typeface="+mn-lt"/>
+                <a:ea typeface="+mn-ea"/>
+                <a:cs typeface="+mn-cs"/>
+                <a:hlinkClick r:id="rId3"/>
+              </a:rPr>
+              <a:t>ASP.NET</a:t>
+            </a:r>
+            <a:r>
+              <a:rPr lang="en-US" sz="1200" b="0" i="0" kern="1200" dirty="0" smtClean="0">
+                <a:solidFill>
+                  <a:schemeClr val="tx1"/>
+                </a:solidFill>
+                <a:effectLst/>
+                <a:latin typeface="+mn-lt"/>
+                <a:ea typeface="+mn-ea"/>
+                <a:cs typeface="+mn-cs"/>
+              </a:rPr>
+              <a:t> web application, or even all ASP.NET web applications on a machine, without any need for re-compilation or re-deployment.</a:t>
+            </a:r>
+          </a:p>
+          <a:p>
+            <a:r>
+              <a:rPr lang="en-US" sz="1200" b="0" i="0" kern="1200" dirty="0" smtClean="0">
+                <a:solidFill>
+                  <a:schemeClr val="tx1"/>
+                </a:solidFill>
+                <a:effectLst/>
+                <a:latin typeface="+mn-lt"/>
+                <a:ea typeface="+mn-ea"/>
+                <a:cs typeface="+mn-cs"/>
+              </a:rPr>
+              <a:t>Once ELMAH has been dropped into a running web application and configured appropriately, you get the following facilities without changing a single line of your code:</a:t>
+            </a:r>
+          </a:p>
+          <a:p>
+            <a:r>
+              <a:rPr lang="en-US" sz="1200" b="0" i="0" kern="1200" dirty="0" smtClean="0">
+                <a:solidFill>
+                  <a:schemeClr val="tx1"/>
+                </a:solidFill>
+                <a:effectLst/>
+                <a:latin typeface="+mn-lt"/>
+                <a:ea typeface="+mn-ea"/>
+                <a:cs typeface="+mn-cs"/>
+              </a:rPr>
+              <a:t>-Logging of nearly all unhandled exceptions.</a:t>
+            </a:r>
+          </a:p>
+          <a:p>
+            <a:r>
+              <a:rPr lang="en-US" sz="1200" b="0" i="0" kern="1200" dirty="0" smtClean="0">
+                <a:solidFill>
+                  <a:schemeClr val="tx1"/>
+                </a:solidFill>
+                <a:effectLst/>
+                <a:latin typeface="+mn-lt"/>
+                <a:ea typeface="+mn-ea"/>
+                <a:cs typeface="+mn-cs"/>
+              </a:rPr>
+              <a:t>-A web page to remotely view the entire log of recoded exceptions.</a:t>
+            </a:r>
+          </a:p>
+          <a:p>
+            <a:r>
+              <a:rPr lang="en-US" sz="1200" b="0" i="0" kern="1200" dirty="0" smtClean="0">
+                <a:solidFill>
+                  <a:schemeClr val="tx1"/>
+                </a:solidFill>
+                <a:effectLst/>
+                <a:latin typeface="+mn-lt"/>
+                <a:ea typeface="+mn-ea"/>
+                <a:cs typeface="+mn-cs"/>
+              </a:rPr>
+              <a:t>-A web page to remotely view the full details of any one logged exception, including colored stack traces.</a:t>
+            </a:r>
+          </a:p>
+          <a:p>
+            <a:r>
+              <a:rPr lang="en-US" sz="1200" b="0" i="0" kern="1200" dirty="0" smtClean="0">
+                <a:solidFill>
+                  <a:schemeClr val="tx1"/>
+                </a:solidFill>
+                <a:effectLst/>
+                <a:latin typeface="+mn-lt"/>
+                <a:ea typeface="+mn-ea"/>
+                <a:cs typeface="+mn-cs"/>
+              </a:rPr>
+              <a:t>-An e-mail notification of each error at the time it occurs.</a:t>
+            </a:r>
+          </a:p>
+          <a:p>
+            <a:endParaRPr lang="en-US" dirty="0"/>
+          </a:p>
+        </p:txBody>
+      </p:sp>
+      <p:sp>
+        <p:nvSpPr>
+          <p:cNvPr id="4" name="Номер слайда 3"/>
+          <p:cNvSpPr>
+            <a:spLocks noGrp="1"/>
+          </p:cNvSpPr>
+          <p:nvPr>
+            <p:ph type="sldNum" sz="quarter" idx="10"/>
+          </p:nvPr>
+        </p:nvSpPr>
+        <p:spPr/>
+        <p:txBody>
+          <a:bodyPr/>
+          <a:lstStyle/>
+          <a:p>
+            <a:fld id="{26F4D375-ABE6-4939-A45D-A523BC6E81D7}" type="slidenum">
+              <a:rPr lang="en-US" smtClean="0"/>
+              <a:t>7</a:t>
+            </a:fld>
+            <a:endParaRPr lang="en-US"/>
+          </a:p>
+        </p:txBody>
+      </p:sp>
+    </p:spTree>
+    <p:extLst>
+      <p:ext uri="{BB962C8B-B14F-4D97-AF65-F5344CB8AC3E}">
+        <p14:creationId xmlns:p14="http://schemas.microsoft.com/office/powerpoint/2010/main" val="1860067769"/>
+      </p:ext>
+    </p:extLst>
+  </p:cSld>
+  <p:clrMapOvr>
+    <a:masterClrMapping/>
+  </p:clrMapOvr>
+</p:notes>
+</file>
+
+<file path=ppt/notesSlides/notesSlide6.xml><?xml version="1.0" encoding="utf-8"?>
+<p:notes xmlns:a="http://schemas.openxmlformats.org/drawingml/2006/main" xmlns:r="http://schemas.openxmlformats.org/officeDocument/2006/relationships" xmlns:p="http://schemas.openxmlformats.org/presentationml/2006/main">
+  <p:cSld>
+    <p:spTree>
+      <p:nvGrpSpPr>
+        <p:cNvPr id="1" name=""/>
+        <p:cNvGrpSpPr/>
+        <p:nvPr/>
+      </p:nvGrpSpPr>
+      <p:grpSpPr>
+        <a:xfrm>
+          <a:off x="0" y="0"/>
+          <a:ext cx="0" cy="0"/>
+          <a:chOff x="0" y="0"/>
+          <a:chExt cx="0" cy="0"/>
+        </a:xfrm>
+      </p:grpSpPr>
+      <p:sp>
+        <p:nvSpPr>
+          <p:cNvPr id="2" name="Образ слайда 1"/>
+          <p:cNvSpPr>
+            <a:spLocks noGrp="1" noRot="1" noChangeAspect="1"/>
+          </p:cNvSpPr>
+          <p:nvPr>
+            <p:ph type="sldImg"/>
+          </p:nvPr>
+        </p:nvSpPr>
+        <p:spPr/>
+      </p:sp>
+      <p:sp>
+        <p:nvSpPr>
+          <p:cNvPr id="3" name="Заметки 2"/>
+          <p:cNvSpPr>
+            <a:spLocks noGrp="1"/>
+          </p:cNvSpPr>
+          <p:nvPr>
+            <p:ph type="body" idx="1"/>
+          </p:nvPr>
+        </p:nvSpPr>
+        <p:spPr/>
+        <p:txBody>
+          <a:bodyPr/>
+          <a:lstStyle/>
+          <a:p>
+            <a:endParaRPr lang="en-US" dirty="0"/>
+          </a:p>
+        </p:txBody>
+      </p:sp>
+      <p:sp>
+        <p:nvSpPr>
+          <p:cNvPr id="4" name="Номер слайда 3"/>
+          <p:cNvSpPr>
+            <a:spLocks noGrp="1"/>
+          </p:cNvSpPr>
+          <p:nvPr>
+            <p:ph type="sldNum" sz="quarter" idx="10"/>
+          </p:nvPr>
+        </p:nvSpPr>
+        <p:spPr/>
+        <p:txBody>
+          <a:bodyPr/>
+          <a:lstStyle/>
+          <a:p>
+            <a:fld id="{26F4D375-ABE6-4939-A45D-A523BC6E81D7}" type="slidenum">
+              <a:rPr lang="en-US" smtClean="0"/>
+              <a:t>8</a:t>
+            </a:fld>
+            <a:endParaRPr lang="en-US"/>
+          </a:p>
+        </p:txBody>
+      </p:sp>
+    </p:spTree>
+    <p:extLst>
+      <p:ext uri="{BB962C8B-B14F-4D97-AF65-F5344CB8AC3E}">
+        <p14:creationId xmlns:p14="http://schemas.microsoft.com/office/powerpoint/2010/main" val="3123961256"/>
       </p:ext>
     </p:extLst>
   </p:cSld>
@@ -5133,47 +5816,48 @@
           <a:p>
             <a:r>
               <a:rPr lang="en-US" dirty="0" smtClean="0"/>
-              <a:t>At first glance you might think that there is no difference, in the end it’s all written in C#, right? Well yeah, but not quiet. </a:t>
-            </a:r>
-          </a:p>
-          <a:p>
+              <a:t>At first glance you might think that there is no difference, in the end it’s all written in C#, right? Well yeah, but not </a:t>
+            </a:r>
             <a:r>
               <a:rPr lang="en-US" dirty="0" smtClean="0"/>
-              <a:t>First of all, these are sites that we’re making, not console applications. Web has a lot of dependencies, and correlation between different languages as well(e.g. react on </a:t>
-            </a:r>
-            <a:r>
-              <a:rPr lang="en-US" dirty="0" err="1" smtClean="0"/>
-              <a:t>javascript</a:t>
+              <a:t>quit</a:t>
             </a:r>
             <a:r>
               <a:rPr lang="en-US" dirty="0" smtClean="0"/>
-              <a:t>).</a:t>
-            </a:r>
-          </a:p>
-          <a:p>
+              <a:t>e</a:t>
+            </a:r>
             <a:r>
               <a:rPr lang="en-US" dirty="0" smtClean="0"/>
-              <a:t>Second of all you never </a:t>
-            </a:r>
-            <a:r>
-              <a:rPr lang="en-US" dirty="0" err="1" smtClean="0"/>
-              <a:t>gonna</a:t>
-            </a:r>
+              <a:t>. </a:t>
+            </a:r>
+          </a:p>
+          <a:p>
+            <a:endParaRPr lang="en-US" dirty="0" smtClean="0"/>
+          </a:p>
+          <a:p>
             <a:r>
               <a:rPr lang="en-US" dirty="0" smtClean="0"/>
-              <a:t> be fully safe with all of your error handlers, cause there are a lot of unmanaged exceptions waiting for you around the corners</a:t>
-            </a:r>
-          </a:p>
-          <a:p>
-            <a:r>
-              <a:rPr lang="en-US" dirty="0" err="1" smtClean="0"/>
-              <a:t>ASP.Net</a:t>
-            </a:r>
+              <a:t>There are couple of differences:</a:t>
+            </a:r>
+          </a:p>
+          <a:p>
             <a:r>
               <a:rPr lang="en-US" dirty="0" smtClean="0"/>
-              <a:t> Core is fully modular system it has it’s advantages, so you can install a lot of error handling modules which we will discuss later on.</a:t>
-            </a:r>
-            <a:endParaRPr lang="uk-UA" dirty="0"/>
+              <a:t>- Web application;</a:t>
+            </a:r>
+          </a:p>
+          <a:p>
+            <a:r>
+              <a:rPr lang="en-US" dirty="0" smtClean="0"/>
+              <a:t>- Errors may occur not in your code;</a:t>
+            </a:r>
+          </a:p>
+          <a:p>
+            <a:r>
+              <a:rPr lang="en-US" dirty="0" smtClean="0"/>
+              <a:t>- Third-party modules</a:t>
+            </a:r>
+            <a:endParaRPr lang="en-US" dirty="0" smtClean="0"/>
           </a:p>
         </p:txBody>
       </p:sp>
@@ -5267,21 +5951,8 @@
           <a:p>
             <a:r>
               <a:rPr lang="en-US" dirty="0" smtClean="0"/>
-              <a:t>	</a:t>
-            </a:r>
-            <a:r>
-              <a:rPr lang="en-US" dirty="0" smtClean="0"/>
-              <a:t>     Standard</a:t>
-            </a:r>
-            <a:r>
-              <a:rPr lang="en-US" dirty="0" smtClean="0"/>
-              <a:t>	</a:t>
-            </a:r>
-            <a:r>
-              <a:rPr lang="en-US" dirty="0" smtClean="0"/>
-              <a:t>  	    and           The one we got</a:t>
-            </a:r>
-            <a:endParaRPr lang="en-US" dirty="0" smtClean="0"/>
+              <a:t>	     Standard	  	    and           The one we got</a:t>
+            </a:r>
           </a:p>
           <a:p>
             <a:pPr marL="342900" indent="-342900">
@@ -5510,7 +6181,7 @@
           <a:bodyPr/>
           <a:lstStyle/>
           <a:p>
-            <a:pPr marL="0" indent="0">
+            <a:pPr marL="0" indent="0" algn="ctr">
               <a:buClr>
                 <a:srgbClr val="171B65"/>
               </a:buClr>
@@ -5518,19 +6189,7 @@
             </a:pPr>
             <a:r>
               <a:rPr lang="en-US" dirty="0" smtClean="0"/>
-              <a:t>Are you surprised that you already got a error handler running? </a:t>
-            </a:r>
-            <a:r>
-              <a:rPr lang="en-US" dirty="0" smtClean="0"/>
-              <a:t>Don’t be so happy about it, it’s not all that </a:t>
-            </a:r>
-            <a:r>
-              <a:rPr lang="en-US" dirty="0" err="1" smtClean="0"/>
-              <a:t>kneet’n’shiny</a:t>
-            </a:r>
-            <a:r>
-              <a:rPr lang="en-US" dirty="0" smtClean="0"/>
-              <a:t>. Where were we, right, that’s where they are announced.</a:t>
+              <a:t>Where they are announced</a:t>
             </a:r>
             <a:endParaRPr lang="uk-UA" dirty="0"/>
           </a:p>
@@ -5568,7 +6227,7 @@
           <p:nvPr/>
         </p:nvPicPr>
         <p:blipFill>
-          <a:blip r:embed="rId2">
+          <a:blip r:embed="rId3">
             <a:extLst>
               <a:ext uri="{28A0092B-C50C-407E-A947-70E740481C1C}">
                 <a14:useLocalDpi xmlns:a14="http://schemas.microsoft.com/office/drawing/2010/main" val="0"/>
@@ -5581,8 +6240,8 @@
         </p:blipFill>
         <p:spPr>
           <a:xfrm>
-            <a:off x="815176" y="2527870"/>
-            <a:ext cx="7271960" cy="3853054"/>
+            <a:off x="272143" y="1871663"/>
+            <a:ext cx="8510435" cy="4509261"/>
           </a:xfrm>
           <a:prstGeom prst="rect">
             <a:avLst/>
@@ -5663,7 +6322,7 @@
         <p:spPr>
           <a:xfrm>
             <a:off x="272144" y="1469985"/>
-            <a:ext cx="8524615" cy="3139321"/>
+            <a:ext cx="8524615" cy="3046988"/>
           </a:xfrm>
           <a:prstGeom prst="rect">
             <a:avLst/>
@@ -5677,7 +6336,7 @@
           <a:lstStyle/>
           <a:p>
             <a:r>
-              <a:rPr lang="en-US" dirty="0" err="1" smtClean="0">
+              <a:rPr lang="en-US" sz="2400" dirty="0" err="1" smtClean="0">
                 <a:solidFill>
                   <a:srgbClr val="000000"/>
                 </a:solidFill>
@@ -5685,7 +6344,7 @@
               <a:t>ASP.Net</a:t>
             </a:r>
             <a:r>
-              <a:rPr lang="en-US" dirty="0" smtClean="0">
+              <a:rPr lang="en-US" sz="2400" dirty="0" smtClean="0">
                 <a:solidFill>
                   <a:srgbClr val="000000"/>
                 </a:solidFill>
@@ -5693,74 +6352,165 @@
               <a:t> MVC apps </a:t>
             </a:r>
             <a:r>
-              <a:rPr lang="en-US" dirty="0">
+              <a:rPr lang="en-US" sz="2400" dirty="0">
                 <a:solidFill>
                   <a:srgbClr val="000000"/>
                 </a:solidFill>
               </a:rPr>
-              <a:t>have some additional options for handling errors, such as configuring exception filters and performing model validation</a:t>
-            </a:r>
-            <a:r>
-              <a:rPr lang="en-US" dirty="0" smtClean="0">
+              <a:t>have some additional options for handling </a:t>
+            </a:r>
+            <a:r>
+              <a:rPr lang="en-US" sz="2400" dirty="0" smtClean="0">
                 <a:solidFill>
                   <a:srgbClr val="000000"/>
                 </a:solidFill>
               </a:rPr>
-              <a:t>.</a:t>
-            </a:r>
-          </a:p>
-          <a:p>
-            <a:endParaRPr lang="en-US" dirty="0">
+              <a:t>errors</a:t>
+            </a:r>
+            <a:r>
+              <a:rPr lang="en-US" sz="2400" dirty="0" smtClean="0">
+                <a:solidFill>
+                  <a:srgbClr val="000000"/>
+                </a:solidFill>
+              </a:rPr>
+              <a:t>:</a:t>
+            </a:r>
+          </a:p>
+          <a:p>
+            <a:pPr marL="342900" indent="-342900">
+              <a:buFontTx/>
+              <a:buChar char="-"/>
+            </a:pPr>
+            <a:r>
+              <a:rPr lang="en-US" sz="2400" dirty="0" smtClean="0">
+                <a:solidFill>
+                  <a:srgbClr val="000000"/>
+                </a:solidFill>
+              </a:rPr>
+              <a:t>Exception filters;</a:t>
+            </a:r>
+          </a:p>
+          <a:p>
+            <a:pPr marL="342900" indent="-342900">
+              <a:buFontTx/>
+              <a:buChar char="-"/>
+            </a:pPr>
+            <a:endParaRPr lang="en-US" sz="2400" dirty="0">
               <a:solidFill>
                 <a:srgbClr val="000000"/>
               </a:solidFill>
             </a:endParaRPr>
           </a:p>
           <a:p>
-            <a:r>
-              <a:rPr lang="en-US" dirty="0" smtClean="0">
+            <a:pPr marL="342900" indent="-342900">
+              <a:buFontTx/>
+              <a:buChar char="-"/>
+            </a:pPr>
+            <a:endParaRPr lang="en-US" sz="2400" dirty="0" smtClean="0">
+              <a:solidFill>
+                <a:srgbClr val="000000"/>
+              </a:solidFill>
+            </a:endParaRPr>
+          </a:p>
+          <a:p>
+            <a:pPr marL="342900" indent="-342900">
+              <a:buFontTx/>
+              <a:buChar char="-"/>
+            </a:pPr>
+            <a:endParaRPr lang="en-US" sz="2400" dirty="0">
+              <a:solidFill>
+                <a:srgbClr val="000000"/>
+              </a:solidFill>
+            </a:endParaRPr>
+          </a:p>
+          <a:p>
+            <a:pPr marL="342900" indent="-342900">
+              <a:buFontTx/>
+              <a:buChar char="-"/>
+            </a:pPr>
+            <a:endParaRPr lang="en-US" sz="2400" dirty="0" smtClean="0">
+              <a:solidFill>
+                <a:srgbClr val="000000"/>
+              </a:solidFill>
+            </a:endParaRPr>
+          </a:p>
+          <a:p>
+            <a:r>
+              <a:rPr lang="en-US" sz="2400" dirty="0" smtClean="0">
                 <a:solidFill>
                   <a:srgbClr val="000000"/>
                 </a:solidFill>
               </a:rPr>
-              <a:t>Exception filters you might use in some specific situations when you have different scenarios for different incoming data, it should occur mostly within MVC actions, because it has less flexibility rather than error handling middleware.</a:t>
-            </a:r>
-          </a:p>
-          <a:p>
-            <a:endParaRPr lang="en-US" dirty="0">
+              <a:t>- Model validation;</a:t>
+            </a:r>
+            <a:endParaRPr lang="en-US" sz="2400" dirty="0">
               <a:solidFill>
                 <a:srgbClr val="000000"/>
               </a:solidFill>
             </a:endParaRPr>
           </a:p>
-          <a:p>
-            <a:r>
-              <a:rPr lang="en-US" dirty="0">
-                <a:solidFill>
-                  <a:srgbClr val="000000"/>
-                </a:solidFill>
-              </a:rPr>
-              <a:t>Model validation occurs prior to each controller action being invoked, and it is the action method’s responsibility to inspect </a:t>
-            </a:r>
-            <a:r>
-              <a:rPr lang="en-US" dirty="0" err="1">
-                <a:solidFill>
-                  <a:srgbClr val="000000"/>
-                </a:solidFill>
-              </a:rPr>
-              <a:t>ModelState.IsValid</a:t>
-            </a:r>
-            <a:r>
-              <a:rPr lang="en-US" dirty="0">
-                <a:solidFill>
-                  <a:srgbClr val="000000"/>
-                </a:solidFill>
-              </a:rPr>
-              <a:t> and react appropriately. In many cases, the appropriate reaction is to return some kind of error response, ideally detailing the reason why model validation failed.</a:t>
-            </a:r>
-          </a:p>
         </p:txBody>
       </p:sp>
+      <p:pic>
+        <p:nvPicPr>
+          <p:cNvPr id="3" name="Рисунок 2"/>
+          <p:cNvPicPr>
+            <a:picLocks noChangeAspect="1"/>
+          </p:cNvPicPr>
+          <p:nvPr/>
+        </p:nvPicPr>
+        <p:blipFill>
+          <a:blip r:embed="rId3">
+            <a:extLst>
+              <a:ext uri="{28A0092B-C50C-407E-A947-70E740481C1C}">
+                <a14:useLocalDpi xmlns:a14="http://schemas.microsoft.com/office/drawing/2010/main" val="0"/>
+              </a:ext>
+            </a:extLst>
+          </a:blip>
+          <a:stretch>
+            <a:fillRect/>
+          </a:stretch>
+        </p:blipFill>
+        <p:spPr>
+          <a:xfrm>
+            <a:off x="3077553" y="2212023"/>
+            <a:ext cx="5704918" cy="1519575"/>
+          </a:xfrm>
+          <a:prstGeom prst="rect">
+            <a:avLst/>
+          </a:prstGeom>
+        </p:spPr>
+      </p:pic>
+      <p:pic>
+        <p:nvPicPr>
+          <p:cNvPr id="5" name="Рисунок 4"/>
+          <p:cNvPicPr>
+            <a:picLocks noChangeAspect="1"/>
+          </p:cNvPicPr>
+          <p:nvPr/>
+        </p:nvPicPr>
+        <p:blipFill>
+          <a:blip r:embed="rId4">
+            <a:extLst>
+              <a:ext uri="{28A0092B-C50C-407E-A947-70E740481C1C}">
+                <a14:useLocalDpi xmlns:a14="http://schemas.microsoft.com/office/drawing/2010/main" val="0"/>
+              </a:ext>
+            </a:extLst>
+          </a:blip>
+          <a:stretch>
+            <a:fillRect/>
+          </a:stretch>
+        </p:blipFill>
+        <p:spPr>
+          <a:xfrm>
+            <a:off x="2852453" y="4061852"/>
+            <a:ext cx="5234272" cy="1581313"/>
+          </a:xfrm>
+          <a:prstGeom prst="rect">
+            <a:avLst/>
+          </a:prstGeom>
+        </p:spPr>
+      </p:pic>
     </p:spTree>
     <p:extLst>
       <p:ext uri="{BB962C8B-B14F-4D97-AF65-F5344CB8AC3E}">
@@ -5829,7 +6579,7 @@
                   <a:schemeClr val="tx2"/>
                 </a:solidFill>
               </a:rPr>
-              <a:t>What about some third-party modules</a:t>
+              <a:t>Third-party modules</a:t>
             </a:r>
             <a:endParaRPr lang="uk-UA" dirty="0">
               <a:solidFill>
@@ -5848,7 +6598,7 @@
         <p:spPr>
           <a:xfrm>
             <a:off x="292789" y="1362622"/>
-            <a:ext cx="8608143" cy="3046988"/>
+            <a:ext cx="8608143" cy="2554545"/>
           </a:xfrm>
           <a:prstGeom prst="rect">
             <a:avLst/>
@@ -5862,33 +6612,87 @@
           <a:lstStyle/>
           <a:p>
             <a:r>
-              <a:rPr lang="en-US" sz="2400" dirty="0" smtClean="0"/>
-              <a:t>Like ELMAH(H is silent) – heard of this one before? Bet you did, but what exactly does it do.</a:t>
-            </a:r>
-          </a:p>
-          <a:p>
-            <a:r>
-              <a:rPr lang="en-US" sz="2400" dirty="0" smtClean="0"/>
-              <a:t>ELMAH stands for </a:t>
-            </a:r>
-            <a:r>
-              <a:rPr lang="en-US" sz="2400" dirty="0"/>
-              <a:t>Error Logging Modules and </a:t>
-            </a:r>
-            <a:r>
-              <a:rPr lang="en-US" sz="2400" dirty="0" smtClean="0"/>
-              <a:t>Handlers, what does it mean. </a:t>
-            </a:r>
-          </a:p>
-          <a:p>
-            <a:r>
-              <a:rPr lang="en-US" sz="2400" dirty="0" smtClean="0"/>
-              <a:t>It means that this module collect all of error logs data, and shows it to you in organized structure so you will understand where error leaks are happening, and where you should add some error handlers</a:t>
-            </a:r>
-            <a:endParaRPr lang="en-US" sz="2400" dirty="0"/>
+              <a:rPr lang="en-US" sz="3200" dirty="0" smtClean="0"/>
+              <a:t>These are two most common logging modules on the market:</a:t>
+            </a:r>
+          </a:p>
+          <a:p>
+            <a:endParaRPr lang="en-US" sz="3200" dirty="0" smtClean="0"/>
+          </a:p>
+          <a:p>
+            <a:r>
+              <a:rPr lang="en-US" sz="3200" dirty="0" smtClean="0"/>
+              <a:t>- ELMAH</a:t>
+            </a:r>
+          </a:p>
+          <a:p>
+            <a:r>
+              <a:rPr lang="en-US" sz="3200" dirty="0" smtClean="0"/>
+              <a:t>- log4net</a:t>
+            </a:r>
+            <a:endParaRPr lang="en-US" sz="3200" dirty="0"/>
           </a:p>
         </p:txBody>
       </p:sp>
+      <p:pic>
+        <p:nvPicPr>
+          <p:cNvPr id="3" name="Рисунок 2"/>
+          <p:cNvPicPr>
+            <a:picLocks noChangeAspect="1"/>
+          </p:cNvPicPr>
+          <p:nvPr/>
+        </p:nvPicPr>
+        <p:blipFill rotWithShape="1">
+          <a:blip r:embed="rId3">
+            <a:extLst>
+              <a:ext uri="{28A0092B-C50C-407E-A947-70E740481C1C}">
+                <a14:useLocalDpi xmlns:a14="http://schemas.microsoft.com/office/drawing/2010/main" val="0"/>
+              </a:ext>
+            </a:extLst>
+          </a:blip>
+          <a:srcRect t="36006" b="30245"/>
+          <a:stretch/>
+        </p:blipFill>
+        <p:spPr>
+          <a:xfrm>
+            <a:off x="281214" y="5343524"/>
+            <a:ext cx="8382000" cy="1414463"/>
+          </a:xfrm>
+          <a:prstGeom prst="rect">
+            <a:avLst/>
+          </a:prstGeom>
+        </p:spPr>
+      </p:pic>
+      <p:pic>
+        <p:nvPicPr>
+          <p:cNvPr id="4" name="Рисунок 3"/>
+          <p:cNvPicPr>
+            <a:picLocks noChangeAspect="1"/>
+          </p:cNvPicPr>
+          <p:nvPr/>
+        </p:nvPicPr>
+        <p:blipFill>
+          <a:blip r:embed="rId4">
+            <a:extLst>
+              <a:ext uri="{28A0092B-C50C-407E-A947-70E740481C1C}">
+                <a14:useLocalDpi xmlns:a14="http://schemas.microsoft.com/office/drawing/2010/main" val="0"/>
+              </a:ext>
+            </a:extLst>
+          </a:blip>
+          <a:stretch>
+            <a:fillRect/>
+          </a:stretch>
+        </p:blipFill>
+        <p:spPr>
+          <a:xfrm>
+            <a:off x="4586288" y="1852612"/>
+            <a:ext cx="4105727" cy="3810000"/>
+          </a:xfrm>
+          <a:prstGeom prst="rect">
+            <a:avLst/>
+          </a:prstGeom>
+        </p:spPr>
+      </p:pic>
     </p:spTree>
     <p:extLst>
       <p:ext uri="{BB962C8B-B14F-4D97-AF65-F5344CB8AC3E}">
@@ -5928,6 +6732,267 @@
       </p:grpSpPr>
       <p:sp>
         <p:nvSpPr>
+          <p:cNvPr id="6" name="Заголовок 5"/>
+          <p:cNvSpPr>
+            <a:spLocks noGrp="1"/>
+          </p:cNvSpPr>
+          <p:nvPr>
+            <p:ph type="title"/>
+          </p:nvPr>
+        </p:nvSpPr>
+        <p:spPr>
+          <a:xfrm>
+            <a:off x="469786" y="295516"/>
+            <a:ext cx="8674214" cy="1018572"/>
+          </a:xfrm>
+        </p:spPr>
+        <p:txBody>
+          <a:bodyPr/>
+          <a:lstStyle/>
+          <a:p>
+            <a:r>
+              <a:rPr lang="en-US" dirty="0" smtClean="0"/>
+              <a:t>ELMAH</a:t>
+            </a:r>
+            <a:endParaRPr lang="uk-UA" dirty="0"/>
+          </a:p>
+        </p:txBody>
+      </p:sp>
+      <p:pic>
+        <p:nvPicPr>
+          <p:cNvPr id="4" name="Рисунок 3"/>
+          <p:cNvPicPr>
+            <a:picLocks noChangeAspect="1"/>
+          </p:cNvPicPr>
+          <p:nvPr/>
+        </p:nvPicPr>
+        <p:blipFill>
+          <a:blip r:embed="rId3">
+            <a:extLst>
+              <a:ext uri="{28A0092B-C50C-407E-A947-70E740481C1C}">
+                <a14:useLocalDpi xmlns:a14="http://schemas.microsoft.com/office/drawing/2010/main" val="0"/>
+              </a:ext>
+            </a:extLst>
+          </a:blip>
+          <a:stretch>
+            <a:fillRect/>
+          </a:stretch>
+        </p:blipFill>
+        <p:spPr>
+          <a:xfrm>
+            <a:off x="469786" y="1822131"/>
+            <a:ext cx="8345602" cy="4272573"/>
+          </a:xfrm>
+          <a:prstGeom prst="rect">
+            <a:avLst/>
+          </a:prstGeom>
+        </p:spPr>
+      </p:pic>
+      <p:sp>
+        <p:nvSpPr>
+          <p:cNvPr id="7" name="TextBox 6"/>
+          <p:cNvSpPr txBox="1"/>
+          <p:nvPr/>
+        </p:nvSpPr>
+        <p:spPr>
+          <a:xfrm>
+            <a:off x="0" y="1314088"/>
+            <a:ext cx="9281836" cy="369332"/>
+          </a:xfrm>
+          <a:prstGeom prst="rect">
+            <a:avLst/>
+          </a:prstGeom>
+          <a:noFill/>
+        </p:spPr>
+        <p:txBody>
+          <a:bodyPr wrap="none" rtlCol="0">
+            <a:spAutoFit/>
+          </a:bodyPr>
+          <a:lstStyle/>
+          <a:p>
+            <a:r>
+              <a:rPr lang="en-US" dirty="0" smtClean="0">
+                <a:solidFill>
+                  <a:srgbClr val="000000"/>
+                </a:solidFill>
+              </a:rPr>
+              <a:t>First on the market easy-to use web logging tool, fully pluggable, no extra code required </a:t>
+            </a:r>
+            <a:endParaRPr lang="en-US" dirty="0">
+              <a:solidFill>
+                <a:srgbClr val="000000"/>
+              </a:solidFill>
+            </a:endParaRPr>
+          </a:p>
+        </p:txBody>
+      </p:sp>
+    </p:spTree>
+    <p:extLst>
+      <p:ext uri="{BB962C8B-B14F-4D97-AF65-F5344CB8AC3E}">
+        <p14:creationId xmlns:p14="http://schemas.microsoft.com/office/powerpoint/2010/main" val="241801346"/>
+      </p:ext>
+    </p:extLst>
+  </p:cSld>
+  <p:clrMapOvr>
+    <a:masterClrMapping/>
+  </p:clrMapOvr>
+  <p:timing>
+    <p:tnLst>
+      <p:par>
+        <p:cTn id="1" dur="indefinite" restart="never" nodeType="tmRoot"/>
+      </p:par>
+    </p:tnLst>
+  </p:timing>
+</p:sld>
+</file>
+
+<file path=ppt/slides/slide8.xml><?xml version="1.0" encoding="utf-8"?>
+<p:sld xmlns:a="http://schemas.openxmlformats.org/drawingml/2006/main" xmlns:r="http://schemas.openxmlformats.org/officeDocument/2006/relationships" xmlns:p="http://schemas.openxmlformats.org/presentationml/2006/main">
+  <p:cSld>
+    <p:spTree>
+      <p:nvGrpSpPr>
+        <p:cNvPr id="1" name=""/>
+        <p:cNvGrpSpPr/>
+        <p:nvPr/>
+      </p:nvGrpSpPr>
+      <p:grpSpPr>
+        <a:xfrm>
+          <a:off x="0" y="0"/>
+          <a:ext cx="0" cy="0"/>
+          <a:chOff x="0" y="0"/>
+          <a:chExt cx="0" cy="0"/>
+        </a:xfrm>
+      </p:grpSpPr>
+      <p:sp>
+        <p:nvSpPr>
+          <p:cNvPr id="6" name="Заголовок 5"/>
+          <p:cNvSpPr>
+            <a:spLocks noGrp="1"/>
+          </p:cNvSpPr>
+          <p:nvPr>
+            <p:ph type="title"/>
+          </p:nvPr>
+        </p:nvSpPr>
+        <p:spPr>
+          <a:xfrm>
+            <a:off x="469786" y="295516"/>
+            <a:ext cx="8674214" cy="1018572"/>
+          </a:xfrm>
+        </p:spPr>
+        <p:txBody>
+          <a:bodyPr/>
+          <a:lstStyle/>
+          <a:p>
+            <a:r>
+              <a:rPr lang="en-US" dirty="0" smtClean="0"/>
+              <a:t>log4net</a:t>
+            </a:r>
+            <a:endParaRPr lang="uk-UA" dirty="0"/>
+          </a:p>
+        </p:txBody>
+      </p:sp>
+      <p:sp>
+        <p:nvSpPr>
+          <p:cNvPr id="7" name="TextBox 6"/>
+          <p:cNvSpPr txBox="1"/>
+          <p:nvPr/>
+        </p:nvSpPr>
+        <p:spPr>
+          <a:xfrm>
+            <a:off x="469786" y="1313726"/>
+            <a:ext cx="7968079" cy="369332"/>
+          </a:xfrm>
+          <a:prstGeom prst="rect">
+            <a:avLst/>
+          </a:prstGeom>
+          <a:noFill/>
+        </p:spPr>
+        <p:txBody>
+          <a:bodyPr wrap="none" rtlCol="0">
+            <a:spAutoFit/>
+          </a:bodyPr>
+          <a:lstStyle/>
+          <a:p>
+            <a:r>
+              <a:rPr lang="en-US" dirty="0" smtClean="0">
+                <a:solidFill>
+                  <a:srgbClr val="000000"/>
+                </a:solidFill>
+              </a:rPr>
+              <a:t>More general logging app, commonly used for logging desktop applications.</a:t>
+            </a:r>
+          </a:p>
+        </p:txBody>
+      </p:sp>
+      <p:pic>
+        <p:nvPicPr>
+          <p:cNvPr id="2" name="Рисунок 1"/>
+          <p:cNvPicPr>
+            <a:picLocks noChangeAspect="1"/>
+          </p:cNvPicPr>
+          <p:nvPr/>
+        </p:nvPicPr>
+        <p:blipFill>
+          <a:blip r:embed="rId3">
+            <a:extLst>
+              <a:ext uri="{28A0092B-C50C-407E-A947-70E740481C1C}">
+                <a14:useLocalDpi xmlns:a14="http://schemas.microsoft.com/office/drawing/2010/main" val="0"/>
+              </a:ext>
+            </a:extLst>
+          </a:blip>
+          <a:stretch>
+            <a:fillRect/>
+          </a:stretch>
+        </p:blipFill>
+        <p:spPr>
+          <a:xfrm>
+            <a:off x="1038262" y="1683058"/>
+            <a:ext cx="6977026" cy="4217274"/>
+          </a:xfrm>
+          <a:prstGeom prst="rect">
+            <a:avLst/>
+          </a:prstGeom>
+        </p:spPr>
+      </p:pic>
+    </p:spTree>
+    <p:extLst>
+      <p:ext uri="{BB962C8B-B14F-4D97-AF65-F5344CB8AC3E}">
+        <p14:creationId xmlns:p14="http://schemas.microsoft.com/office/powerpoint/2010/main" val="1438844777"/>
+      </p:ext>
+    </p:extLst>
+  </p:cSld>
+  <p:clrMapOvr>
+    <a:masterClrMapping/>
+  </p:clrMapOvr>
+  <p:timing>
+    <p:tnLst>
+      <p:par>
+        <p:cTn id="1" dur="indefinite" restart="never" nodeType="tmRoot"/>
+      </p:par>
+    </p:tnLst>
+  </p:timing>
+</p:sld>
+</file>
+
+<file path=ppt/slides/slide9.xml><?xml version="1.0" encoding="utf-8"?>
+<p:sld xmlns:a="http://schemas.openxmlformats.org/drawingml/2006/main" xmlns:r="http://schemas.openxmlformats.org/officeDocument/2006/relationships" xmlns:p="http://schemas.openxmlformats.org/presentationml/2006/main">
+  <p:cSld>
+    <p:spTree>
+      <p:nvGrpSpPr>
+        <p:cNvPr id="1" name=""/>
+        <p:cNvGrpSpPr/>
+        <p:nvPr/>
+      </p:nvGrpSpPr>
+      <p:grpSpPr>
+        <a:xfrm>
+          <a:off x="0" y="0"/>
+          <a:ext cx="0" cy="0"/>
+          <a:chOff x="0" y="0"/>
+          <a:chExt cx="0" cy="0"/>
+        </a:xfrm>
+      </p:grpSpPr>
+      <p:sp>
+        <p:nvSpPr>
           <p:cNvPr id="2" name="Заголовок 1"/>
           <p:cNvSpPr>
             <a:spLocks noGrp="1"/>
@@ -5943,7 +7008,15 @@
           <a:p>
             <a:r>
               <a:rPr lang="en-US" dirty="0" smtClean="0"/>
-              <a:t>That’s all folks!</a:t>
+              <a:t>That’s </a:t>
+            </a:r>
+            <a:r>
+              <a:rPr lang="en-US" dirty="0" smtClean="0"/>
+              <a:t>about it for now</a:t>
+            </a:r>
+            <a:r>
+              <a:rPr lang="en-US" dirty="0" smtClean="0"/>
+              <a:t>!</a:t>
             </a:r>
             <a:endParaRPr lang="uk-UA" dirty="0"/>
           </a:p>

</xml_diff>

<commit_message>
Some minor fixes to EH presentation
more about setting up elmah
</commit_message>
<xml_diff>
--- a/education/Exception_Handling_In_Core_Puhach_Ivan.pptx
+++ b/education/Exception_Handling_In_Core_Puhach_Ivan.pptx
@@ -7,10 +7,10 @@
     <p:sldMasterId id="2147483686" r:id="rId3"/>
   </p:sldMasterIdLst>
   <p:notesMasterIdLst>
-    <p:notesMasterId r:id="rId13"/>
+    <p:notesMasterId r:id="rId15"/>
   </p:notesMasterIdLst>
   <p:handoutMasterIdLst>
-    <p:handoutMasterId r:id="rId14"/>
+    <p:handoutMasterId r:id="rId16"/>
   </p:handoutMasterIdLst>
   <p:sldIdLst>
     <p:sldId id="287" r:id="rId4"/>
@@ -20,8 +20,10 @@
     <p:sldId id="282" r:id="rId8"/>
     <p:sldId id="270" r:id="rId9"/>
     <p:sldId id="288" r:id="rId10"/>
-    <p:sldId id="289" r:id="rId11"/>
-    <p:sldId id="262" r:id="rId12"/>
+    <p:sldId id="290" r:id="rId11"/>
+    <p:sldId id="291" r:id="rId12"/>
+    <p:sldId id="289" r:id="rId13"/>
+    <p:sldId id="262" r:id="rId14"/>
   </p:sldIdLst>
   <p:sldSz cx="9144000" cy="6858000" type="screen4x3"/>
   <p:notesSz cx="6858000" cy="9144000"/>
@@ -945,47 +947,21 @@
           <a:bodyPr/>
           <a:lstStyle/>
           <a:p>
-            <a:pPr marL="0" marR="0" indent="0" algn="l" defTabSz="914400" rtl="0" eaLnBrk="1" fontAlgn="auto" latinLnBrk="0" hangingPunct="1">
-              <a:lnSpc>
-                <a:spcPct val="100000"/>
-              </a:lnSpc>
-              <a:spcBef>
-                <a:spcPts val="0"/>
-              </a:spcBef>
-              <a:spcAft>
-                <a:spcPts val="0"/>
-              </a:spcAft>
-              <a:buClrTx/>
-              <a:buSzTx/>
-              <a:buFontTx/>
-              <a:buNone/>
-              <a:tabLst/>
-              <a:defRPr/>
-            </a:pPr>
             <a:r>
               <a:rPr lang="en-US" dirty="0" smtClean="0">
                 <a:solidFill>
                   <a:srgbClr val="000000"/>
                 </a:solidFill>
               </a:rPr>
-              <a:t>such as configuring exception filters and performing model validation.</a:t>
-            </a:r>
-          </a:p>
-          <a:p>
-            <a:endParaRPr lang="en-US" dirty="0" smtClean="0">
-              <a:solidFill>
-                <a:srgbClr val="000000"/>
-              </a:solidFill>
-            </a:endParaRPr>
-          </a:p>
-          <a:p>
+              <a:t>Exception </a:t>
+            </a:r>
             <a:r>
               <a:rPr lang="en-US" dirty="0" smtClean="0">
                 <a:solidFill>
                   <a:srgbClr val="000000"/>
                 </a:solidFill>
               </a:rPr>
-              <a:t>Exception filters you might use in some specific situations when you have different scenarios for different incoming data, it should occur mostly within MVC actions, because it has less flexibility rather than error handling middleware.</a:t>
+              <a:t>filters you might use in some specific situations when you have different scenarios for different incoming data, it should occur mostly within MVC actions, because it has less flexibility rather than error handling middleware.</a:t>
             </a:r>
           </a:p>
           <a:p>
@@ -1106,10 +1082,6 @@
           <a:bodyPr/>
           <a:lstStyle/>
           <a:p>
-            <a:r>
-              <a:rPr lang="en-US" dirty="0" smtClean="0"/>
-              <a:t>v</a:t>
-            </a:r>
             <a:endParaRPr lang="en-US" dirty="0"/>
           </a:p>
         </p:txBody>
@@ -1387,6 +1359,54 @@
           <a:bodyPr/>
           <a:lstStyle/>
           <a:p>
+            <a:r>
+              <a:rPr lang="en-US" sz="1200" b="0" i="0" kern="1200" dirty="0" smtClean="0">
+                <a:solidFill>
+                  <a:schemeClr val="tx1"/>
+                </a:solidFill>
+                <a:effectLst/>
+                <a:latin typeface="+mn-lt"/>
+                <a:ea typeface="+mn-ea"/>
+                <a:cs typeface="+mn-cs"/>
+              </a:rPr>
+              <a:t>Just install it</a:t>
+            </a:r>
+            <a:r>
+              <a:rPr lang="en-US" sz="1200" b="0" i="0" kern="1200" baseline="0" dirty="0" smtClean="0">
+                <a:solidFill>
+                  <a:schemeClr val="tx1"/>
+                </a:solidFill>
+                <a:effectLst/>
+                <a:latin typeface="+mn-lt"/>
+                <a:ea typeface="+mn-ea"/>
+                <a:cs typeface="+mn-cs"/>
+              </a:rPr>
+              <a:t> in </a:t>
+            </a:r>
+            <a:r>
+              <a:rPr lang="en-US" sz="1200" b="0" i="0" kern="1200" baseline="0" dirty="0" err="1" smtClean="0">
+                <a:solidFill>
+                  <a:schemeClr val="tx1"/>
+                </a:solidFill>
+                <a:effectLst/>
+                <a:latin typeface="+mn-lt"/>
+                <a:ea typeface="+mn-ea"/>
+                <a:cs typeface="+mn-cs"/>
+              </a:rPr>
+              <a:t>nuget</a:t>
+            </a:r>
+            <a:r>
+              <a:rPr lang="en-US" sz="1200" b="0" i="0" kern="1200" baseline="0" dirty="0" smtClean="0">
+                <a:solidFill>
+                  <a:schemeClr val="tx1"/>
+                </a:solidFill>
+                <a:effectLst/>
+                <a:latin typeface="+mn-lt"/>
+                <a:ea typeface="+mn-ea"/>
+                <a:cs typeface="+mn-cs"/>
+              </a:rPr>
+              <a:t> panel, and start using </a:t>
+            </a:r>
             <a:endParaRPr lang="en-US" dirty="0"/>
           </a:p>
         </p:txBody>
@@ -1409,6 +1429,178 @@
             <a:fld id="{26F4D375-ABE6-4939-A45D-A523BC6E81D7}" type="slidenum">
               <a:rPr lang="en-US" smtClean="0"/>
               <a:t>8</a:t>
+            </a:fld>
+            <a:endParaRPr lang="en-US"/>
+          </a:p>
+        </p:txBody>
+      </p:sp>
+    </p:spTree>
+    <p:extLst>
+      <p:ext uri="{BB962C8B-B14F-4D97-AF65-F5344CB8AC3E}">
+        <p14:creationId xmlns:p14="http://schemas.microsoft.com/office/powerpoint/2010/main" val="3369488744"/>
+      </p:ext>
+    </p:extLst>
+  </p:cSld>
+  <p:clrMapOvr>
+    <a:masterClrMapping/>
+  </p:clrMapOvr>
+</p:notes>
+</file>
+
+<file path=ppt/notesSlides/notesSlide7.xml><?xml version="1.0" encoding="utf-8"?>
+<p:notes xmlns:a="http://schemas.openxmlformats.org/drawingml/2006/main" xmlns:r="http://schemas.openxmlformats.org/officeDocument/2006/relationships" xmlns:p="http://schemas.openxmlformats.org/presentationml/2006/main">
+  <p:cSld>
+    <p:spTree>
+      <p:nvGrpSpPr>
+        <p:cNvPr id="1" name=""/>
+        <p:cNvGrpSpPr/>
+        <p:nvPr/>
+      </p:nvGrpSpPr>
+      <p:grpSpPr>
+        <a:xfrm>
+          <a:off x="0" y="0"/>
+          <a:ext cx="0" cy="0"/>
+          <a:chOff x="0" y="0"/>
+          <a:chExt cx="0" cy="0"/>
+        </a:xfrm>
+      </p:grpSpPr>
+      <p:sp>
+        <p:nvSpPr>
+          <p:cNvPr id="2" name="Образ слайда 1"/>
+          <p:cNvSpPr>
+            <a:spLocks noGrp="1" noRot="1" noChangeAspect="1"/>
+          </p:cNvSpPr>
+          <p:nvPr>
+            <p:ph type="sldImg"/>
+          </p:nvPr>
+        </p:nvSpPr>
+        <p:spPr/>
+      </p:sp>
+      <p:sp>
+        <p:nvSpPr>
+          <p:cNvPr id="3" name="Заметки 2"/>
+          <p:cNvSpPr>
+            <a:spLocks noGrp="1"/>
+          </p:cNvSpPr>
+          <p:nvPr>
+            <p:ph type="body" idx="1"/>
+          </p:nvPr>
+        </p:nvSpPr>
+        <p:spPr/>
+        <p:txBody>
+          <a:bodyPr/>
+          <a:lstStyle/>
+          <a:p>
+            <a:r>
+              <a:rPr lang="en-US" dirty="0" smtClean="0"/>
+              <a:t>Using additional modules for better statistical data coverage.</a:t>
+            </a:r>
+            <a:endParaRPr lang="en-US" dirty="0"/>
+          </a:p>
+        </p:txBody>
+      </p:sp>
+      <p:sp>
+        <p:nvSpPr>
+          <p:cNvPr id="4" name="Номер слайда 3"/>
+          <p:cNvSpPr>
+            <a:spLocks noGrp="1"/>
+          </p:cNvSpPr>
+          <p:nvPr>
+            <p:ph type="sldNum" sz="quarter" idx="10"/>
+          </p:nvPr>
+        </p:nvSpPr>
+        <p:spPr/>
+        <p:txBody>
+          <a:bodyPr/>
+          <a:lstStyle/>
+          <a:p>
+            <a:fld id="{26F4D375-ABE6-4939-A45D-A523BC6E81D7}" type="slidenum">
+              <a:rPr lang="en-US" smtClean="0"/>
+              <a:t>9</a:t>
+            </a:fld>
+            <a:endParaRPr lang="en-US"/>
+          </a:p>
+        </p:txBody>
+      </p:sp>
+    </p:spTree>
+    <p:extLst>
+      <p:ext uri="{BB962C8B-B14F-4D97-AF65-F5344CB8AC3E}">
+        <p14:creationId xmlns:p14="http://schemas.microsoft.com/office/powerpoint/2010/main" val="4010102870"/>
+      </p:ext>
+    </p:extLst>
+  </p:cSld>
+  <p:clrMapOvr>
+    <a:masterClrMapping/>
+  </p:clrMapOvr>
+</p:notes>
+</file>
+
+<file path=ppt/notesSlides/notesSlide8.xml><?xml version="1.0" encoding="utf-8"?>
+<p:notes xmlns:a="http://schemas.openxmlformats.org/drawingml/2006/main" xmlns:r="http://schemas.openxmlformats.org/officeDocument/2006/relationships" xmlns:p="http://schemas.openxmlformats.org/presentationml/2006/main">
+  <p:cSld>
+    <p:spTree>
+      <p:nvGrpSpPr>
+        <p:cNvPr id="1" name=""/>
+        <p:cNvGrpSpPr/>
+        <p:nvPr/>
+      </p:nvGrpSpPr>
+      <p:grpSpPr>
+        <a:xfrm>
+          <a:off x="0" y="0"/>
+          <a:ext cx="0" cy="0"/>
+          <a:chOff x="0" y="0"/>
+          <a:chExt cx="0" cy="0"/>
+        </a:xfrm>
+      </p:grpSpPr>
+      <p:sp>
+        <p:nvSpPr>
+          <p:cNvPr id="2" name="Образ слайда 1"/>
+          <p:cNvSpPr>
+            <a:spLocks noGrp="1" noRot="1" noChangeAspect="1"/>
+          </p:cNvSpPr>
+          <p:nvPr>
+            <p:ph type="sldImg"/>
+          </p:nvPr>
+        </p:nvSpPr>
+        <p:spPr/>
+      </p:sp>
+      <p:sp>
+        <p:nvSpPr>
+          <p:cNvPr id="3" name="Заметки 2"/>
+          <p:cNvSpPr>
+            <a:spLocks noGrp="1"/>
+          </p:cNvSpPr>
+          <p:nvPr>
+            <p:ph type="body" idx="1"/>
+          </p:nvPr>
+        </p:nvSpPr>
+        <p:spPr/>
+        <p:txBody>
+          <a:bodyPr/>
+          <a:lstStyle/>
+          <a:p>
+            <a:endParaRPr lang="en-US" dirty="0"/>
+          </a:p>
+        </p:txBody>
+      </p:sp>
+      <p:sp>
+        <p:nvSpPr>
+          <p:cNvPr id="4" name="Номер слайда 3"/>
+          <p:cNvSpPr>
+            <a:spLocks noGrp="1"/>
+          </p:cNvSpPr>
+          <p:nvPr>
+            <p:ph type="sldNum" sz="quarter" idx="10"/>
+          </p:nvPr>
+        </p:nvSpPr>
+        <p:spPr/>
+        <p:txBody>
+          <a:bodyPr/>
+          <a:lstStyle/>
+          <a:p>
+            <a:fld id="{26F4D375-ABE6-4939-A45D-A523BC6E81D7}" type="slidenum">
+              <a:rPr lang="en-US" smtClean="0"/>
+              <a:t>10</a:t>
             </a:fld>
             <a:endParaRPr lang="en-US"/>
           </a:p>
@@ -5777,6 +5969,194 @@
 </p:sld>
 </file>
 
+<file path=ppt/slides/slide10.xml><?xml version="1.0" encoding="utf-8"?>
+<p:sld xmlns:a="http://schemas.openxmlformats.org/drawingml/2006/main" xmlns:r="http://schemas.openxmlformats.org/officeDocument/2006/relationships" xmlns:p="http://schemas.openxmlformats.org/presentationml/2006/main">
+  <p:cSld>
+    <p:spTree>
+      <p:nvGrpSpPr>
+        <p:cNvPr id="1" name=""/>
+        <p:cNvGrpSpPr/>
+        <p:nvPr/>
+      </p:nvGrpSpPr>
+      <p:grpSpPr>
+        <a:xfrm>
+          <a:off x="0" y="0"/>
+          <a:ext cx="0" cy="0"/>
+          <a:chOff x="0" y="0"/>
+          <a:chExt cx="0" cy="0"/>
+        </a:xfrm>
+      </p:grpSpPr>
+      <p:sp>
+        <p:nvSpPr>
+          <p:cNvPr id="6" name="Заголовок 5"/>
+          <p:cNvSpPr>
+            <a:spLocks noGrp="1"/>
+          </p:cNvSpPr>
+          <p:nvPr>
+            <p:ph type="title"/>
+          </p:nvPr>
+        </p:nvSpPr>
+        <p:spPr>
+          <a:xfrm>
+            <a:off x="469786" y="295516"/>
+            <a:ext cx="8674214" cy="1018572"/>
+          </a:xfrm>
+        </p:spPr>
+        <p:txBody>
+          <a:bodyPr/>
+          <a:lstStyle/>
+          <a:p>
+            <a:r>
+              <a:rPr lang="en-US" dirty="0" smtClean="0"/>
+              <a:t>log4net</a:t>
+            </a:r>
+            <a:endParaRPr lang="uk-UA" dirty="0"/>
+          </a:p>
+        </p:txBody>
+      </p:sp>
+      <p:sp>
+        <p:nvSpPr>
+          <p:cNvPr id="7" name="TextBox 6"/>
+          <p:cNvSpPr txBox="1"/>
+          <p:nvPr/>
+        </p:nvSpPr>
+        <p:spPr>
+          <a:xfrm>
+            <a:off x="469786" y="1313726"/>
+            <a:ext cx="7968079" cy="369332"/>
+          </a:xfrm>
+          <a:prstGeom prst="rect">
+            <a:avLst/>
+          </a:prstGeom>
+          <a:noFill/>
+        </p:spPr>
+        <p:txBody>
+          <a:bodyPr wrap="none" rtlCol="0">
+            <a:spAutoFit/>
+          </a:bodyPr>
+          <a:lstStyle/>
+          <a:p>
+            <a:r>
+              <a:rPr lang="en-US" dirty="0" smtClean="0">
+                <a:solidFill>
+                  <a:srgbClr val="000000"/>
+                </a:solidFill>
+              </a:rPr>
+              <a:t>More general logging app, commonly used for logging desktop applications.</a:t>
+            </a:r>
+          </a:p>
+        </p:txBody>
+      </p:sp>
+      <p:pic>
+        <p:nvPicPr>
+          <p:cNvPr id="2" name="Рисунок 1"/>
+          <p:cNvPicPr>
+            <a:picLocks noChangeAspect="1"/>
+          </p:cNvPicPr>
+          <p:nvPr/>
+        </p:nvPicPr>
+        <p:blipFill>
+          <a:blip r:embed="rId3">
+            <a:extLst>
+              <a:ext uri="{28A0092B-C50C-407E-A947-70E740481C1C}">
+                <a14:useLocalDpi xmlns:a14="http://schemas.microsoft.com/office/drawing/2010/main" val="0"/>
+              </a:ext>
+            </a:extLst>
+          </a:blip>
+          <a:stretch>
+            <a:fillRect/>
+          </a:stretch>
+        </p:blipFill>
+        <p:spPr>
+          <a:xfrm>
+            <a:off x="1038262" y="1683058"/>
+            <a:ext cx="6977026" cy="4217274"/>
+          </a:xfrm>
+          <a:prstGeom prst="rect">
+            <a:avLst/>
+          </a:prstGeom>
+        </p:spPr>
+      </p:pic>
+    </p:spTree>
+    <p:extLst>
+      <p:ext uri="{BB962C8B-B14F-4D97-AF65-F5344CB8AC3E}">
+        <p14:creationId xmlns:p14="http://schemas.microsoft.com/office/powerpoint/2010/main" val="1438844777"/>
+      </p:ext>
+    </p:extLst>
+  </p:cSld>
+  <p:clrMapOvr>
+    <a:masterClrMapping/>
+  </p:clrMapOvr>
+  <p:timing>
+    <p:tnLst>
+      <p:par>
+        <p:cTn id="1" dur="indefinite" restart="never" nodeType="tmRoot"/>
+      </p:par>
+    </p:tnLst>
+  </p:timing>
+</p:sld>
+</file>
+
+<file path=ppt/slides/slide11.xml><?xml version="1.0" encoding="utf-8"?>
+<p:sld xmlns:a="http://schemas.openxmlformats.org/drawingml/2006/main" xmlns:r="http://schemas.openxmlformats.org/officeDocument/2006/relationships" xmlns:p="http://schemas.openxmlformats.org/presentationml/2006/main">
+  <p:cSld>
+    <p:spTree>
+      <p:nvGrpSpPr>
+        <p:cNvPr id="1" name=""/>
+        <p:cNvGrpSpPr/>
+        <p:nvPr/>
+      </p:nvGrpSpPr>
+      <p:grpSpPr>
+        <a:xfrm>
+          <a:off x="0" y="0"/>
+          <a:ext cx="0" cy="0"/>
+          <a:chOff x="0" y="0"/>
+          <a:chExt cx="0" cy="0"/>
+        </a:xfrm>
+      </p:grpSpPr>
+      <p:sp>
+        <p:nvSpPr>
+          <p:cNvPr id="2" name="Заголовок 1"/>
+          <p:cNvSpPr>
+            <a:spLocks noGrp="1"/>
+          </p:cNvSpPr>
+          <p:nvPr>
+            <p:ph type="title"/>
+          </p:nvPr>
+        </p:nvSpPr>
+        <p:spPr/>
+        <p:txBody>
+          <a:bodyPr/>
+          <a:lstStyle/>
+          <a:p>
+            <a:r>
+              <a:rPr lang="en-US" dirty="0" smtClean="0"/>
+              <a:t>That’s about it for now!</a:t>
+            </a:r>
+            <a:endParaRPr lang="uk-UA" dirty="0"/>
+          </a:p>
+        </p:txBody>
+      </p:sp>
+    </p:spTree>
+    <p:extLst>
+      <p:ext uri="{BB962C8B-B14F-4D97-AF65-F5344CB8AC3E}">
+        <p14:creationId xmlns:p14="http://schemas.microsoft.com/office/powerpoint/2010/main" val="837831753"/>
+      </p:ext>
+    </p:extLst>
+  </p:cSld>
+  <p:clrMapOvr>
+    <a:masterClrMapping/>
+  </p:clrMapOvr>
+  <p:timing>
+    <p:tnLst>
+      <p:par>
+        <p:cTn id="1" dur="indefinite" restart="never" nodeType="tmRoot"/>
+      </p:par>
+    </p:tnLst>
+  </p:timing>
+</p:sld>
+</file>
+
 <file path=ppt/slides/slide2.xml><?xml version="1.0" encoding="utf-8"?>
 <p:sld xmlns:a="http://schemas.openxmlformats.org/drawingml/2006/main" xmlns:r="http://schemas.openxmlformats.org/officeDocument/2006/relationships" xmlns:p="http://schemas.openxmlformats.org/presentationml/2006/main">
   <p:cSld>
@@ -5816,19 +6196,7 @@
           <a:p>
             <a:r>
               <a:rPr lang="en-US" dirty="0" smtClean="0"/>
-              <a:t>At first glance you might think that there is no difference, in the end it’s all written in C#, right? Well yeah, but not </a:t>
-            </a:r>
-            <a:r>
-              <a:rPr lang="en-US" dirty="0" smtClean="0"/>
-              <a:t>quit</a:t>
-            </a:r>
-            <a:r>
-              <a:rPr lang="en-US" dirty="0" smtClean="0"/>
-              <a:t>e</a:t>
-            </a:r>
-            <a:r>
-              <a:rPr lang="en-US" dirty="0" smtClean="0"/>
-              <a:t>. </a:t>
+              <a:t>At first glance you might think that there is no difference, in the end it’s all written in C#, right? Well yeah, but not quite. </a:t>
             </a:r>
           </a:p>
           <a:p>
@@ -5857,7 +6225,6 @@
               <a:rPr lang="en-US" dirty="0" smtClean="0"/>
               <a:t>- Third-party modules</a:t>
             </a:r>
-            <a:endParaRPr lang="en-US" dirty="0" smtClean="0"/>
           </a:p>
         </p:txBody>
       </p:sp>
@@ -6365,15 +6732,7 @@
                   <a:srgbClr val="000000"/>
                 </a:solidFill>
               </a:rPr>
-              <a:t>errors</a:t>
-            </a:r>
-            <a:r>
-              <a:rPr lang="en-US" sz="2400" dirty="0" smtClean="0">
-                <a:solidFill>
-                  <a:srgbClr val="000000"/>
-                </a:solidFill>
-              </a:rPr>
-              <a:t>:</a:t>
+              <a:t>errors:</a:t>
             </a:r>
           </a:p>
           <a:p>
@@ -6885,7 +7244,7 @@
           <a:p>
             <a:r>
               <a:rPr lang="en-US" dirty="0" smtClean="0"/>
-              <a:t>log4net</a:t>
+              <a:t>Setting up</a:t>
             </a:r>
             <a:endParaRPr lang="uk-UA" dirty="0"/>
           </a:p>
@@ -6893,14 +7252,14 @@
       </p:sp>
       <p:sp>
         <p:nvSpPr>
-          <p:cNvPr id="7" name="TextBox 6"/>
+          <p:cNvPr id="2" name="TextBox 1"/>
           <p:cNvSpPr txBox="1"/>
           <p:nvPr/>
         </p:nvSpPr>
         <p:spPr>
           <a:xfrm>
-            <a:off x="469786" y="1313726"/>
-            <a:ext cx="7968079" cy="369332"/>
+            <a:off x="469786" y="1314088"/>
+            <a:ext cx="1959639" cy="369332"/>
           </a:xfrm>
           <a:prstGeom prst="rect">
             <a:avLst/>
@@ -6914,19 +7273,16 @@
           <a:lstStyle/>
           <a:p>
             <a:r>
-              <a:rPr lang="en-US" dirty="0" smtClean="0">
-                <a:solidFill>
-                  <a:srgbClr val="000000"/>
-                </a:solidFill>
-              </a:rPr>
-              <a:t>More general logging app, commonly used for logging desktop applications.</a:t>
-            </a:r>
+              <a:rPr lang="en-US" dirty="0" smtClean="0"/>
+              <a:t>As easy as it gets</a:t>
+            </a:r>
+            <a:endParaRPr lang="en-US" dirty="0"/>
           </a:p>
         </p:txBody>
       </p:sp>
       <p:pic>
         <p:nvPicPr>
-          <p:cNvPr id="2" name="Рисунок 1"/>
+          <p:cNvPr id="3" name="Рисунок 2"/>
           <p:cNvPicPr>
             <a:picLocks noChangeAspect="1"/>
           </p:cNvPicPr>
@@ -6946,8 +7302,8 @@
         </p:blipFill>
         <p:spPr>
           <a:xfrm>
-            <a:off x="1038262" y="1683058"/>
-            <a:ext cx="6977026" cy="4217274"/>
+            <a:off x="469786" y="1683420"/>
+            <a:ext cx="6673964" cy="4124901"/>
           </a:xfrm>
           <a:prstGeom prst="rect">
             <a:avLst/>
@@ -6957,7 +7313,7 @@
     </p:spTree>
     <p:extLst>
       <p:ext uri="{BB962C8B-B14F-4D97-AF65-F5344CB8AC3E}">
-        <p14:creationId xmlns:p14="http://schemas.microsoft.com/office/powerpoint/2010/main" val="1438844777"/>
+        <p14:creationId xmlns:p14="http://schemas.microsoft.com/office/powerpoint/2010/main" val="294521898"/>
       </p:ext>
     </p:extLst>
   </p:cSld>
@@ -6993,7 +7349,7 @@
       </p:grpSpPr>
       <p:sp>
         <p:nvSpPr>
-          <p:cNvPr id="2" name="Заголовок 1"/>
+          <p:cNvPr id="6" name="Заголовок 5"/>
           <p:cNvSpPr>
             <a:spLocks noGrp="1"/>
           </p:cNvSpPr>
@@ -7001,31 +7357,96 @@
             <p:ph type="title"/>
           </p:nvPr>
         </p:nvSpPr>
-        <p:spPr/>
+        <p:spPr>
+          <a:xfrm>
+            <a:off x="469786" y="295516"/>
+            <a:ext cx="8674214" cy="1018572"/>
+          </a:xfrm>
+        </p:spPr>
         <p:txBody>
           <a:bodyPr/>
           <a:lstStyle/>
           <a:p>
             <a:r>
               <a:rPr lang="en-US" dirty="0" smtClean="0"/>
-              <a:t>That’s </a:t>
-            </a:r>
-            <a:r>
-              <a:rPr lang="en-US" dirty="0" smtClean="0"/>
-              <a:t>about it for now</a:t>
-            </a:r>
-            <a:r>
-              <a:rPr lang="en-US" dirty="0" smtClean="0"/>
-              <a:t>!</a:t>
+              <a:t>Some extra features</a:t>
             </a:r>
             <a:endParaRPr lang="uk-UA" dirty="0"/>
           </a:p>
         </p:txBody>
       </p:sp>
+      <p:sp>
+        <p:nvSpPr>
+          <p:cNvPr id="7" name="TextBox 6"/>
+          <p:cNvSpPr txBox="1"/>
+          <p:nvPr/>
+        </p:nvSpPr>
+        <p:spPr>
+          <a:xfrm>
+            <a:off x="469786" y="1314088"/>
+            <a:ext cx="2390270" cy="369332"/>
+          </a:xfrm>
+          <a:prstGeom prst="rect">
+            <a:avLst/>
+          </a:prstGeom>
+          <a:noFill/>
+        </p:spPr>
+        <p:txBody>
+          <a:bodyPr wrap="none" rtlCol="0">
+            <a:spAutoFit/>
+          </a:bodyPr>
+          <a:lstStyle/>
+          <a:p>
+            <a:r>
+              <a:rPr lang="en-US" dirty="0" smtClean="0">
+                <a:solidFill>
+                  <a:srgbClr val="000000"/>
+                </a:solidFill>
+              </a:rPr>
+              <a:t>It’s all about statistics</a:t>
+            </a:r>
+            <a:endParaRPr lang="en-US" dirty="0">
+              <a:solidFill>
+                <a:srgbClr val="000000"/>
+              </a:solidFill>
+            </a:endParaRPr>
+          </a:p>
+        </p:txBody>
+      </p:sp>
+      <p:pic>
+        <p:nvPicPr>
+          <p:cNvPr id="2" name="Рисунок 1"/>
+          <p:cNvPicPr>
+            <a:picLocks noChangeAspect="1"/>
+          </p:cNvPicPr>
+          <p:nvPr/>
+        </p:nvPicPr>
+        <p:blipFill>
+          <a:blip r:embed="rId3">
+            <a:extLst>
+              <a:ext uri="{28A0092B-C50C-407E-A947-70E740481C1C}">
+                <a14:useLocalDpi xmlns:a14="http://schemas.microsoft.com/office/drawing/2010/main" val="0"/>
+              </a:ext>
+            </a:extLst>
+          </a:blip>
+          <a:stretch>
+            <a:fillRect/>
+          </a:stretch>
+        </p:blipFill>
+        <p:spPr>
+          <a:xfrm>
+            <a:off x="1312748" y="1683420"/>
+            <a:ext cx="6988289" cy="4463321"/>
+          </a:xfrm>
+          <a:prstGeom prst="rect">
+            <a:avLst/>
+          </a:prstGeom>
+        </p:spPr>
+      </p:pic>
     </p:spTree>
     <p:extLst>
       <p:ext uri="{BB962C8B-B14F-4D97-AF65-F5344CB8AC3E}">
-        <p14:creationId xmlns:p14="http://schemas.microsoft.com/office/powerpoint/2010/main" val="837831753"/>
+        <p14:creationId xmlns:p14="http://schemas.microsoft.com/office/powerpoint/2010/main" val="212547049"/>
       </p:ext>
     </p:extLst>
   </p:cSld>

</xml_diff>

<commit_message>
yet another Exception Handler in ASP.Net Core Presentation modification
I hope this is a final draft
</commit_message>
<xml_diff>
--- a/education/Exception_Handling_In_Core_Puhach_Ivan.pptx
+++ b/education/Exception_Handling_In_Core_Puhach_Ivan.pptx
@@ -7,10 +7,10 @@
     <p:sldMasterId id="2147483686" r:id="rId3"/>
   </p:sldMasterIdLst>
   <p:notesMasterIdLst>
-    <p:notesMasterId r:id="rId15"/>
+    <p:notesMasterId r:id="rId22"/>
   </p:notesMasterIdLst>
   <p:handoutMasterIdLst>
-    <p:handoutMasterId r:id="rId16"/>
+    <p:handoutMasterId r:id="rId23"/>
   </p:handoutMasterIdLst>
   <p:sldIdLst>
     <p:sldId id="287" r:id="rId4"/>
@@ -20,10 +20,17 @@
     <p:sldId id="282" r:id="rId8"/>
     <p:sldId id="270" r:id="rId9"/>
     <p:sldId id="288" r:id="rId10"/>
-    <p:sldId id="290" r:id="rId11"/>
-    <p:sldId id="291" r:id="rId12"/>
-    <p:sldId id="289" r:id="rId13"/>
-    <p:sldId id="262" r:id="rId14"/>
+    <p:sldId id="289" r:id="rId11"/>
+    <p:sldId id="290" r:id="rId12"/>
+    <p:sldId id="291" r:id="rId13"/>
+    <p:sldId id="292" r:id="rId14"/>
+    <p:sldId id="297" r:id="rId15"/>
+    <p:sldId id="293" r:id="rId16"/>
+    <p:sldId id="294" r:id="rId17"/>
+    <p:sldId id="295" r:id="rId18"/>
+    <p:sldId id="296" r:id="rId19"/>
+    <p:sldId id="298" r:id="rId20"/>
+    <p:sldId id="262" r:id="rId21"/>
   </p:sldIdLst>
   <p:sldSz cx="9144000" cy="6858000" type="screen4x3"/>
   <p:notesSz cx="6858000" cy="9144000"/>
@@ -231,7 +238,7 @@
           <a:p>
             <a:fld id="{4DF7676A-16FE-41B0-990D-65C7DB39A42C}" type="datetimeFigureOut">
               <a:rPr lang="uk-UA" smtClean="0"/>
-              <a:t>18.10.2017</a:t>
+              <a:t>19.10.2017</a:t>
             </a:fld>
             <a:endParaRPr lang="uk-UA"/>
           </a:p>
@@ -396,7 +403,7 @@
           <a:p>
             <a:fld id="{749229DF-2266-4885-82A9-179B07419183}" type="datetimeFigureOut">
               <a:rPr lang="en-US" smtClean="0"/>
-              <a:t>10/18/2017</a:t>
+              <a:t>10/19/2017</a:t>
             </a:fld>
             <a:endParaRPr lang="en-US"/>
           </a:p>
@@ -787,6 +794,510 @@
 </p:notes>
 </file>
 
+<file path=ppt/notesSlides/notesSlide10.xml><?xml version="1.0" encoding="utf-8"?>
+<p:notes xmlns:a="http://schemas.openxmlformats.org/drawingml/2006/main" xmlns:r="http://schemas.openxmlformats.org/officeDocument/2006/relationships" xmlns:p="http://schemas.openxmlformats.org/presentationml/2006/main">
+  <p:cSld>
+    <p:spTree>
+      <p:nvGrpSpPr>
+        <p:cNvPr id="1" name=""/>
+        <p:cNvGrpSpPr/>
+        <p:nvPr/>
+      </p:nvGrpSpPr>
+      <p:grpSpPr>
+        <a:xfrm>
+          <a:off x="0" y="0"/>
+          <a:ext cx="0" cy="0"/>
+          <a:chOff x="0" y="0"/>
+          <a:chExt cx="0" cy="0"/>
+        </a:xfrm>
+      </p:grpSpPr>
+      <p:sp>
+        <p:nvSpPr>
+          <p:cNvPr id="2" name="Образ слайда 1"/>
+          <p:cNvSpPr>
+            <a:spLocks noGrp="1" noRot="1" noChangeAspect="1"/>
+          </p:cNvSpPr>
+          <p:nvPr>
+            <p:ph type="sldImg"/>
+          </p:nvPr>
+        </p:nvSpPr>
+        <p:spPr/>
+      </p:sp>
+      <p:sp>
+        <p:nvSpPr>
+          <p:cNvPr id="3" name="Заметки 2"/>
+          <p:cNvSpPr>
+            <a:spLocks noGrp="1"/>
+          </p:cNvSpPr>
+          <p:nvPr>
+            <p:ph type="body" idx="1"/>
+          </p:nvPr>
+        </p:nvSpPr>
+        <p:spPr/>
+        <p:txBody>
+          <a:bodyPr/>
+          <a:lstStyle/>
+          <a:p>
+            <a:endParaRPr lang="en-US" dirty="0"/>
+          </a:p>
+        </p:txBody>
+      </p:sp>
+      <p:sp>
+        <p:nvSpPr>
+          <p:cNvPr id="4" name="Номер слайда 3"/>
+          <p:cNvSpPr>
+            <a:spLocks noGrp="1"/>
+          </p:cNvSpPr>
+          <p:nvPr>
+            <p:ph type="sldNum" sz="quarter" idx="10"/>
+          </p:nvPr>
+        </p:nvSpPr>
+        <p:spPr/>
+        <p:txBody>
+          <a:bodyPr/>
+          <a:lstStyle/>
+          <a:p>
+            <a:fld id="{26F4D375-ABE6-4939-A45D-A523BC6E81D7}" type="slidenum">
+              <a:rPr lang="en-US" smtClean="0"/>
+              <a:t>12</a:t>
+            </a:fld>
+            <a:endParaRPr lang="en-US"/>
+          </a:p>
+        </p:txBody>
+      </p:sp>
+    </p:spTree>
+    <p:extLst>
+      <p:ext uri="{BB962C8B-B14F-4D97-AF65-F5344CB8AC3E}">
+        <p14:creationId xmlns:p14="http://schemas.microsoft.com/office/powerpoint/2010/main" val="2526345851"/>
+      </p:ext>
+    </p:extLst>
+  </p:cSld>
+  <p:clrMapOvr>
+    <a:masterClrMapping/>
+  </p:clrMapOvr>
+</p:notes>
+</file>
+
+<file path=ppt/notesSlides/notesSlide11.xml><?xml version="1.0" encoding="utf-8"?>
+<p:notes xmlns:a="http://schemas.openxmlformats.org/drawingml/2006/main" xmlns:r="http://schemas.openxmlformats.org/officeDocument/2006/relationships" xmlns:p="http://schemas.openxmlformats.org/presentationml/2006/main">
+  <p:cSld>
+    <p:spTree>
+      <p:nvGrpSpPr>
+        <p:cNvPr id="1" name=""/>
+        <p:cNvGrpSpPr/>
+        <p:nvPr/>
+      </p:nvGrpSpPr>
+      <p:grpSpPr>
+        <a:xfrm>
+          <a:off x="0" y="0"/>
+          <a:ext cx="0" cy="0"/>
+          <a:chOff x="0" y="0"/>
+          <a:chExt cx="0" cy="0"/>
+        </a:xfrm>
+      </p:grpSpPr>
+      <p:sp>
+        <p:nvSpPr>
+          <p:cNvPr id="2" name="Образ слайда 1"/>
+          <p:cNvSpPr>
+            <a:spLocks noGrp="1" noRot="1" noChangeAspect="1"/>
+          </p:cNvSpPr>
+          <p:nvPr>
+            <p:ph type="sldImg"/>
+          </p:nvPr>
+        </p:nvSpPr>
+        <p:spPr/>
+      </p:sp>
+      <p:sp>
+        <p:nvSpPr>
+          <p:cNvPr id="3" name="Заметки 2"/>
+          <p:cNvSpPr>
+            <a:spLocks noGrp="1"/>
+          </p:cNvSpPr>
+          <p:nvPr>
+            <p:ph type="body" idx="1"/>
+          </p:nvPr>
+        </p:nvSpPr>
+        <p:spPr/>
+        <p:txBody>
+          <a:bodyPr/>
+          <a:lstStyle/>
+          <a:p>
+            <a:endParaRPr lang="en-US" dirty="0"/>
+          </a:p>
+        </p:txBody>
+      </p:sp>
+      <p:sp>
+        <p:nvSpPr>
+          <p:cNvPr id="4" name="Номер слайда 3"/>
+          <p:cNvSpPr>
+            <a:spLocks noGrp="1"/>
+          </p:cNvSpPr>
+          <p:nvPr>
+            <p:ph type="sldNum" sz="quarter" idx="10"/>
+          </p:nvPr>
+        </p:nvSpPr>
+        <p:spPr/>
+        <p:txBody>
+          <a:bodyPr/>
+          <a:lstStyle/>
+          <a:p>
+            <a:fld id="{26F4D375-ABE6-4939-A45D-A523BC6E81D7}" type="slidenum">
+              <a:rPr lang="en-US" smtClean="0"/>
+              <a:t>13</a:t>
+            </a:fld>
+            <a:endParaRPr lang="en-US"/>
+          </a:p>
+        </p:txBody>
+      </p:sp>
+    </p:spTree>
+    <p:extLst>
+      <p:ext uri="{BB962C8B-B14F-4D97-AF65-F5344CB8AC3E}">
+        <p14:creationId xmlns:p14="http://schemas.microsoft.com/office/powerpoint/2010/main" val="1273082603"/>
+      </p:ext>
+    </p:extLst>
+  </p:cSld>
+  <p:clrMapOvr>
+    <a:masterClrMapping/>
+  </p:clrMapOvr>
+</p:notes>
+</file>
+
+<file path=ppt/notesSlides/notesSlide12.xml><?xml version="1.0" encoding="utf-8"?>
+<p:notes xmlns:a="http://schemas.openxmlformats.org/drawingml/2006/main" xmlns:r="http://schemas.openxmlformats.org/officeDocument/2006/relationships" xmlns:p="http://schemas.openxmlformats.org/presentationml/2006/main">
+  <p:cSld>
+    <p:spTree>
+      <p:nvGrpSpPr>
+        <p:cNvPr id="1" name=""/>
+        <p:cNvGrpSpPr/>
+        <p:nvPr/>
+      </p:nvGrpSpPr>
+      <p:grpSpPr>
+        <a:xfrm>
+          <a:off x="0" y="0"/>
+          <a:ext cx="0" cy="0"/>
+          <a:chOff x="0" y="0"/>
+          <a:chExt cx="0" cy="0"/>
+        </a:xfrm>
+      </p:grpSpPr>
+      <p:sp>
+        <p:nvSpPr>
+          <p:cNvPr id="2" name="Образ слайда 1"/>
+          <p:cNvSpPr>
+            <a:spLocks noGrp="1" noRot="1" noChangeAspect="1"/>
+          </p:cNvSpPr>
+          <p:nvPr>
+            <p:ph type="sldImg"/>
+          </p:nvPr>
+        </p:nvSpPr>
+        <p:spPr/>
+      </p:sp>
+      <p:sp>
+        <p:nvSpPr>
+          <p:cNvPr id="3" name="Заметки 2"/>
+          <p:cNvSpPr>
+            <a:spLocks noGrp="1"/>
+          </p:cNvSpPr>
+          <p:nvPr>
+            <p:ph type="body" idx="1"/>
+          </p:nvPr>
+        </p:nvSpPr>
+        <p:spPr/>
+        <p:txBody>
+          <a:bodyPr/>
+          <a:lstStyle/>
+          <a:p>
+            <a:endParaRPr lang="en-US" dirty="0"/>
+          </a:p>
+        </p:txBody>
+      </p:sp>
+      <p:sp>
+        <p:nvSpPr>
+          <p:cNvPr id="4" name="Номер слайда 3"/>
+          <p:cNvSpPr>
+            <a:spLocks noGrp="1"/>
+          </p:cNvSpPr>
+          <p:nvPr>
+            <p:ph type="sldNum" sz="quarter" idx="10"/>
+          </p:nvPr>
+        </p:nvSpPr>
+        <p:spPr/>
+        <p:txBody>
+          <a:bodyPr/>
+          <a:lstStyle/>
+          <a:p>
+            <a:fld id="{26F4D375-ABE6-4939-A45D-A523BC6E81D7}" type="slidenum">
+              <a:rPr lang="en-US" smtClean="0"/>
+              <a:t>14</a:t>
+            </a:fld>
+            <a:endParaRPr lang="en-US"/>
+          </a:p>
+        </p:txBody>
+      </p:sp>
+    </p:spTree>
+    <p:extLst>
+      <p:ext uri="{BB962C8B-B14F-4D97-AF65-F5344CB8AC3E}">
+        <p14:creationId xmlns:p14="http://schemas.microsoft.com/office/powerpoint/2010/main" val="2328779883"/>
+      </p:ext>
+    </p:extLst>
+  </p:cSld>
+  <p:clrMapOvr>
+    <a:masterClrMapping/>
+  </p:clrMapOvr>
+</p:notes>
+</file>
+
+<file path=ppt/notesSlides/notesSlide13.xml><?xml version="1.0" encoding="utf-8"?>
+<p:notes xmlns:a="http://schemas.openxmlformats.org/drawingml/2006/main" xmlns:r="http://schemas.openxmlformats.org/officeDocument/2006/relationships" xmlns:p="http://schemas.openxmlformats.org/presentationml/2006/main">
+  <p:cSld>
+    <p:spTree>
+      <p:nvGrpSpPr>
+        <p:cNvPr id="1" name=""/>
+        <p:cNvGrpSpPr/>
+        <p:nvPr/>
+      </p:nvGrpSpPr>
+      <p:grpSpPr>
+        <a:xfrm>
+          <a:off x="0" y="0"/>
+          <a:ext cx="0" cy="0"/>
+          <a:chOff x="0" y="0"/>
+          <a:chExt cx="0" cy="0"/>
+        </a:xfrm>
+      </p:grpSpPr>
+      <p:sp>
+        <p:nvSpPr>
+          <p:cNvPr id="2" name="Образ слайда 1"/>
+          <p:cNvSpPr>
+            <a:spLocks noGrp="1" noRot="1" noChangeAspect="1"/>
+          </p:cNvSpPr>
+          <p:nvPr>
+            <p:ph type="sldImg"/>
+          </p:nvPr>
+        </p:nvSpPr>
+        <p:spPr/>
+      </p:sp>
+      <p:sp>
+        <p:nvSpPr>
+          <p:cNvPr id="3" name="Заметки 2"/>
+          <p:cNvSpPr>
+            <a:spLocks noGrp="1"/>
+          </p:cNvSpPr>
+          <p:nvPr>
+            <p:ph type="body" idx="1"/>
+          </p:nvPr>
+        </p:nvSpPr>
+        <p:spPr/>
+        <p:txBody>
+          <a:bodyPr/>
+          <a:lstStyle/>
+          <a:p>
+            <a:endParaRPr lang="en-US" dirty="0"/>
+          </a:p>
+        </p:txBody>
+      </p:sp>
+      <p:sp>
+        <p:nvSpPr>
+          <p:cNvPr id="4" name="Номер слайда 3"/>
+          <p:cNvSpPr>
+            <a:spLocks noGrp="1"/>
+          </p:cNvSpPr>
+          <p:nvPr>
+            <p:ph type="sldNum" sz="quarter" idx="10"/>
+          </p:nvPr>
+        </p:nvSpPr>
+        <p:spPr/>
+        <p:txBody>
+          <a:bodyPr/>
+          <a:lstStyle/>
+          <a:p>
+            <a:fld id="{26F4D375-ABE6-4939-A45D-A523BC6E81D7}" type="slidenum">
+              <a:rPr lang="en-US" smtClean="0"/>
+              <a:t>15</a:t>
+            </a:fld>
+            <a:endParaRPr lang="en-US"/>
+          </a:p>
+        </p:txBody>
+      </p:sp>
+    </p:spTree>
+    <p:extLst>
+      <p:ext uri="{BB962C8B-B14F-4D97-AF65-F5344CB8AC3E}">
+        <p14:creationId xmlns:p14="http://schemas.microsoft.com/office/powerpoint/2010/main" val="2869607585"/>
+      </p:ext>
+    </p:extLst>
+  </p:cSld>
+  <p:clrMapOvr>
+    <a:masterClrMapping/>
+  </p:clrMapOvr>
+</p:notes>
+</file>
+
+<file path=ppt/notesSlides/notesSlide14.xml><?xml version="1.0" encoding="utf-8"?>
+<p:notes xmlns:a="http://schemas.openxmlformats.org/drawingml/2006/main" xmlns:r="http://schemas.openxmlformats.org/officeDocument/2006/relationships" xmlns:p="http://schemas.openxmlformats.org/presentationml/2006/main">
+  <p:cSld>
+    <p:spTree>
+      <p:nvGrpSpPr>
+        <p:cNvPr id="1" name=""/>
+        <p:cNvGrpSpPr/>
+        <p:nvPr/>
+      </p:nvGrpSpPr>
+      <p:grpSpPr>
+        <a:xfrm>
+          <a:off x="0" y="0"/>
+          <a:ext cx="0" cy="0"/>
+          <a:chOff x="0" y="0"/>
+          <a:chExt cx="0" cy="0"/>
+        </a:xfrm>
+      </p:grpSpPr>
+      <p:sp>
+        <p:nvSpPr>
+          <p:cNvPr id="2" name="Образ слайда 1"/>
+          <p:cNvSpPr>
+            <a:spLocks noGrp="1" noRot="1" noChangeAspect="1"/>
+          </p:cNvSpPr>
+          <p:nvPr>
+            <p:ph type="sldImg"/>
+          </p:nvPr>
+        </p:nvSpPr>
+        <p:spPr/>
+      </p:sp>
+      <p:sp>
+        <p:nvSpPr>
+          <p:cNvPr id="3" name="Заметки 2"/>
+          <p:cNvSpPr>
+            <a:spLocks noGrp="1"/>
+          </p:cNvSpPr>
+          <p:nvPr>
+            <p:ph type="body" idx="1"/>
+          </p:nvPr>
+        </p:nvSpPr>
+        <p:spPr/>
+        <p:txBody>
+          <a:bodyPr/>
+          <a:lstStyle/>
+          <a:p>
+            <a:endParaRPr lang="en-US" dirty="0"/>
+          </a:p>
+        </p:txBody>
+      </p:sp>
+      <p:sp>
+        <p:nvSpPr>
+          <p:cNvPr id="4" name="Номер слайда 3"/>
+          <p:cNvSpPr>
+            <a:spLocks noGrp="1"/>
+          </p:cNvSpPr>
+          <p:nvPr>
+            <p:ph type="sldNum" sz="quarter" idx="10"/>
+          </p:nvPr>
+        </p:nvSpPr>
+        <p:spPr/>
+        <p:txBody>
+          <a:bodyPr/>
+          <a:lstStyle/>
+          <a:p>
+            <a:fld id="{26F4D375-ABE6-4939-A45D-A523BC6E81D7}" type="slidenum">
+              <a:rPr lang="en-US" smtClean="0"/>
+              <a:t>16</a:t>
+            </a:fld>
+            <a:endParaRPr lang="en-US"/>
+          </a:p>
+        </p:txBody>
+      </p:sp>
+    </p:spTree>
+    <p:extLst>
+      <p:ext uri="{BB962C8B-B14F-4D97-AF65-F5344CB8AC3E}">
+        <p14:creationId xmlns:p14="http://schemas.microsoft.com/office/powerpoint/2010/main" val="3839012552"/>
+      </p:ext>
+    </p:extLst>
+  </p:cSld>
+  <p:clrMapOvr>
+    <a:masterClrMapping/>
+  </p:clrMapOvr>
+</p:notes>
+</file>
+
+<file path=ppt/notesSlides/notesSlide15.xml><?xml version="1.0" encoding="utf-8"?>
+<p:notes xmlns:a="http://schemas.openxmlformats.org/drawingml/2006/main" xmlns:r="http://schemas.openxmlformats.org/officeDocument/2006/relationships" xmlns:p="http://schemas.openxmlformats.org/presentationml/2006/main">
+  <p:cSld>
+    <p:spTree>
+      <p:nvGrpSpPr>
+        <p:cNvPr id="1" name=""/>
+        <p:cNvGrpSpPr/>
+        <p:nvPr/>
+      </p:nvGrpSpPr>
+      <p:grpSpPr>
+        <a:xfrm>
+          <a:off x="0" y="0"/>
+          <a:ext cx="0" cy="0"/>
+          <a:chOff x="0" y="0"/>
+          <a:chExt cx="0" cy="0"/>
+        </a:xfrm>
+      </p:grpSpPr>
+      <p:sp>
+        <p:nvSpPr>
+          <p:cNvPr id="2" name="Образ слайда 1"/>
+          <p:cNvSpPr>
+            <a:spLocks noGrp="1" noRot="1" noChangeAspect="1"/>
+          </p:cNvSpPr>
+          <p:nvPr>
+            <p:ph type="sldImg"/>
+          </p:nvPr>
+        </p:nvSpPr>
+        <p:spPr/>
+      </p:sp>
+      <p:sp>
+        <p:nvSpPr>
+          <p:cNvPr id="3" name="Заметки 2"/>
+          <p:cNvSpPr>
+            <a:spLocks noGrp="1"/>
+          </p:cNvSpPr>
+          <p:nvPr>
+            <p:ph type="body" idx="1"/>
+          </p:nvPr>
+        </p:nvSpPr>
+        <p:spPr/>
+        <p:txBody>
+          <a:bodyPr/>
+          <a:lstStyle/>
+          <a:p>
+            <a:endParaRPr lang="en-US" dirty="0"/>
+          </a:p>
+        </p:txBody>
+      </p:sp>
+      <p:sp>
+        <p:nvSpPr>
+          <p:cNvPr id="4" name="Номер слайда 3"/>
+          <p:cNvSpPr>
+            <a:spLocks noGrp="1"/>
+          </p:cNvSpPr>
+          <p:nvPr>
+            <p:ph type="sldNum" sz="quarter" idx="10"/>
+          </p:nvPr>
+        </p:nvSpPr>
+        <p:spPr/>
+        <p:txBody>
+          <a:bodyPr/>
+          <a:lstStyle/>
+          <a:p>
+            <a:fld id="{26F4D375-ABE6-4939-A45D-A523BC6E81D7}" type="slidenum">
+              <a:rPr lang="en-US" smtClean="0"/>
+              <a:t>17</a:t>
+            </a:fld>
+            <a:endParaRPr lang="en-US"/>
+          </a:p>
+        </p:txBody>
+      </p:sp>
+    </p:spTree>
+    <p:extLst>
+      <p:ext uri="{BB962C8B-B14F-4D97-AF65-F5344CB8AC3E}">
+        <p14:creationId xmlns:p14="http://schemas.microsoft.com/office/powerpoint/2010/main" val="1708726174"/>
+      </p:ext>
+    </p:extLst>
+  </p:cSld>
+  <p:clrMapOvr>
+    <a:masterClrMapping/>
+  </p:clrMapOvr>
+</p:notes>
+</file>
+
 <file path=ppt/notesSlides/notesSlide2.xml><?xml version="1.0" encoding="utf-8"?>
 <p:notes xmlns:a="http://schemas.openxmlformats.org/drawingml/2006/main" xmlns:r="http://schemas.openxmlformats.org/officeDocument/2006/relationships" xmlns:p="http://schemas.openxmlformats.org/presentationml/2006/main">
   <p:cSld>
@@ -953,15 +1464,7 @@
                   <a:srgbClr val="000000"/>
                 </a:solidFill>
               </a:rPr>
-              <a:t>Exception </a:t>
-            </a:r>
-            <a:r>
-              <a:rPr lang="en-US" dirty="0" smtClean="0">
-                <a:solidFill>
-                  <a:srgbClr val="000000"/>
-                </a:solidFill>
-              </a:rPr>
-              <a:t>filters you might use in some specific situations when you have different scenarios for different incoming data, it should occur mostly within MVC actions, because it has less flexibility rather than error handling middleware.</a:t>
+              <a:t>Exception filters you might use in some specific situations when you have different scenarios for different incoming data, it should occur mostly within MVC actions, because it has less flexibility rather than error handling middleware.</a:t>
             </a:r>
           </a:p>
           <a:p>
@@ -1201,10 +1704,8 @@
                 <a:ea typeface="+mn-ea"/>
                 <a:cs typeface="+mn-cs"/>
               </a:rPr>
-              <a:t> web application, or even all ASP.NET web applications on a machine, without any need for re-compilation or re-deployment.</a:t>
-            </a:r>
-          </a:p>
-          <a:p>
+              <a:t> web application, or even all ASP.NET web applications on a machine, without any need for re-compilation or re-deployment</a:t>
+            </a:r>
             <a:r>
               <a:rPr lang="en-US" sz="1200" b="0" i="0" kern="1200" dirty="0" smtClean="0">
                 <a:solidFill>
@@ -1215,66 +1716,26 @@
                 <a:ea typeface="+mn-ea"/>
                 <a:cs typeface="+mn-cs"/>
               </a:rPr>
-              <a:t>Once ELMAH has been dropped into a running web application and configured appropriately, you get the following facilities without changing a single line of your code:</a:t>
-            </a:r>
-          </a:p>
-          <a:p>
-            <a:r>
-              <a:rPr lang="en-US" sz="1200" b="0" i="0" kern="1200" dirty="0" smtClean="0">
-                <a:solidFill>
-                  <a:schemeClr val="tx1"/>
-                </a:solidFill>
-                <a:effectLst/>
-                <a:latin typeface="+mn-lt"/>
-                <a:ea typeface="+mn-ea"/>
-                <a:cs typeface="+mn-cs"/>
-              </a:rPr>
-              <a:t>-Logging of nearly all unhandled exceptions.</a:t>
-            </a:r>
-          </a:p>
-          <a:p>
-            <a:r>
-              <a:rPr lang="en-US" sz="1200" b="0" i="0" kern="1200" dirty="0" smtClean="0">
-                <a:solidFill>
-                  <a:schemeClr val="tx1"/>
-                </a:solidFill>
-                <a:effectLst/>
-                <a:latin typeface="+mn-lt"/>
-                <a:ea typeface="+mn-ea"/>
-                <a:cs typeface="+mn-cs"/>
-              </a:rPr>
-              <a:t>-A web page to remotely view the entire log of recoded exceptions.</a:t>
-            </a:r>
-          </a:p>
-          <a:p>
-            <a:r>
-              <a:rPr lang="en-US" sz="1200" b="0" i="0" kern="1200" dirty="0" smtClean="0">
-                <a:solidFill>
-                  <a:schemeClr val="tx1"/>
-                </a:solidFill>
-                <a:effectLst/>
-                <a:latin typeface="+mn-lt"/>
-                <a:ea typeface="+mn-ea"/>
-                <a:cs typeface="+mn-cs"/>
-              </a:rPr>
-              <a:t>-A web page to remotely view the full details of any one logged exception, including colored stack traces.</a:t>
-            </a:r>
-          </a:p>
-          <a:p>
-            <a:r>
-              <a:rPr lang="en-US" sz="1200" b="0" i="0" kern="1200" dirty="0" smtClean="0">
-                <a:solidFill>
-                  <a:schemeClr val="tx1"/>
-                </a:solidFill>
-                <a:effectLst/>
-                <a:latin typeface="+mn-lt"/>
-                <a:ea typeface="+mn-ea"/>
-                <a:cs typeface="+mn-cs"/>
-              </a:rPr>
-              <a:t>-An e-mail notification of each error at the time it occurs.</a:t>
-            </a:r>
-          </a:p>
-          <a:p>
+              <a:t>.</a:t>
+            </a:r>
+          </a:p>
+          <a:p>
+            <a:r>
+              <a:rPr lang="en-US" dirty="0" smtClean="0"/>
+              <a:t>Tell about no use for asp.net core, </a:t>
+            </a:r>
+            <a:r>
+              <a:rPr lang="en-US" dirty="0" err="1" smtClean="0"/>
+              <a:t>cuz</a:t>
+            </a:r>
+            <a:r>
+              <a:rPr lang="en-US" dirty="0" smtClean="0"/>
+              <a:t> it</a:t>
+            </a:r>
+            <a:r>
+              <a:rPr lang="en-US" baseline="0" dirty="0" smtClean="0"/>
+              <a:t> doesn’t support it</a:t>
+            </a:r>
             <a:endParaRPr lang="en-US" dirty="0"/>
           </a:p>
         </p:txBody>
@@ -1360,52 +1821,12 @@
           <a:lstStyle/>
           <a:p>
             <a:r>
-              <a:rPr lang="en-US" sz="1200" b="0" i="0" kern="1200" dirty="0" smtClean="0">
-                <a:solidFill>
-                  <a:schemeClr val="tx1"/>
-                </a:solidFill>
-                <a:effectLst/>
-                <a:latin typeface="+mn-lt"/>
-                <a:ea typeface="+mn-ea"/>
-                <a:cs typeface="+mn-cs"/>
-              </a:rPr>
-              <a:t>Just install it</a:t>
-            </a:r>
-            <a:r>
-              <a:rPr lang="en-US" sz="1200" b="0" i="0" kern="1200" baseline="0" dirty="0" smtClean="0">
-                <a:solidFill>
-                  <a:schemeClr val="tx1"/>
-                </a:solidFill>
-                <a:effectLst/>
-                <a:latin typeface="+mn-lt"/>
-                <a:ea typeface="+mn-ea"/>
-                <a:cs typeface="+mn-cs"/>
-              </a:rPr>
-              <a:t> in </a:t>
-            </a:r>
-            <a:r>
-              <a:rPr lang="en-US" sz="1200" b="0" i="0" kern="1200" baseline="0" dirty="0" err="1" smtClean="0">
-                <a:solidFill>
-                  <a:schemeClr val="tx1"/>
-                </a:solidFill>
-                <a:effectLst/>
-                <a:latin typeface="+mn-lt"/>
-                <a:ea typeface="+mn-ea"/>
-                <a:cs typeface="+mn-cs"/>
-              </a:rPr>
-              <a:t>nuget</a:t>
-            </a:r>
-            <a:r>
-              <a:rPr lang="en-US" sz="1200" b="0" i="0" kern="1200" baseline="0" dirty="0" smtClean="0">
-                <a:solidFill>
-                  <a:schemeClr val="tx1"/>
-                </a:solidFill>
-                <a:effectLst/>
-                <a:latin typeface="+mn-lt"/>
-                <a:ea typeface="+mn-ea"/>
-                <a:cs typeface="+mn-cs"/>
-              </a:rPr>
-              <a:t> panel, and start using </a:t>
+              <a:rPr lang="en-US" dirty="0" smtClean="0"/>
+              <a:t>Tell about slow log4net asp.ne core</a:t>
+            </a:r>
+            <a:r>
+              <a:rPr lang="en-US" baseline="0" dirty="0" smtClean="0"/>
+              <a:t> updates</a:t>
             </a:r>
             <a:endParaRPr lang="en-US" dirty="0"/>
           </a:p>
@@ -1437,7 +1858,7 @@
     </p:spTree>
     <p:extLst>
       <p:ext uri="{BB962C8B-B14F-4D97-AF65-F5344CB8AC3E}">
-        <p14:creationId xmlns:p14="http://schemas.microsoft.com/office/powerpoint/2010/main" val="3369488744"/>
+        <p14:creationId xmlns:p14="http://schemas.microsoft.com/office/powerpoint/2010/main" val="3123961256"/>
       </p:ext>
     </p:extLst>
   </p:cSld>
@@ -1493,7 +1914,31 @@
           <a:p>
             <a:r>
               <a:rPr lang="en-US" dirty="0" smtClean="0"/>
-              <a:t>Using additional modules for better statistical data coverage.</a:t>
+              <a:t>Tell about the point where there is no much difference in libraries, the “prefix” error</a:t>
+            </a:r>
+            <a:r>
+              <a:rPr lang="en-US" baseline="0" dirty="0" smtClean="0"/>
+              <a:t> logging viewer, which supports log4ne, </a:t>
+            </a:r>
+            <a:r>
+              <a:rPr lang="en-US" baseline="0" dirty="0" err="1" smtClean="0"/>
+              <a:t>nlog</a:t>
+            </a:r>
+            <a:r>
+              <a:rPr lang="en-US" baseline="0" dirty="0" smtClean="0"/>
+              <a:t>, and </a:t>
+            </a:r>
+            <a:r>
+              <a:rPr lang="en-US" baseline="0" dirty="0" err="1" smtClean="0"/>
+              <a:t>serilog</a:t>
+            </a:r>
+            <a:r>
+              <a:rPr lang="en-US" baseline="0" dirty="0" smtClean="0"/>
+              <a:t>, and on that point move to </a:t>
+            </a:r>
+            <a:r>
+              <a:rPr lang="en-US" baseline="0" dirty="0" err="1" smtClean="0"/>
+              <a:t>serilog</a:t>
             </a:r>
             <a:endParaRPr lang="en-US" dirty="0"/>
           </a:p>
@@ -1525,7 +1970,7 @@
     </p:spTree>
     <p:extLst>
       <p:ext uri="{BB962C8B-B14F-4D97-AF65-F5344CB8AC3E}">
-        <p14:creationId xmlns:p14="http://schemas.microsoft.com/office/powerpoint/2010/main" val="4010102870"/>
+        <p14:creationId xmlns:p14="http://schemas.microsoft.com/office/powerpoint/2010/main" val="2036239988"/>
       </p:ext>
     </p:extLst>
   </p:cSld>
@@ -1579,6 +2024,18 @@
           <a:bodyPr/>
           <a:lstStyle/>
           <a:p>
+            <a:r>
+              <a:rPr lang="en-US" dirty="0" err="1" smtClean="0"/>
+              <a:t>Serilog</a:t>
+            </a:r>
+            <a:r>
+              <a:rPr lang="en-US" dirty="0" smtClean="0"/>
+              <a:t>,</a:t>
+            </a:r>
+            <a:r>
+              <a:rPr lang="en-US" baseline="0" dirty="0" smtClean="0"/>
+              <a:t> tell bout my personal favor of this one, mention structured logging method that occurs in this lib, tell bout most simple implementation and switch to showing that fast implementation</a:t>
+            </a:r>
             <a:endParaRPr lang="en-US" dirty="0"/>
           </a:p>
         </p:txBody>
@@ -1609,7 +2066,91 @@
     </p:spTree>
     <p:extLst>
       <p:ext uri="{BB962C8B-B14F-4D97-AF65-F5344CB8AC3E}">
-        <p14:creationId xmlns:p14="http://schemas.microsoft.com/office/powerpoint/2010/main" val="3123961256"/>
+        <p14:creationId xmlns:p14="http://schemas.microsoft.com/office/powerpoint/2010/main" val="948204931"/>
+      </p:ext>
+    </p:extLst>
+  </p:cSld>
+  <p:clrMapOvr>
+    <a:masterClrMapping/>
+  </p:clrMapOvr>
+</p:notes>
+</file>
+
+<file path=ppt/notesSlides/notesSlide9.xml><?xml version="1.0" encoding="utf-8"?>
+<p:notes xmlns:a="http://schemas.openxmlformats.org/drawingml/2006/main" xmlns:r="http://schemas.openxmlformats.org/officeDocument/2006/relationships" xmlns:p="http://schemas.openxmlformats.org/presentationml/2006/main">
+  <p:cSld>
+    <p:spTree>
+      <p:nvGrpSpPr>
+        <p:cNvPr id="1" name=""/>
+        <p:cNvGrpSpPr/>
+        <p:nvPr/>
+      </p:nvGrpSpPr>
+      <p:grpSpPr>
+        <a:xfrm>
+          <a:off x="0" y="0"/>
+          <a:ext cx="0" cy="0"/>
+          <a:chOff x="0" y="0"/>
+          <a:chExt cx="0" cy="0"/>
+        </a:xfrm>
+      </p:grpSpPr>
+      <p:sp>
+        <p:nvSpPr>
+          <p:cNvPr id="2" name="Образ слайда 1"/>
+          <p:cNvSpPr>
+            <a:spLocks noGrp="1" noRot="1" noChangeAspect="1"/>
+          </p:cNvSpPr>
+          <p:nvPr>
+            <p:ph type="sldImg"/>
+          </p:nvPr>
+        </p:nvSpPr>
+        <p:spPr/>
+      </p:sp>
+      <p:sp>
+        <p:nvSpPr>
+          <p:cNvPr id="3" name="Заметки 2"/>
+          <p:cNvSpPr>
+            <a:spLocks noGrp="1"/>
+          </p:cNvSpPr>
+          <p:nvPr>
+            <p:ph type="body" idx="1"/>
+          </p:nvPr>
+        </p:nvSpPr>
+        <p:spPr/>
+        <p:txBody>
+          <a:bodyPr/>
+          <a:lstStyle/>
+          <a:p>
+            <a:endParaRPr lang="en-US" dirty="0"/>
+          </a:p>
+        </p:txBody>
+      </p:sp>
+      <p:sp>
+        <p:nvSpPr>
+          <p:cNvPr id="4" name="Номер слайда 3"/>
+          <p:cNvSpPr>
+            <a:spLocks noGrp="1"/>
+          </p:cNvSpPr>
+          <p:nvPr>
+            <p:ph type="sldNum" sz="quarter" idx="10"/>
+          </p:nvPr>
+        </p:nvSpPr>
+        <p:spPr/>
+        <p:txBody>
+          <a:bodyPr/>
+          <a:lstStyle/>
+          <a:p>
+            <a:fld id="{26F4D375-ABE6-4939-A45D-A523BC6E81D7}" type="slidenum">
+              <a:rPr lang="en-US" smtClean="0"/>
+              <a:t>11</a:t>
+            </a:fld>
+            <a:endParaRPr lang="en-US"/>
+          </a:p>
+        </p:txBody>
+      </p:sp>
+    </p:spTree>
+    <p:extLst>
+      <p:ext uri="{BB962C8B-B14F-4D97-AF65-F5344CB8AC3E}">
+        <p14:creationId xmlns:p14="http://schemas.microsoft.com/office/powerpoint/2010/main" val="3998967974"/>
       </p:ext>
     </p:extLst>
   </p:cSld>
@@ -6007,8 +6548,8 @@
           <a:lstStyle/>
           <a:p>
             <a:r>
-              <a:rPr lang="en-US" dirty="0" smtClean="0"/>
-              <a:t>log4net</a:t>
+              <a:rPr lang="en-US" dirty="0" err="1" smtClean="0"/>
+              <a:t>Serilog</a:t>
             </a:r>
             <a:endParaRPr lang="uk-UA" dirty="0"/>
           </a:p>
@@ -6023,7 +6564,7 @@
         <p:spPr>
           <a:xfrm>
             <a:off x="469786" y="1313726"/>
-            <a:ext cx="7968079" cy="369332"/>
+            <a:ext cx="3945824" cy="369332"/>
           </a:xfrm>
           <a:prstGeom prst="rect">
             <a:avLst/>
@@ -6042,14 +6583,35 @@
                   <a:srgbClr val="000000"/>
                 </a:solidFill>
               </a:rPr>
-              <a:t>More general logging app, commonly used for logging desktop applications.</a:t>
-            </a:r>
+              <a:t>Yet another </a:t>
+            </a:r>
+            <a:r>
+              <a:rPr lang="en-US" dirty="0" err="1" smtClean="0">
+                <a:solidFill>
+                  <a:srgbClr val="000000"/>
+                </a:solidFill>
+              </a:rPr>
+              <a:t>.Net</a:t>
+            </a:r>
+            <a:r>
+              <a:rPr lang="en-US" dirty="0" smtClean="0">
+                <a:solidFill>
+                  <a:srgbClr val="000000"/>
+                </a:solidFill>
+              </a:rPr>
+              <a:t> error logging library</a:t>
+            </a:r>
+            <a:endParaRPr lang="en-US" dirty="0" smtClean="0">
+              <a:solidFill>
+                <a:srgbClr val="000000"/>
+              </a:solidFill>
+            </a:endParaRPr>
           </a:p>
         </p:txBody>
       </p:sp>
       <p:pic>
         <p:nvPicPr>
-          <p:cNvPr id="2" name="Рисунок 1"/>
+          <p:cNvPr id="3" name="Рисунок 2"/>
           <p:cNvPicPr>
             <a:picLocks noChangeAspect="1"/>
           </p:cNvPicPr>
@@ -6069,8 +6631,38 @@
         </p:blipFill>
         <p:spPr>
           <a:xfrm>
-            <a:off x="1038262" y="1683058"/>
-            <a:ext cx="6977026" cy="4217274"/>
+            <a:off x="469786" y="1683058"/>
+            <a:ext cx="7810500" cy="2343150"/>
+          </a:xfrm>
+          <a:prstGeom prst="rect">
+            <a:avLst/>
+          </a:prstGeom>
+        </p:spPr>
+      </p:pic>
+      <p:pic>
+        <p:nvPicPr>
+          <p:cNvPr id="2" name="Рисунок 1"/>
+          <p:cNvPicPr>
+            <a:picLocks noChangeAspect="1"/>
+          </p:cNvPicPr>
+          <p:nvPr/>
+        </p:nvPicPr>
+        <p:blipFill>
+          <a:blip r:embed="rId4">
+            <a:extLst>
+              <a:ext uri="{28A0092B-C50C-407E-A947-70E740481C1C}">
+                <a14:useLocalDpi xmlns:a14="http://schemas.microsoft.com/office/drawing/2010/main" val="0"/>
+              </a:ext>
+            </a:extLst>
+          </a:blip>
+          <a:stretch>
+            <a:fillRect/>
+          </a:stretch>
+        </p:blipFill>
+        <p:spPr>
+          <a:xfrm>
+            <a:off x="7258848" y="4098008"/>
+            <a:ext cx="1021438" cy="1021438"/>
           </a:xfrm>
           <a:prstGeom prst="rect">
             <a:avLst/>
@@ -6080,7 +6672,7 @@
     </p:spTree>
     <p:extLst>
       <p:ext uri="{BB962C8B-B14F-4D97-AF65-F5344CB8AC3E}">
-        <p14:creationId xmlns:p14="http://schemas.microsoft.com/office/powerpoint/2010/main" val="1438844777"/>
+        <p14:creationId xmlns:p14="http://schemas.microsoft.com/office/powerpoint/2010/main" val="3208325977"/>
       </p:ext>
     </p:extLst>
   </p:cSld>
@@ -6116,6 +6708,1204 @@
       </p:grpSpPr>
       <p:sp>
         <p:nvSpPr>
+          <p:cNvPr id="6" name="Заголовок 5"/>
+          <p:cNvSpPr>
+            <a:spLocks noGrp="1"/>
+          </p:cNvSpPr>
+          <p:nvPr>
+            <p:ph type="title"/>
+          </p:nvPr>
+        </p:nvSpPr>
+        <p:spPr>
+          <a:xfrm>
+            <a:off x="469786" y="295516"/>
+            <a:ext cx="8674214" cy="1018572"/>
+          </a:xfrm>
+        </p:spPr>
+        <p:txBody>
+          <a:bodyPr/>
+          <a:lstStyle/>
+          <a:p>
+            <a:r>
+              <a:rPr lang="en-US" dirty="0" smtClean="0"/>
+              <a:t>How to setup:</a:t>
+            </a:r>
+            <a:endParaRPr lang="uk-UA" dirty="0"/>
+          </a:p>
+        </p:txBody>
+      </p:sp>
+      <p:sp>
+        <p:nvSpPr>
+          <p:cNvPr id="4" name="TextBox 3"/>
+          <p:cNvSpPr txBox="1"/>
+          <p:nvPr/>
+        </p:nvSpPr>
+        <p:spPr>
+          <a:xfrm>
+            <a:off x="358319" y="1330518"/>
+            <a:ext cx="2151551" cy="369332"/>
+          </a:xfrm>
+          <a:prstGeom prst="rect">
+            <a:avLst/>
+          </a:prstGeom>
+          <a:noFill/>
+        </p:spPr>
+        <p:txBody>
+          <a:bodyPr wrap="none" rtlCol="0">
+            <a:spAutoFit/>
+          </a:bodyPr>
+          <a:lstStyle/>
+          <a:p>
+            <a:r>
+              <a:rPr lang="en-US" dirty="0" smtClean="0">
+                <a:solidFill>
+                  <a:srgbClr val="000000"/>
+                </a:solidFill>
+              </a:rPr>
+              <a:t>Step </a:t>
+            </a:r>
+            <a:r>
+              <a:rPr lang="ru-RU" dirty="0" smtClean="0">
+                <a:solidFill>
+                  <a:srgbClr val="000000"/>
+                </a:solidFill>
+              </a:rPr>
+              <a:t>№</a:t>
+            </a:r>
+            <a:r>
+              <a:rPr lang="en-US" dirty="0" smtClean="0">
+                <a:solidFill>
+                  <a:srgbClr val="000000"/>
+                </a:solidFill>
+              </a:rPr>
+              <a:t>1</a:t>
+            </a:r>
+            <a:r>
+              <a:rPr lang="ru-RU" dirty="0" smtClean="0">
+                <a:solidFill>
+                  <a:srgbClr val="000000"/>
+                </a:solidFill>
+              </a:rPr>
+              <a:t>: </a:t>
+            </a:r>
+            <a:r>
+              <a:rPr lang="en-US" dirty="0" smtClean="0">
+                <a:solidFill>
+                  <a:srgbClr val="000000"/>
+                </a:solidFill>
+              </a:rPr>
+              <a:t>Install it;</a:t>
+            </a:r>
+            <a:endParaRPr lang="en-US" dirty="0">
+              <a:solidFill>
+                <a:srgbClr val="000000"/>
+              </a:solidFill>
+            </a:endParaRPr>
+          </a:p>
+        </p:txBody>
+      </p:sp>
+      <p:sp>
+        <p:nvSpPr>
+          <p:cNvPr id="8" name="TextBox 7"/>
+          <p:cNvSpPr txBox="1"/>
+          <p:nvPr/>
+        </p:nvSpPr>
+        <p:spPr>
+          <a:xfrm>
+            <a:off x="358319" y="1699850"/>
+            <a:ext cx="3395610" cy="369332"/>
+          </a:xfrm>
+          <a:prstGeom prst="rect">
+            <a:avLst/>
+          </a:prstGeom>
+          <a:noFill/>
+        </p:spPr>
+        <p:txBody>
+          <a:bodyPr wrap="none" rtlCol="0">
+            <a:spAutoFit/>
+          </a:bodyPr>
+          <a:lstStyle/>
+          <a:p>
+            <a:r>
+              <a:rPr lang="en-US" dirty="0" smtClean="0">
+                <a:solidFill>
+                  <a:srgbClr val="000000"/>
+                </a:solidFill>
+              </a:rPr>
+              <a:t>Step </a:t>
+            </a:r>
+            <a:r>
+              <a:rPr lang="ru-RU" dirty="0" smtClean="0">
+                <a:solidFill>
+                  <a:srgbClr val="000000"/>
+                </a:solidFill>
+              </a:rPr>
+              <a:t>№</a:t>
+            </a:r>
+            <a:r>
+              <a:rPr lang="en-US" dirty="0" smtClean="0">
+                <a:solidFill>
+                  <a:srgbClr val="000000"/>
+                </a:solidFill>
+              </a:rPr>
+              <a:t>2</a:t>
+            </a:r>
+            <a:r>
+              <a:rPr lang="ru-RU" dirty="0" smtClean="0">
+                <a:solidFill>
+                  <a:srgbClr val="000000"/>
+                </a:solidFill>
+              </a:rPr>
+              <a:t>: </a:t>
+            </a:r>
+            <a:r>
+              <a:rPr lang="en-US" dirty="0" smtClean="0">
+                <a:solidFill>
+                  <a:srgbClr val="000000"/>
+                </a:solidFill>
+              </a:rPr>
+              <a:t>Add it in </a:t>
+            </a:r>
+            <a:r>
+              <a:rPr lang="en-US" dirty="0" err="1" smtClean="0">
+                <a:solidFill>
+                  <a:srgbClr val="000000"/>
+                </a:solidFill>
+              </a:rPr>
+              <a:t>Program.cs</a:t>
+            </a:r>
+            <a:r>
+              <a:rPr lang="en-US" dirty="0" smtClean="0">
+                <a:solidFill>
+                  <a:srgbClr val="000000"/>
+                </a:solidFill>
+              </a:rPr>
+              <a:t>;</a:t>
+            </a:r>
+            <a:endParaRPr lang="en-US" dirty="0">
+              <a:solidFill>
+                <a:srgbClr val="000000"/>
+              </a:solidFill>
+            </a:endParaRPr>
+          </a:p>
+        </p:txBody>
+      </p:sp>
+      <p:sp>
+        <p:nvSpPr>
+          <p:cNvPr id="9" name="TextBox 8"/>
+          <p:cNvSpPr txBox="1"/>
+          <p:nvPr/>
+        </p:nvSpPr>
+        <p:spPr>
+          <a:xfrm>
+            <a:off x="358318" y="2069182"/>
+            <a:ext cx="1900136" cy="369332"/>
+          </a:xfrm>
+          <a:prstGeom prst="rect">
+            <a:avLst/>
+          </a:prstGeom>
+          <a:noFill/>
+        </p:spPr>
+        <p:txBody>
+          <a:bodyPr wrap="none" rtlCol="0">
+            <a:spAutoFit/>
+          </a:bodyPr>
+          <a:lstStyle/>
+          <a:p>
+            <a:r>
+              <a:rPr lang="en-US" dirty="0" smtClean="0">
+                <a:solidFill>
+                  <a:srgbClr val="000000"/>
+                </a:solidFill>
+              </a:rPr>
+              <a:t>Step </a:t>
+            </a:r>
+            <a:r>
+              <a:rPr lang="ru-RU" dirty="0" smtClean="0">
+                <a:solidFill>
+                  <a:srgbClr val="000000"/>
+                </a:solidFill>
+              </a:rPr>
+              <a:t>№</a:t>
+            </a:r>
+            <a:r>
+              <a:rPr lang="en-US" dirty="0">
+                <a:solidFill>
+                  <a:srgbClr val="000000"/>
+                </a:solidFill>
+              </a:rPr>
+              <a:t>3</a:t>
+            </a:r>
+            <a:r>
+              <a:rPr lang="ru-RU" dirty="0" smtClean="0">
+                <a:solidFill>
+                  <a:srgbClr val="000000"/>
+                </a:solidFill>
+              </a:rPr>
+              <a:t>: </a:t>
+            </a:r>
+            <a:r>
+              <a:rPr lang="en-US" dirty="0" smtClean="0">
+                <a:solidFill>
+                  <a:srgbClr val="000000"/>
+                </a:solidFill>
+              </a:rPr>
+              <a:t>Enjoy;</a:t>
+            </a:r>
+            <a:endParaRPr lang="en-US" dirty="0">
+              <a:solidFill>
+                <a:srgbClr val="000000"/>
+              </a:solidFill>
+            </a:endParaRPr>
+          </a:p>
+        </p:txBody>
+      </p:sp>
+    </p:spTree>
+    <p:extLst>
+      <p:ext uri="{BB962C8B-B14F-4D97-AF65-F5344CB8AC3E}">
+        <p14:creationId xmlns:p14="http://schemas.microsoft.com/office/powerpoint/2010/main" val="3925119610"/>
+      </p:ext>
+    </p:extLst>
+  </p:cSld>
+  <p:clrMapOvr>
+    <a:masterClrMapping/>
+  </p:clrMapOvr>
+  <p:timing>
+    <p:tnLst>
+      <p:par>
+        <p:cTn id="1" dur="indefinite" restart="never" nodeType="tmRoot"/>
+      </p:par>
+    </p:tnLst>
+  </p:timing>
+</p:sld>
+</file>
+
+<file path=ppt/slides/slide12.xml><?xml version="1.0" encoding="utf-8"?>
+<p:sld xmlns:a="http://schemas.openxmlformats.org/drawingml/2006/main" xmlns:r="http://schemas.openxmlformats.org/officeDocument/2006/relationships" xmlns:p="http://schemas.openxmlformats.org/presentationml/2006/main">
+  <p:cSld>
+    <p:spTree>
+      <p:nvGrpSpPr>
+        <p:cNvPr id="1" name=""/>
+        <p:cNvGrpSpPr/>
+        <p:nvPr/>
+      </p:nvGrpSpPr>
+      <p:grpSpPr>
+        <a:xfrm>
+          <a:off x="0" y="0"/>
+          <a:ext cx="0" cy="0"/>
+          <a:chOff x="0" y="0"/>
+          <a:chExt cx="0" cy="0"/>
+        </a:xfrm>
+      </p:grpSpPr>
+      <p:sp>
+        <p:nvSpPr>
+          <p:cNvPr id="6" name="Заголовок 5"/>
+          <p:cNvSpPr>
+            <a:spLocks noGrp="1"/>
+          </p:cNvSpPr>
+          <p:nvPr>
+            <p:ph type="title"/>
+          </p:nvPr>
+        </p:nvSpPr>
+        <p:spPr>
+          <a:xfrm>
+            <a:off x="469786" y="295516"/>
+            <a:ext cx="8674214" cy="1018572"/>
+          </a:xfrm>
+        </p:spPr>
+        <p:txBody>
+          <a:bodyPr/>
+          <a:lstStyle/>
+          <a:p>
+            <a:r>
+              <a:rPr lang="en-US" dirty="0" smtClean="0"/>
+              <a:t>Step </a:t>
+            </a:r>
+            <a:r>
+              <a:rPr lang="uk-UA" dirty="0" smtClean="0"/>
+              <a:t>№</a:t>
+            </a:r>
+            <a:r>
+              <a:rPr lang="en-US" dirty="0" smtClean="0"/>
+              <a:t>1: Install it</a:t>
+            </a:r>
+            <a:endParaRPr lang="uk-UA" dirty="0"/>
+          </a:p>
+        </p:txBody>
+      </p:sp>
+      <p:sp>
+        <p:nvSpPr>
+          <p:cNvPr id="4" name="TextBox 3"/>
+          <p:cNvSpPr txBox="1"/>
+          <p:nvPr/>
+        </p:nvSpPr>
+        <p:spPr>
+          <a:xfrm>
+            <a:off x="469786" y="1129422"/>
+            <a:ext cx="1454244" cy="369332"/>
+          </a:xfrm>
+          <a:prstGeom prst="rect">
+            <a:avLst/>
+          </a:prstGeom>
+          <a:noFill/>
+        </p:spPr>
+        <p:txBody>
+          <a:bodyPr wrap="none" rtlCol="0">
+            <a:spAutoFit/>
+          </a:bodyPr>
+          <a:lstStyle/>
+          <a:p>
+            <a:r>
+              <a:rPr lang="en-US" dirty="0" smtClean="0">
+                <a:solidFill>
+                  <a:srgbClr val="000000"/>
+                </a:solidFill>
+              </a:rPr>
+              <a:t>Using </a:t>
+            </a:r>
+            <a:r>
+              <a:rPr lang="en-US" dirty="0" err="1" smtClean="0">
+                <a:solidFill>
+                  <a:srgbClr val="000000"/>
+                </a:solidFill>
+              </a:rPr>
+              <a:t>NuGet</a:t>
+            </a:r>
+            <a:endParaRPr lang="en-US" dirty="0">
+              <a:solidFill>
+                <a:srgbClr val="000000"/>
+              </a:solidFill>
+            </a:endParaRPr>
+          </a:p>
+        </p:txBody>
+      </p:sp>
+      <p:pic>
+        <p:nvPicPr>
+          <p:cNvPr id="2" name="Рисунок 1"/>
+          <p:cNvPicPr>
+            <a:picLocks noChangeAspect="1"/>
+          </p:cNvPicPr>
+          <p:nvPr/>
+        </p:nvPicPr>
+        <p:blipFill>
+          <a:blip r:embed="rId3">
+            <a:extLst>
+              <a:ext uri="{28A0092B-C50C-407E-A947-70E740481C1C}">
+                <a14:useLocalDpi xmlns:a14="http://schemas.microsoft.com/office/drawing/2010/main" val="0"/>
+              </a:ext>
+            </a:extLst>
+          </a:blip>
+          <a:stretch>
+            <a:fillRect/>
+          </a:stretch>
+        </p:blipFill>
+        <p:spPr>
+          <a:xfrm>
+            <a:off x="469786" y="1498754"/>
+            <a:ext cx="7842294" cy="4101946"/>
+          </a:xfrm>
+          <a:prstGeom prst="rect">
+            <a:avLst/>
+          </a:prstGeom>
+        </p:spPr>
+      </p:pic>
+    </p:spTree>
+    <p:extLst>
+      <p:ext uri="{BB962C8B-B14F-4D97-AF65-F5344CB8AC3E}">
+        <p14:creationId xmlns:p14="http://schemas.microsoft.com/office/powerpoint/2010/main" val="1000135361"/>
+      </p:ext>
+    </p:extLst>
+  </p:cSld>
+  <p:clrMapOvr>
+    <a:masterClrMapping/>
+  </p:clrMapOvr>
+  <p:timing>
+    <p:tnLst>
+      <p:par>
+        <p:cTn id="1" dur="indefinite" restart="never" nodeType="tmRoot"/>
+      </p:par>
+    </p:tnLst>
+  </p:timing>
+</p:sld>
+</file>
+
+<file path=ppt/slides/slide13.xml><?xml version="1.0" encoding="utf-8"?>
+<p:sld xmlns:a="http://schemas.openxmlformats.org/drawingml/2006/main" xmlns:r="http://schemas.openxmlformats.org/officeDocument/2006/relationships" xmlns:p="http://schemas.openxmlformats.org/presentationml/2006/main">
+  <p:cSld>
+    <p:spTree>
+      <p:nvGrpSpPr>
+        <p:cNvPr id="1" name=""/>
+        <p:cNvGrpSpPr/>
+        <p:nvPr/>
+      </p:nvGrpSpPr>
+      <p:grpSpPr>
+        <a:xfrm>
+          <a:off x="0" y="0"/>
+          <a:ext cx="0" cy="0"/>
+          <a:chOff x="0" y="0"/>
+          <a:chExt cx="0" cy="0"/>
+        </a:xfrm>
+      </p:grpSpPr>
+      <p:sp>
+        <p:nvSpPr>
+          <p:cNvPr id="6" name="Заголовок 5"/>
+          <p:cNvSpPr>
+            <a:spLocks noGrp="1"/>
+          </p:cNvSpPr>
+          <p:nvPr>
+            <p:ph type="title"/>
+          </p:nvPr>
+        </p:nvSpPr>
+        <p:spPr>
+          <a:xfrm>
+            <a:off x="469786" y="295516"/>
+            <a:ext cx="8674214" cy="1018572"/>
+          </a:xfrm>
+        </p:spPr>
+        <p:txBody>
+          <a:bodyPr/>
+          <a:lstStyle/>
+          <a:p>
+            <a:r>
+              <a:rPr lang="en-US" dirty="0" smtClean="0"/>
+              <a:t>Step </a:t>
+            </a:r>
+            <a:r>
+              <a:rPr lang="ru-RU" dirty="0" smtClean="0"/>
+              <a:t>№2:</a:t>
+            </a:r>
+            <a:r>
+              <a:rPr lang="en-US" dirty="0" smtClean="0"/>
+              <a:t> Add it in your </a:t>
+            </a:r>
+            <a:r>
+              <a:rPr lang="en-US" dirty="0" err="1" smtClean="0"/>
+              <a:t>Program.cs</a:t>
+            </a:r>
+            <a:endParaRPr lang="uk-UA" dirty="0"/>
+          </a:p>
+        </p:txBody>
+      </p:sp>
+      <p:pic>
+        <p:nvPicPr>
+          <p:cNvPr id="2" name="Рисунок 1"/>
+          <p:cNvPicPr>
+            <a:picLocks noChangeAspect="1"/>
+          </p:cNvPicPr>
+          <p:nvPr/>
+        </p:nvPicPr>
+        <p:blipFill>
+          <a:blip r:embed="rId3">
+            <a:extLst>
+              <a:ext uri="{28A0092B-C50C-407E-A947-70E740481C1C}">
+                <a14:useLocalDpi xmlns:a14="http://schemas.microsoft.com/office/drawing/2010/main" val="0"/>
+              </a:ext>
+            </a:extLst>
+          </a:blip>
+          <a:stretch>
+            <a:fillRect/>
+          </a:stretch>
+        </p:blipFill>
+        <p:spPr>
+          <a:xfrm>
+            <a:off x="469785" y="1498753"/>
+            <a:ext cx="8085274" cy="4273397"/>
+          </a:xfrm>
+          <a:prstGeom prst="rect">
+            <a:avLst/>
+          </a:prstGeom>
+        </p:spPr>
+      </p:pic>
+      <p:sp>
+        <p:nvSpPr>
+          <p:cNvPr id="5" name="TextBox 4"/>
+          <p:cNvSpPr txBox="1"/>
+          <p:nvPr/>
+        </p:nvSpPr>
+        <p:spPr>
+          <a:xfrm>
+            <a:off x="469786" y="1129422"/>
+            <a:ext cx="926216" cy="369332"/>
+          </a:xfrm>
+          <a:prstGeom prst="rect">
+            <a:avLst/>
+          </a:prstGeom>
+          <a:noFill/>
+        </p:spPr>
+        <p:txBody>
+          <a:bodyPr wrap="none" rtlCol="0">
+            <a:spAutoFit/>
+          </a:bodyPr>
+          <a:lstStyle/>
+          <a:p>
+            <a:r>
+              <a:rPr lang="en-US" dirty="0" smtClean="0">
+                <a:solidFill>
+                  <a:srgbClr val="000000"/>
+                </a:solidFill>
+              </a:rPr>
+              <a:t>Before:</a:t>
+            </a:r>
+            <a:endParaRPr lang="en-US" dirty="0">
+              <a:solidFill>
+                <a:srgbClr val="000000"/>
+              </a:solidFill>
+            </a:endParaRPr>
+          </a:p>
+        </p:txBody>
+      </p:sp>
+    </p:spTree>
+    <p:extLst>
+      <p:ext uri="{BB962C8B-B14F-4D97-AF65-F5344CB8AC3E}">
+        <p14:creationId xmlns:p14="http://schemas.microsoft.com/office/powerpoint/2010/main" val="2100331741"/>
+      </p:ext>
+    </p:extLst>
+  </p:cSld>
+  <p:clrMapOvr>
+    <a:masterClrMapping/>
+  </p:clrMapOvr>
+  <p:timing>
+    <p:tnLst>
+      <p:par>
+        <p:cTn id="1" dur="indefinite" restart="never" nodeType="tmRoot"/>
+      </p:par>
+    </p:tnLst>
+  </p:timing>
+</p:sld>
+</file>
+
+<file path=ppt/slides/slide14.xml><?xml version="1.0" encoding="utf-8"?>
+<p:sld xmlns:a="http://schemas.openxmlformats.org/drawingml/2006/main" xmlns:r="http://schemas.openxmlformats.org/officeDocument/2006/relationships" xmlns:p="http://schemas.openxmlformats.org/presentationml/2006/main">
+  <p:cSld>
+    <p:spTree>
+      <p:nvGrpSpPr>
+        <p:cNvPr id="1" name=""/>
+        <p:cNvGrpSpPr/>
+        <p:nvPr/>
+      </p:nvGrpSpPr>
+      <p:grpSpPr>
+        <a:xfrm>
+          <a:off x="0" y="0"/>
+          <a:ext cx="0" cy="0"/>
+          <a:chOff x="0" y="0"/>
+          <a:chExt cx="0" cy="0"/>
+        </a:xfrm>
+      </p:grpSpPr>
+      <p:sp>
+        <p:nvSpPr>
+          <p:cNvPr id="6" name="Заголовок 5"/>
+          <p:cNvSpPr>
+            <a:spLocks noGrp="1"/>
+          </p:cNvSpPr>
+          <p:nvPr>
+            <p:ph type="title"/>
+          </p:nvPr>
+        </p:nvSpPr>
+        <p:spPr>
+          <a:xfrm>
+            <a:off x="469786" y="295516"/>
+            <a:ext cx="8674214" cy="1018572"/>
+          </a:xfrm>
+        </p:spPr>
+        <p:txBody>
+          <a:bodyPr/>
+          <a:lstStyle/>
+          <a:p>
+            <a:r>
+              <a:rPr lang="en-US" dirty="0" smtClean="0"/>
+              <a:t>Step </a:t>
+            </a:r>
+            <a:r>
+              <a:rPr lang="ru-RU" dirty="0" smtClean="0"/>
+              <a:t>№2:</a:t>
+            </a:r>
+            <a:r>
+              <a:rPr lang="en-US" dirty="0" smtClean="0"/>
+              <a:t> Add it in your </a:t>
+            </a:r>
+            <a:r>
+              <a:rPr lang="en-US" dirty="0" err="1" smtClean="0"/>
+              <a:t>Program.cs</a:t>
+            </a:r>
+            <a:endParaRPr lang="uk-UA" dirty="0"/>
+          </a:p>
+        </p:txBody>
+      </p:sp>
+      <p:sp>
+        <p:nvSpPr>
+          <p:cNvPr id="5" name="TextBox 4"/>
+          <p:cNvSpPr txBox="1"/>
+          <p:nvPr/>
+        </p:nvSpPr>
+        <p:spPr>
+          <a:xfrm>
+            <a:off x="469786" y="1129422"/>
+            <a:ext cx="760144" cy="369332"/>
+          </a:xfrm>
+          <a:prstGeom prst="rect">
+            <a:avLst/>
+          </a:prstGeom>
+          <a:noFill/>
+        </p:spPr>
+        <p:txBody>
+          <a:bodyPr wrap="none" rtlCol="0">
+            <a:spAutoFit/>
+          </a:bodyPr>
+          <a:lstStyle/>
+          <a:p>
+            <a:r>
+              <a:rPr lang="en-US" dirty="0" smtClean="0">
+                <a:solidFill>
+                  <a:srgbClr val="000000"/>
+                </a:solidFill>
+              </a:rPr>
+              <a:t>After:</a:t>
+            </a:r>
+            <a:endParaRPr lang="en-US" dirty="0">
+              <a:solidFill>
+                <a:srgbClr val="000000"/>
+              </a:solidFill>
+            </a:endParaRPr>
+          </a:p>
+        </p:txBody>
+      </p:sp>
+      <p:pic>
+        <p:nvPicPr>
+          <p:cNvPr id="3" name="Рисунок 2"/>
+          <p:cNvPicPr>
+            <a:picLocks noChangeAspect="1"/>
+          </p:cNvPicPr>
+          <p:nvPr/>
+        </p:nvPicPr>
+        <p:blipFill>
+          <a:blip r:embed="rId3">
+            <a:extLst>
+              <a:ext uri="{28A0092B-C50C-407E-A947-70E740481C1C}">
+                <a14:useLocalDpi xmlns:a14="http://schemas.microsoft.com/office/drawing/2010/main" val="0"/>
+              </a:ext>
+            </a:extLst>
+          </a:blip>
+          <a:stretch>
+            <a:fillRect/>
+          </a:stretch>
+        </p:blipFill>
+        <p:spPr>
+          <a:xfrm>
+            <a:off x="469787" y="1498754"/>
+            <a:ext cx="8169956" cy="4544859"/>
+          </a:xfrm>
+          <a:prstGeom prst="rect">
+            <a:avLst/>
+          </a:prstGeom>
+        </p:spPr>
+      </p:pic>
+    </p:spTree>
+    <p:extLst>
+      <p:ext uri="{BB962C8B-B14F-4D97-AF65-F5344CB8AC3E}">
+        <p14:creationId xmlns:p14="http://schemas.microsoft.com/office/powerpoint/2010/main" val="3562925390"/>
+      </p:ext>
+    </p:extLst>
+  </p:cSld>
+  <p:clrMapOvr>
+    <a:masterClrMapping/>
+  </p:clrMapOvr>
+  <p:timing>
+    <p:tnLst>
+      <p:par>
+        <p:cTn id="1" dur="indefinite" restart="never" nodeType="tmRoot"/>
+      </p:par>
+    </p:tnLst>
+  </p:timing>
+</p:sld>
+</file>
+
+<file path=ppt/slides/slide15.xml><?xml version="1.0" encoding="utf-8"?>
+<p:sld xmlns:a="http://schemas.openxmlformats.org/drawingml/2006/main" xmlns:r="http://schemas.openxmlformats.org/officeDocument/2006/relationships" xmlns:p="http://schemas.openxmlformats.org/presentationml/2006/main">
+  <p:cSld>
+    <p:spTree>
+      <p:nvGrpSpPr>
+        <p:cNvPr id="1" name=""/>
+        <p:cNvGrpSpPr/>
+        <p:nvPr/>
+      </p:nvGrpSpPr>
+      <p:grpSpPr>
+        <a:xfrm>
+          <a:off x="0" y="0"/>
+          <a:ext cx="0" cy="0"/>
+          <a:chOff x="0" y="0"/>
+          <a:chExt cx="0" cy="0"/>
+        </a:xfrm>
+      </p:grpSpPr>
+      <p:sp>
+        <p:nvSpPr>
+          <p:cNvPr id="6" name="Заголовок 5"/>
+          <p:cNvSpPr>
+            <a:spLocks noGrp="1"/>
+          </p:cNvSpPr>
+          <p:nvPr>
+            <p:ph type="title"/>
+          </p:nvPr>
+        </p:nvSpPr>
+        <p:spPr>
+          <a:xfrm>
+            <a:off x="469786" y="295516"/>
+            <a:ext cx="8674214" cy="1018572"/>
+          </a:xfrm>
+        </p:spPr>
+        <p:txBody>
+          <a:bodyPr/>
+          <a:lstStyle/>
+          <a:p>
+            <a:r>
+              <a:rPr lang="en-US" dirty="0" smtClean="0"/>
+              <a:t>Step </a:t>
+            </a:r>
+            <a:r>
+              <a:rPr lang="ru-RU" dirty="0" smtClean="0"/>
+              <a:t>№2:</a:t>
+            </a:r>
+            <a:r>
+              <a:rPr lang="en-US" dirty="0" smtClean="0"/>
+              <a:t> Add it in your </a:t>
+            </a:r>
+            <a:r>
+              <a:rPr lang="en-US" dirty="0" err="1" smtClean="0"/>
+              <a:t>Program.cs</a:t>
+            </a:r>
+            <a:endParaRPr lang="uk-UA" dirty="0"/>
+          </a:p>
+        </p:txBody>
+      </p:sp>
+      <p:sp>
+        <p:nvSpPr>
+          <p:cNvPr id="5" name="TextBox 4"/>
+          <p:cNvSpPr txBox="1"/>
+          <p:nvPr/>
+        </p:nvSpPr>
+        <p:spPr>
+          <a:xfrm>
+            <a:off x="504258" y="1125267"/>
+            <a:ext cx="3917483" cy="369332"/>
+          </a:xfrm>
+          <a:prstGeom prst="rect">
+            <a:avLst/>
+          </a:prstGeom>
+          <a:noFill/>
+        </p:spPr>
+        <p:txBody>
+          <a:bodyPr wrap="none" rtlCol="0">
+            <a:spAutoFit/>
+          </a:bodyPr>
+          <a:lstStyle/>
+          <a:p>
+            <a:r>
+              <a:rPr lang="en-US" dirty="0" smtClean="0">
+                <a:solidFill>
+                  <a:srgbClr val="000000"/>
+                </a:solidFill>
+              </a:rPr>
+              <a:t>What you have to add for it to work:</a:t>
+            </a:r>
+            <a:endParaRPr lang="en-US" dirty="0">
+              <a:solidFill>
+                <a:srgbClr val="000000"/>
+              </a:solidFill>
+            </a:endParaRPr>
+          </a:p>
+        </p:txBody>
+      </p:sp>
+      <p:pic>
+        <p:nvPicPr>
+          <p:cNvPr id="2" name="Рисунок 1"/>
+          <p:cNvPicPr>
+            <a:picLocks noChangeAspect="1"/>
+          </p:cNvPicPr>
+          <p:nvPr/>
+        </p:nvPicPr>
+        <p:blipFill rotWithShape="1">
+          <a:blip r:embed="rId3">
+            <a:extLst>
+              <a:ext uri="{28A0092B-C50C-407E-A947-70E740481C1C}">
+                <a14:useLocalDpi xmlns:a14="http://schemas.microsoft.com/office/drawing/2010/main" val="0"/>
+              </a:ext>
+            </a:extLst>
+          </a:blip>
+          <a:srcRect t="39509" b="14463"/>
+          <a:stretch/>
+        </p:blipFill>
+        <p:spPr>
+          <a:xfrm>
+            <a:off x="5557699" y="6057901"/>
+            <a:ext cx="2429014" cy="545668"/>
+          </a:xfrm>
+          <a:prstGeom prst="rect">
+            <a:avLst/>
+          </a:prstGeom>
+        </p:spPr>
+      </p:pic>
+      <p:pic>
+        <p:nvPicPr>
+          <p:cNvPr id="4" name="Рисунок 3"/>
+          <p:cNvPicPr>
+            <a:picLocks noChangeAspect="1"/>
+          </p:cNvPicPr>
+          <p:nvPr/>
+        </p:nvPicPr>
+        <p:blipFill>
+          <a:blip r:embed="rId4">
+            <a:extLst>
+              <a:ext uri="{28A0092B-C50C-407E-A947-70E740481C1C}">
+                <a14:useLocalDpi xmlns:a14="http://schemas.microsoft.com/office/drawing/2010/main" val="0"/>
+              </a:ext>
+            </a:extLst>
+          </a:blip>
+          <a:stretch>
+            <a:fillRect/>
+          </a:stretch>
+        </p:blipFill>
+        <p:spPr>
+          <a:xfrm>
+            <a:off x="504257" y="1494599"/>
+            <a:ext cx="7482455" cy="4563302"/>
+          </a:xfrm>
+          <a:prstGeom prst="rect">
+            <a:avLst/>
+          </a:prstGeom>
+        </p:spPr>
+      </p:pic>
+    </p:spTree>
+    <p:extLst>
+      <p:ext uri="{BB962C8B-B14F-4D97-AF65-F5344CB8AC3E}">
+        <p14:creationId xmlns:p14="http://schemas.microsoft.com/office/powerpoint/2010/main" val="3844990056"/>
+      </p:ext>
+    </p:extLst>
+  </p:cSld>
+  <p:clrMapOvr>
+    <a:masterClrMapping/>
+  </p:clrMapOvr>
+  <p:timing>
+    <p:tnLst>
+      <p:par>
+        <p:cTn id="1" dur="indefinite" restart="never" nodeType="tmRoot"/>
+      </p:par>
+    </p:tnLst>
+  </p:timing>
+</p:sld>
+</file>
+
+<file path=ppt/slides/slide16.xml><?xml version="1.0" encoding="utf-8"?>
+<p:sld xmlns:a="http://schemas.openxmlformats.org/drawingml/2006/main" xmlns:r="http://schemas.openxmlformats.org/officeDocument/2006/relationships" xmlns:p="http://schemas.openxmlformats.org/presentationml/2006/main">
+  <p:cSld>
+    <p:spTree>
+      <p:nvGrpSpPr>
+        <p:cNvPr id="1" name=""/>
+        <p:cNvGrpSpPr/>
+        <p:nvPr/>
+      </p:nvGrpSpPr>
+      <p:grpSpPr>
+        <a:xfrm>
+          <a:off x="0" y="0"/>
+          <a:ext cx="0" cy="0"/>
+          <a:chOff x="0" y="0"/>
+          <a:chExt cx="0" cy="0"/>
+        </a:xfrm>
+      </p:grpSpPr>
+      <p:sp>
+        <p:nvSpPr>
+          <p:cNvPr id="6" name="Заголовок 5"/>
+          <p:cNvSpPr>
+            <a:spLocks noGrp="1"/>
+          </p:cNvSpPr>
+          <p:nvPr>
+            <p:ph type="title"/>
+          </p:nvPr>
+        </p:nvSpPr>
+        <p:spPr>
+          <a:xfrm>
+            <a:off x="469786" y="295516"/>
+            <a:ext cx="8674214" cy="1018572"/>
+          </a:xfrm>
+        </p:spPr>
+        <p:txBody>
+          <a:bodyPr/>
+          <a:lstStyle/>
+          <a:p>
+            <a:r>
+              <a:rPr lang="en-US" dirty="0" smtClean="0"/>
+              <a:t>Step </a:t>
+            </a:r>
+            <a:r>
+              <a:rPr lang="ru-RU" dirty="0" smtClean="0"/>
+              <a:t>№2:</a:t>
+            </a:r>
+            <a:r>
+              <a:rPr lang="en-US" dirty="0" smtClean="0"/>
+              <a:t> Add it in your </a:t>
+            </a:r>
+            <a:r>
+              <a:rPr lang="en-US" dirty="0" err="1" smtClean="0"/>
+              <a:t>Program.cs</a:t>
+            </a:r>
+            <a:endParaRPr lang="uk-UA" dirty="0"/>
+          </a:p>
+        </p:txBody>
+      </p:sp>
+      <p:sp>
+        <p:nvSpPr>
+          <p:cNvPr id="5" name="TextBox 4"/>
+          <p:cNvSpPr txBox="1"/>
+          <p:nvPr/>
+        </p:nvSpPr>
+        <p:spPr>
+          <a:xfrm>
+            <a:off x="469786" y="1129422"/>
+            <a:ext cx="2907463" cy="369332"/>
+          </a:xfrm>
+          <a:prstGeom prst="rect">
+            <a:avLst/>
+          </a:prstGeom>
+          <a:noFill/>
+        </p:spPr>
+        <p:txBody>
+          <a:bodyPr wrap="none" rtlCol="0">
+            <a:spAutoFit/>
+          </a:bodyPr>
+          <a:lstStyle/>
+          <a:p>
+            <a:r>
+              <a:rPr lang="en-US" dirty="0" smtClean="0">
+                <a:solidFill>
+                  <a:srgbClr val="000000"/>
+                </a:solidFill>
+              </a:rPr>
+              <a:t>This is to check if it works:</a:t>
+            </a:r>
+            <a:endParaRPr lang="en-US" dirty="0">
+              <a:solidFill>
+                <a:srgbClr val="000000"/>
+              </a:solidFill>
+            </a:endParaRPr>
+          </a:p>
+        </p:txBody>
+      </p:sp>
+      <p:pic>
+        <p:nvPicPr>
+          <p:cNvPr id="2" name="Рисунок 1"/>
+          <p:cNvPicPr>
+            <a:picLocks noChangeAspect="1"/>
+          </p:cNvPicPr>
+          <p:nvPr/>
+        </p:nvPicPr>
+        <p:blipFill>
+          <a:blip r:embed="rId3">
+            <a:extLst>
+              <a:ext uri="{28A0092B-C50C-407E-A947-70E740481C1C}">
+                <a14:useLocalDpi xmlns:a14="http://schemas.microsoft.com/office/drawing/2010/main" val="0"/>
+              </a:ext>
+            </a:extLst>
+          </a:blip>
+          <a:stretch>
+            <a:fillRect/>
+          </a:stretch>
+        </p:blipFill>
+        <p:spPr>
+          <a:xfrm>
+            <a:off x="469786" y="1498754"/>
+            <a:ext cx="7574077" cy="4530571"/>
+          </a:xfrm>
+          <a:prstGeom prst="rect">
+            <a:avLst/>
+          </a:prstGeom>
+        </p:spPr>
+      </p:pic>
+    </p:spTree>
+    <p:extLst>
+      <p:ext uri="{BB962C8B-B14F-4D97-AF65-F5344CB8AC3E}">
+        <p14:creationId xmlns:p14="http://schemas.microsoft.com/office/powerpoint/2010/main" val="3065211253"/>
+      </p:ext>
+    </p:extLst>
+  </p:cSld>
+  <p:clrMapOvr>
+    <a:masterClrMapping/>
+  </p:clrMapOvr>
+  <p:timing>
+    <p:tnLst>
+      <p:par>
+        <p:cTn id="1" dur="indefinite" restart="never" nodeType="tmRoot"/>
+      </p:par>
+    </p:tnLst>
+  </p:timing>
+</p:sld>
+</file>
+
+<file path=ppt/slides/slide17.xml><?xml version="1.0" encoding="utf-8"?>
+<p:sld xmlns:a="http://schemas.openxmlformats.org/drawingml/2006/main" xmlns:r="http://schemas.openxmlformats.org/officeDocument/2006/relationships" xmlns:p="http://schemas.openxmlformats.org/presentationml/2006/main">
+  <p:cSld>
+    <p:spTree>
+      <p:nvGrpSpPr>
+        <p:cNvPr id="1" name=""/>
+        <p:cNvGrpSpPr/>
+        <p:nvPr/>
+      </p:nvGrpSpPr>
+      <p:grpSpPr>
+        <a:xfrm>
+          <a:off x="0" y="0"/>
+          <a:ext cx="0" cy="0"/>
+          <a:chOff x="0" y="0"/>
+          <a:chExt cx="0" cy="0"/>
+        </a:xfrm>
+      </p:grpSpPr>
+      <p:sp>
+        <p:nvSpPr>
+          <p:cNvPr id="6" name="Заголовок 5"/>
+          <p:cNvSpPr>
+            <a:spLocks noGrp="1"/>
+          </p:cNvSpPr>
+          <p:nvPr>
+            <p:ph type="title"/>
+          </p:nvPr>
+        </p:nvSpPr>
+        <p:spPr>
+          <a:xfrm>
+            <a:off x="469786" y="295516"/>
+            <a:ext cx="8674214" cy="1018572"/>
+          </a:xfrm>
+        </p:spPr>
+        <p:txBody>
+          <a:bodyPr/>
+          <a:lstStyle/>
+          <a:p>
+            <a:r>
+              <a:rPr lang="en-US" dirty="0" smtClean="0"/>
+              <a:t>Step </a:t>
+            </a:r>
+            <a:r>
+              <a:rPr lang="ru-RU" dirty="0" smtClean="0"/>
+              <a:t>№</a:t>
+            </a:r>
+            <a:r>
+              <a:rPr lang="en-US" dirty="0" smtClean="0"/>
+              <a:t>3</a:t>
+            </a:r>
+            <a:r>
+              <a:rPr lang="ru-RU" dirty="0" smtClean="0"/>
+              <a:t>:</a:t>
+            </a:r>
+            <a:r>
+              <a:rPr lang="en-US" dirty="0" smtClean="0"/>
+              <a:t> Enjoy</a:t>
+            </a:r>
+            <a:endParaRPr lang="uk-UA" dirty="0"/>
+          </a:p>
+        </p:txBody>
+      </p:sp>
+      <p:sp>
+        <p:nvSpPr>
+          <p:cNvPr id="5" name="TextBox 4"/>
+          <p:cNvSpPr txBox="1"/>
+          <p:nvPr/>
+        </p:nvSpPr>
+        <p:spPr>
+          <a:xfrm>
+            <a:off x="469786" y="1129422"/>
+            <a:ext cx="1331262" cy="369332"/>
+          </a:xfrm>
+          <a:prstGeom prst="rect">
+            <a:avLst/>
+          </a:prstGeom>
+          <a:noFill/>
+        </p:spPr>
+        <p:txBody>
+          <a:bodyPr wrap="none" rtlCol="0">
+            <a:spAutoFit/>
+          </a:bodyPr>
+          <a:lstStyle/>
+          <a:p>
+            <a:r>
+              <a:rPr lang="en-US" dirty="0" smtClean="0">
+                <a:solidFill>
+                  <a:srgbClr val="000000"/>
+                </a:solidFill>
+              </a:rPr>
+              <a:t>And it does</a:t>
+            </a:r>
+            <a:endParaRPr lang="en-US" dirty="0">
+              <a:solidFill>
+                <a:srgbClr val="000000"/>
+              </a:solidFill>
+            </a:endParaRPr>
+          </a:p>
+        </p:txBody>
+      </p:sp>
+      <p:pic>
+        <p:nvPicPr>
+          <p:cNvPr id="3" name="Рисунок 2"/>
+          <p:cNvPicPr>
+            <a:picLocks noChangeAspect="1"/>
+          </p:cNvPicPr>
+          <p:nvPr/>
+        </p:nvPicPr>
+        <p:blipFill>
+          <a:blip r:embed="rId3">
+            <a:extLst>
+              <a:ext uri="{28A0092B-C50C-407E-A947-70E740481C1C}">
+                <a14:useLocalDpi xmlns:a14="http://schemas.microsoft.com/office/drawing/2010/main" val="0"/>
+              </a:ext>
+            </a:extLst>
+          </a:blip>
+          <a:stretch>
+            <a:fillRect/>
+          </a:stretch>
+        </p:blipFill>
+        <p:spPr>
+          <a:xfrm>
+            <a:off x="169747" y="2613179"/>
+            <a:ext cx="8797959" cy="2015971"/>
+          </a:xfrm>
+          <a:prstGeom prst="rect">
+            <a:avLst/>
+          </a:prstGeom>
+        </p:spPr>
+      </p:pic>
+    </p:spTree>
+    <p:extLst>
+      <p:ext uri="{BB962C8B-B14F-4D97-AF65-F5344CB8AC3E}">
+        <p14:creationId xmlns:p14="http://schemas.microsoft.com/office/powerpoint/2010/main" val="1252554627"/>
+      </p:ext>
+    </p:extLst>
+  </p:cSld>
+  <p:clrMapOvr>
+    <a:masterClrMapping/>
+  </p:clrMapOvr>
+  <p:timing>
+    <p:tnLst>
+      <p:par>
+        <p:cTn id="1" dur="indefinite" restart="never" nodeType="tmRoot"/>
+      </p:par>
+    </p:tnLst>
+  </p:timing>
+</p:sld>
+</file>
+
+<file path=ppt/slides/slide18.xml><?xml version="1.0" encoding="utf-8"?>
+<p:sld xmlns:a="http://schemas.openxmlformats.org/drawingml/2006/main" xmlns:r="http://schemas.openxmlformats.org/officeDocument/2006/relationships" xmlns:p="http://schemas.openxmlformats.org/presentationml/2006/main">
+  <p:cSld>
+    <p:spTree>
+      <p:nvGrpSpPr>
+        <p:cNvPr id="1" name=""/>
+        <p:cNvGrpSpPr/>
+        <p:nvPr/>
+      </p:nvGrpSpPr>
+      <p:grpSpPr>
+        <a:xfrm>
+          <a:off x="0" y="0"/>
+          <a:ext cx="0" cy="0"/>
+          <a:chOff x="0" y="0"/>
+          <a:chExt cx="0" cy="0"/>
+        </a:xfrm>
+      </p:grpSpPr>
+      <p:sp>
+        <p:nvSpPr>
           <p:cNvPr id="2" name="Заголовок 1"/>
           <p:cNvSpPr>
             <a:spLocks noGrp="1"/>
@@ -6124,16 +7914,87 @@
             <p:ph type="title"/>
           </p:nvPr>
         </p:nvSpPr>
-        <p:spPr/>
-        <p:txBody>
-          <a:bodyPr/>
+        <p:spPr>
+          <a:xfrm>
+            <a:off x="951545" y="1200150"/>
+            <a:ext cx="7412652" cy="3686175"/>
+          </a:xfrm>
+        </p:spPr>
+        <p:txBody>
+          <a:bodyPr>
+            <a:normAutofit/>
+          </a:bodyPr>
           <a:lstStyle/>
           <a:p>
             <a:r>
+              <a:rPr lang="en-US" sz="4900" dirty="0" smtClean="0"/>
+              <a:t>That’s about it for now</a:t>
+            </a:r>
+            <a:r>
+              <a:rPr lang="en-US" sz="4900" dirty="0" smtClean="0"/>
+              <a:t>!</a:t>
+            </a:r>
+            <a:br>
+              <a:rPr lang="en-US" sz="4900" dirty="0" smtClean="0"/>
+            </a:br>
+            <a:r>
+              <a:rPr lang="en-US" sz="4900" dirty="0" smtClean="0"/>
+              <a:t/>
+            </a:r>
+            <a:br>
+              <a:rPr lang="en-US" sz="4900" dirty="0" smtClean="0"/>
+            </a:br>
+            <a:r>
               <a:rPr lang="en-US" dirty="0" smtClean="0"/>
-              <a:t>That’s about it for now!</a:t>
-            </a:r>
-            <a:endParaRPr lang="uk-UA" dirty="0"/>
+              <a:t/>
+            </a:r>
+            <a:br>
+              <a:rPr lang="en-US" dirty="0" smtClean="0"/>
+            </a:br>
+            <a:r>
+              <a:rPr lang="en-US" sz="1600" dirty="0" smtClean="0"/>
+              <a:t/>
+            </a:r>
+            <a:br>
+              <a:rPr lang="en-US" sz="1600" dirty="0" smtClean="0"/>
+            </a:br>
+            <a:r>
+              <a:rPr lang="en-US" sz="1400" dirty="0" err="1" smtClean="0"/>
+              <a:t>Refferences</a:t>
+            </a:r>
+            <a:r>
+              <a:rPr lang="en-US" sz="1400" dirty="0"/>
+              <a:t>:</a:t>
+            </a:r>
+            <a:br>
+              <a:rPr lang="en-US" sz="1400" dirty="0"/>
+            </a:br>
+            <a:r>
+              <a:rPr lang="en-US" sz="1400" dirty="0"/>
+              <a:t>https://nblumhardt.com/2017/08/use-serilog/</a:t>
+            </a:r>
+            <a:br>
+              <a:rPr lang="en-US" sz="1400" dirty="0"/>
+            </a:br>
+            <a:r>
+              <a:rPr lang="en-US" sz="1400" dirty="0"/>
+              <a:t>https://www.darylcumbo.net/serilog-vs-nlog-benchmarks/</a:t>
+            </a:r>
+            <a:br>
+              <a:rPr lang="en-US" sz="1400" dirty="0"/>
+            </a:br>
+            <a:r>
+              <a:rPr lang="en-US" sz="1400" dirty="0"/>
+              <a:t>https://www.darylcumbo.net/structured-logging/</a:t>
+            </a:r>
+            <a:br>
+              <a:rPr lang="en-US" sz="1400" dirty="0"/>
+            </a:br>
+            <a:r>
+              <a:rPr lang="en-US" sz="1400" dirty="0"/>
+              <a:t>https://stackify.com/asp-net-core-logging-what-changed/</a:t>
+            </a:r>
+            <a:endParaRPr lang="uk-UA" sz="1400" dirty="0"/>
           </a:p>
         </p:txBody>
       </p:sp>
@@ -6957,7 +8818,7 @@
         <p:spPr>
           <a:xfrm>
             <a:off x="292789" y="1362622"/>
-            <a:ext cx="8608143" cy="2554545"/>
+            <a:ext cx="8608143" cy="3539430"/>
           </a:xfrm>
           <a:prstGeom prst="rect">
             <a:avLst/>
@@ -6986,8 +8847,34 @@
           </a:p>
           <a:p>
             <a:r>
+              <a:rPr lang="en-US" sz="3200" dirty="0"/>
+              <a:t>- </a:t>
+            </a:r>
+            <a:r>
               <a:rPr lang="en-US" sz="3200" dirty="0" smtClean="0"/>
-              <a:t>- log4net</a:t>
+              <a:t>Log4net</a:t>
+            </a:r>
+            <a:endParaRPr lang="ru-RU" sz="3200" dirty="0"/>
+          </a:p>
+          <a:p>
+            <a:r>
+              <a:rPr lang="ru-RU" sz="3200" dirty="0"/>
+              <a:t>- </a:t>
+            </a:r>
+            <a:r>
+              <a:rPr lang="en-US" sz="3200" dirty="0" err="1" smtClean="0"/>
+              <a:t>NLog</a:t>
+            </a:r>
+            <a:endParaRPr lang="en-US" sz="3200" dirty="0"/>
+          </a:p>
+          <a:p>
+            <a:r>
+              <a:rPr lang="en-US" sz="3200" dirty="0"/>
+              <a:t>- </a:t>
+            </a:r>
+            <a:r>
+              <a:rPr lang="en-US" sz="3200" dirty="0" err="1" smtClean="0"/>
+              <a:t>Serilog</a:t>
             </a:r>
             <a:endParaRPr lang="en-US" sz="3200" dirty="0"/>
           </a:p>
@@ -7014,7 +8901,7 @@
         </p:blipFill>
         <p:spPr>
           <a:xfrm>
-            <a:off x="281214" y="5343524"/>
+            <a:off x="281214" y="5443537"/>
             <a:ext cx="8382000" cy="1414463"/>
           </a:xfrm>
           <a:prstGeom prst="rect">
@@ -7024,7 +8911,7 @@
       </p:pic>
       <p:pic>
         <p:nvPicPr>
-          <p:cNvPr id="4" name="Рисунок 3"/>
+          <p:cNvPr id="5" name="Рисунок 4"/>
           <p:cNvPicPr>
             <a:picLocks noChangeAspect="1"/>
           </p:cNvPicPr>
@@ -7044,8 +8931,37 @@
         </p:blipFill>
         <p:spPr>
           <a:xfrm>
-            <a:off x="4586288" y="1852612"/>
-            <a:ext cx="4105727" cy="3810000"/>
+            <a:off x="6482486" y="3626489"/>
+            <a:ext cx="1899142" cy="1899142"/>
+          </a:xfrm>
+          <a:prstGeom prst="rect">
+            <a:avLst/>
+          </a:prstGeom>
+        </p:spPr>
+      </p:pic>
+      <p:pic>
+        <p:nvPicPr>
+          <p:cNvPr id="6" name="Рисунок 5"/>
+          <p:cNvPicPr>
+            <a:picLocks noChangeAspect="1"/>
+          </p:cNvPicPr>
+          <p:nvPr/>
+        </p:nvPicPr>
+        <p:blipFill rotWithShape="1">
+          <a:blip r:embed="rId5">
+            <a:extLst>
+              <a:ext uri="{28A0092B-C50C-407E-A947-70E740481C1C}">
+                <a14:useLocalDpi xmlns:a14="http://schemas.microsoft.com/office/drawing/2010/main" val="0"/>
+              </a:ext>
+            </a:extLst>
+          </a:blip>
+          <a:srcRect r="53761"/>
+          <a:stretch/>
+        </p:blipFill>
+        <p:spPr>
+          <a:xfrm>
+            <a:off x="5481506" y="1904108"/>
+            <a:ext cx="3600209" cy="1725312"/>
           </a:xfrm>
           <a:prstGeom prst="rect">
             <a:avLst/>
@@ -7244,7 +9160,7 @@
           <a:p>
             <a:r>
               <a:rPr lang="en-US" dirty="0" smtClean="0"/>
-              <a:t>Setting up</a:t>
+              <a:t>log4net</a:t>
             </a:r>
             <a:endParaRPr lang="uk-UA" dirty="0"/>
           </a:p>
@@ -7252,14 +9168,14 @@
       </p:sp>
       <p:sp>
         <p:nvSpPr>
-          <p:cNvPr id="2" name="TextBox 1"/>
+          <p:cNvPr id="7" name="TextBox 6"/>
           <p:cNvSpPr txBox="1"/>
           <p:nvPr/>
         </p:nvSpPr>
         <p:spPr>
           <a:xfrm>
-            <a:off x="469786" y="1314088"/>
-            <a:ext cx="1959639" cy="369332"/>
+            <a:off x="469786" y="1313726"/>
+            <a:ext cx="7968079" cy="369332"/>
           </a:xfrm>
           <a:prstGeom prst="rect">
             <a:avLst/>
@@ -7273,16 +9189,19 @@
           <a:lstStyle/>
           <a:p>
             <a:r>
-              <a:rPr lang="en-US" dirty="0" smtClean="0"/>
-              <a:t>As easy as it gets</a:t>
-            </a:r>
-            <a:endParaRPr lang="en-US" dirty="0"/>
+              <a:rPr lang="en-US" dirty="0" smtClean="0">
+                <a:solidFill>
+                  <a:srgbClr val="000000"/>
+                </a:solidFill>
+              </a:rPr>
+              <a:t>More general logging app, commonly used for logging desktop applications.</a:t>
+            </a:r>
           </a:p>
         </p:txBody>
       </p:sp>
       <p:pic>
         <p:nvPicPr>
-          <p:cNvPr id="3" name="Рисунок 2"/>
+          <p:cNvPr id="2" name="Рисунок 1"/>
           <p:cNvPicPr>
             <a:picLocks noChangeAspect="1"/>
           </p:cNvPicPr>
@@ -7302,8 +9221,8 @@
         </p:blipFill>
         <p:spPr>
           <a:xfrm>
-            <a:off x="469786" y="1683420"/>
-            <a:ext cx="6673964" cy="4124901"/>
+            <a:off x="1038262" y="1683058"/>
+            <a:ext cx="6977026" cy="4217274"/>
           </a:xfrm>
           <a:prstGeom prst="rect">
             <a:avLst/>
@@ -7313,7 +9232,7 @@
     </p:spTree>
     <p:extLst>
       <p:ext uri="{BB962C8B-B14F-4D97-AF65-F5344CB8AC3E}">
-        <p14:creationId xmlns:p14="http://schemas.microsoft.com/office/powerpoint/2010/main" val="294521898"/>
+        <p14:creationId xmlns:p14="http://schemas.microsoft.com/office/powerpoint/2010/main" val="1438844777"/>
       </p:ext>
     </p:extLst>
   </p:cSld>
@@ -7368,8 +9287,8 @@
           <a:lstStyle/>
           <a:p>
             <a:r>
-              <a:rPr lang="en-US" dirty="0" smtClean="0"/>
-              <a:t>Some extra features</a:t>
+              <a:rPr lang="en-US" dirty="0" err="1" smtClean="0"/>
+              <a:t>NLog</a:t>
             </a:r>
             <a:endParaRPr lang="uk-UA" dirty="0"/>
           </a:p>
@@ -7383,8 +9302,8 @@
         </p:nvSpPr>
         <p:spPr>
           <a:xfrm>
-            <a:off x="469786" y="1314088"/>
-            <a:ext cx="2390270" cy="369332"/>
+            <a:off x="469786" y="1313726"/>
+            <a:ext cx="4976619" cy="369332"/>
           </a:xfrm>
           <a:prstGeom prst="rect">
             <a:avLst/>
@@ -7398,14 +9317,22 @@
           <a:lstStyle/>
           <a:p>
             <a:r>
+              <a:rPr lang="en-US" dirty="0" err="1" smtClean="0">
+                <a:solidFill>
+                  <a:srgbClr val="000000"/>
+                </a:solidFill>
+              </a:rPr>
+              <a:t>.Net</a:t>
+            </a:r>
+            <a:r>
               <a:rPr lang="en-US" dirty="0" smtClean="0">
                 <a:solidFill>
                   <a:srgbClr val="000000"/>
                 </a:solidFill>
               </a:rPr>
-              <a:t>It’s all about statistics</a:t>
-            </a:r>
-            <a:endParaRPr lang="en-US" dirty="0">
+              <a:t> Error logging library with various features </a:t>
+            </a:r>
+            <a:endParaRPr lang="en-US" dirty="0" smtClean="0">
               <a:solidFill>
                 <a:srgbClr val="000000"/>
               </a:solidFill>
@@ -7415,7 +9342,7 @@
       </p:sp>
       <p:pic>
         <p:nvPicPr>
-          <p:cNvPr id="2" name="Рисунок 1"/>
+          <p:cNvPr id="3" name="Рисунок 2"/>
           <p:cNvPicPr>
             <a:picLocks noChangeAspect="1"/>
           </p:cNvPicPr>
@@ -7435,8 +9362,37 @@
         </p:blipFill>
         <p:spPr>
           <a:xfrm>
-            <a:off x="1312748" y="1683420"/>
-            <a:ext cx="6988289" cy="4463321"/>
+            <a:off x="469786" y="1683058"/>
+            <a:ext cx="7810500" cy="2343150"/>
+          </a:xfrm>
+          <a:prstGeom prst="rect">
+            <a:avLst/>
+          </a:prstGeom>
+        </p:spPr>
+      </p:pic>
+      <p:pic>
+        <p:nvPicPr>
+          <p:cNvPr id="4" name="Рисунок 3"/>
+          <p:cNvPicPr>
+            <a:picLocks noChangeAspect="1"/>
+          </p:cNvPicPr>
+          <p:nvPr/>
+        </p:nvPicPr>
+        <p:blipFill rotWithShape="1">
+          <a:blip r:embed="rId4">
+            <a:extLst>
+              <a:ext uri="{28A0092B-C50C-407E-A947-70E740481C1C}">
+                <a14:useLocalDpi xmlns:a14="http://schemas.microsoft.com/office/drawing/2010/main" val="0"/>
+              </a:ext>
+            </a:extLst>
+          </a:blip>
+          <a:srcRect r="79825"/>
+          <a:stretch/>
+        </p:blipFill>
+        <p:spPr>
+          <a:xfrm>
+            <a:off x="7132972" y="4040495"/>
+            <a:ext cx="1147314" cy="1260168"/>
           </a:xfrm>
           <a:prstGeom prst="rect">
             <a:avLst/>
@@ -7446,7 +9402,7 @@
     </p:spTree>
     <p:extLst>
       <p:ext uri="{BB962C8B-B14F-4D97-AF65-F5344CB8AC3E}">
-        <p14:creationId xmlns:p14="http://schemas.microsoft.com/office/powerpoint/2010/main" val="212547049"/>
+        <p14:creationId xmlns:p14="http://schemas.microsoft.com/office/powerpoint/2010/main" val="2034125144"/>
       </p:ext>
     </p:extLst>
   </p:cSld>

</xml_diff>

<commit_message>
"EH in ASP.Net Core" Presentation final draft
or "Serilog for dummies"
</commit_message>
<xml_diff>
--- a/education/Exception_Handling_In_Core_Puhach_Ivan.pptx
+++ b/education/Exception_Handling_In_Core_Puhach_Ivan.pptx
@@ -7,10 +7,10 @@
     <p:sldMasterId id="2147483686" r:id="rId3"/>
   </p:sldMasterIdLst>
   <p:notesMasterIdLst>
-    <p:notesMasterId r:id="rId22"/>
+    <p:notesMasterId r:id="rId23"/>
   </p:notesMasterIdLst>
   <p:handoutMasterIdLst>
-    <p:handoutMasterId r:id="rId23"/>
+    <p:handoutMasterId r:id="rId24"/>
   </p:handoutMasterIdLst>
   <p:sldIdLst>
     <p:sldId id="287" r:id="rId4"/>
@@ -30,7 +30,8 @@
     <p:sldId id="295" r:id="rId18"/>
     <p:sldId id="296" r:id="rId19"/>
     <p:sldId id="298" r:id="rId20"/>
-    <p:sldId id="262" r:id="rId21"/>
+    <p:sldId id="299" r:id="rId21"/>
+    <p:sldId id="262" r:id="rId22"/>
   </p:sldIdLst>
   <p:sldSz cx="9144000" cy="6858000" type="screen4x3"/>
   <p:notesSz cx="6858000" cy="9144000"/>
@@ -1298,6 +1299,90 @@
 </p:notes>
 </file>
 
+<file path=ppt/notesSlides/notesSlide16.xml><?xml version="1.0" encoding="utf-8"?>
+<p:notes xmlns:a="http://schemas.openxmlformats.org/drawingml/2006/main" xmlns:r="http://schemas.openxmlformats.org/officeDocument/2006/relationships" xmlns:p="http://schemas.openxmlformats.org/presentationml/2006/main">
+  <p:cSld>
+    <p:spTree>
+      <p:nvGrpSpPr>
+        <p:cNvPr id="1" name=""/>
+        <p:cNvGrpSpPr/>
+        <p:nvPr/>
+      </p:nvGrpSpPr>
+      <p:grpSpPr>
+        <a:xfrm>
+          <a:off x="0" y="0"/>
+          <a:ext cx="0" cy="0"/>
+          <a:chOff x="0" y="0"/>
+          <a:chExt cx="0" cy="0"/>
+        </a:xfrm>
+      </p:grpSpPr>
+      <p:sp>
+        <p:nvSpPr>
+          <p:cNvPr id="2" name="Образ слайда 1"/>
+          <p:cNvSpPr>
+            <a:spLocks noGrp="1" noRot="1" noChangeAspect="1"/>
+          </p:cNvSpPr>
+          <p:nvPr>
+            <p:ph type="sldImg"/>
+          </p:nvPr>
+        </p:nvSpPr>
+        <p:spPr/>
+      </p:sp>
+      <p:sp>
+        <p:nvSpPr>
+          <p:cNvPr id="3" name="Заметки 2"/>
+          <p:cNvSpPr>
+            <a:spLocks noGrp="1"/>
+          </p:cNvSpPr>
+          <p:nvPr>
+            <p:ph type="body" idx="1"/>
+          </p:nvPr>
+        </p:nvSpPr>
+        <p:spPr/>
+        <p:txBody>
+          <a:bodyPr/>
+          <a:lstStyle/>
+          <a:p>
+            <a:endParaRPr lang="en-US" dirty="0"/>
+          </a:p>
+        </p:txBody>
+      </p:sp>
+      <p:sp>
+        <p:nvSpPr>
+          <p:cNvPr id="4" name="Номер слайда 3"/>
+          <p:cNvSpPr>
+            <a:spLocks noGrp="1"/>
+          </p:cNvSpPr>
+          <p:nvPr>
+            <p:ph type="sldNum" sz="quarter" idx="10"/>
+          </p:nvPr>
+        </p:nvSpPr>
+        <p:spPr/>
+        <p:txBody>
+          <a:bodyPr/>
+          <a:lstStyle/>
+          <a:p>
+            <a:fld id="{26F4D375-ABE6-4939-A45D-A523BC6E81D7}" type="slidenum">
+              <a:rPr lang="en-US" smtClean="0"/>
+              <a:t>18</a:t>
+            </a:fld>
+            <a:endParaRPr lang="en-US"/>
+          </a:p>
+        </p:txBody>
+      </p:sp>
+    </p:spTree>
+    <p:extLst>
+      <p:ext uri="{BB962C8B-B14F-4D97-AF65-F5344CB8AC3E}">
+        <p14:creationId xmlns:p14="http://schemas.microsoft.com/office/powerpoint/2010/main" val="912214361"/>
+      </p:ext>
+    </p:extLst>
+  </p:cSld>
+  <p:clrMapOvr>
+    <a:masterClrMapping/>
+  </p:clrMapOvr>
+</p:notes>
+</file>
+
 <file path=ppt/notesSlides/notesSlide2.xml><?xml version="1.0" encoding="utf-8"?>
 <p:notes xmlns:a="http://schemas.openxmlformats.org/drawingml/2006/main" xmlns:r="http://schemas.openxmlformats.org/officeDocument/2006/relationships" xmlns:p="http://schemas.openxmlformats.org/presentationml/2006/main">
   <p:cSld>
@@ -1704,19 +1789,7 @@
                 <a:ea typeface="+mn-ea"/>
                 <a:cs typeface="+mn-cs"/>
               </a:rPr>
-              <a:t> web application, or even all ASP.NET web applications on a machine, without any need for re-compilation or re-deployment</a:t>
-            </a:r>
-            <a:r>
-              <a:rPr lang="en-US" sz="1200" b="0" i="0" kern="1200" dirty="0" smtClean="0">
-                <a:solidFill>
-                  <a:schemeClr val="tx1"/>
-                </a:solidFill>
-                <a:effectLst/>
-                <a:latin typeface="+mn-lt"/>
-                <a:ea typeface="+mn-ea"/>
-                <a:cs typeface="+mn-cs"/>
-              </a:rPr>
-              <a:t>.</a:t>
+              <a:t> web application, or even all ASP.NET web applications on a machine, without any need for re-compilation or re-deployment.</a:t>
             </a:r>
           </a:p>
           <a:p>
@@ -6601,11 +6674,6 @@
               </a:rPr>
               <a:t> error logging library</a:t>
             </a:r>
-            <a:endParaRPr lang="en-US" dirty="0" smtClean="0">
-              <a:solidFill>
-                <a:srgbClr val="000000"/>
-              </a:solidFill>
-            </a:endParaRPr>
           </a:p>
         </p:txBody>
       </p:sp>
@@ -6813,7 +6881,7 @@
         <p:spPr>
           <a:xfrm>
             <a:off x="358319" y="1699850"/>
-            <a:ext cx="3395610" cy="369332"/>
+            <a:ext cx="6765057" cy="369332"/>
           </a:xfrm>
           <a:prstGeom prst="rect">
             <a:avLst/>
@@ -6864,7 +6932,15 @@
                   <a:srgbClr val="000000"/>
                 </a:solidFill>
               </a:rPr>
-              <a:t>Add it in </a:t>
+              <a:t>Initialize it </a:t>
+            </a:r>
+            <a:r>
+              <a:rPr lang="en-US" dirty="0" smtClean="0">
+                <a:solidFill>
+                  <a:srgbClr val="000000"/>
+                </a:solidFill>
+              </a:rPr>
+              <a:t>in </a:t>
             </a:r>
             <a:r>
               <a:rPr lang="en-US" dirty="0" err="1" smtClean="0">
@@ -6880,11 +6956,43 @@
                   <a:srgbClr val="000000"/>
                 </a:solidFill>
               </a:rPr>
-              <a:t>;</a:t>
+              <a:t>; </a:t>
+            </a:r>
+            <a:r>
+              <a:rPr lang="en-US" dirty="0" smtClean="0">
+                <a:solidFill>
+                  <a:schemeClr val="bg1">
+                    <a:lumMod val="75000"/>
+                  </a:schemeClr>
+                </a:solidFill>
+              </a:rPr>
+              <a:t>*be careful with </a:t>
+            </a:r>
+            <a:r>
+              <a:rPr lang="en-US" dirty="0" err="1">
+                <a:solidFill>
+                  <a:schemeClr val="bg1">
+                    <a:lumMod val="75000"/>
+                  </a:schemeClr>
+                </a:solidFill>
+              </a:rPr>
+              <a:t>P</a:t>
+            </a:r>
+            <a:r>
+              <a:rPr lang="en-US" dirty="0" err="1" smtClean="0">
+                <a:solidFill>
+                  <a:schemeClr val="bg1">
+                    <a:lumMod val="75000"/>
+                  </a:schemeClr>
+                </a:solidFill>
+              </a:rPr>
+              <a:t>rogram.cs</a:t>
             </a:r>
             <a:endParaRPr lang="en-US" dirty="0">
               <a:solidFill>
-                <a:srgbClr val="000000"/>
+                <a:schemeClr val="bg1">
+                  <a:lumMod val="75000"/>
+                </a:schemeClr>
               </a:solidFill>
             </a:endParaRPr>
           </a:p>
@@ -7167,22 +7275,66 @@
           <a:lstStyle/>
           <a:p>
             <a:r>
-              <a:rPr lang="en-US" dirty="0" smtClean="0"/>
+              <a:rPr lang="en-US" dirty="0" smtClean="0">
+                <a:solidFill>
+                  <a:srgbClr val="171B65"/>
+                </a:solidFill>
+              </a:rPr>
               <a:t>Step </a:t>
             </a:r>
             <a:r>
-              <a:rPr lang="ru-RU" dirty="0" smtClean="0"/>
+              <a:rPr lang="ru-RU" dirty="0" smtClean="0">
+                <a:solidFill>
+                  <a:srgbClr val="171B65"/>
+                </a:solidFill>
+              </a:rPr>
               <a:t>№2:</a:t>
             </a:r>
             <a:r>
-              <a:rPr lang="en-US" dirty="0" smtClean="0"/>
-              <a:t> Add it in your </a:t>
-            </a:r>
-            <a:r>
-              <a:rPr lang="en-US" dirty="0" err="1" smtClean="0"/>
+              <a:rPr lang="en-US" dirty="0" smtClean="0">
+                <a:solidFill>
+                  <a:srgbClr val="171B65"/>
+                </a:solidFill>
+              </a:rPr>
+              <a:t> </a:t>
+            </a:r>
+            <a:r>
+              <a:rPr lang="en-US" dirty="0">
+                <a:solidFill>
+                  <a:srgbClr val="171B65"/>
+                </a:solidFill>
+              </a:rPr>
+              <a:t>Initialize</a:t>
+            </a:r>
+            <a:r>
+              <a:rPr lang="en-US" dirty="0" smtClean="0">
+                <a:solidFill>
+                  <a:srgbClr val="171B65"/>
+                </a:solidFill>
+              </a:rPr>
+              <a:t> </a:t>
+            </a:r>
+            <a:r>
+              <a:rPr lang="en-US" dirty="0" smtClean="0">
+                <a:solidFill>
+                  <a:srgbClr val="171B65"/>
+                </a:solidFill>
+              </a:rPr>
+              <a:t>it in </a:t>
+            </a:r>
+            <a:r>
+              <a:rPr lang="en-US" dirty="0" err="1" smtClean="0">
+                <a:solidFill>
+                  <a:srgbClr val="171B65"/>
+                </a:solidFill>
+              </a:rPr>
               <a:t>Program.cs</a:t>
             </a:r>
-            <a:endParaRPr lang="uk-UA" dirty="0"/>
+            <a:endParaRPr lang="uk-UA" dirty="0">
+              <a:solidFill>
+                <a:srgbClr val="171B65"/>
+              </a:solidFill>
+            </a:endParaRPr>
           </a:p>
         </p:txBody>
       </p:sp>
@@ -7208,8 +7360,8 @@
         </p:blipFill>
         <p:spPr>
           <a:xfrm>
-            <a:off x="469785" y="1498753"/>
-            <a:ext cx="8085274" cy="4273397"/>
+            <a:off x="469786" y="1498754"/>
+            <a:ext cx="3738531" cy="1975966"/>
           </a:xfrm>
           <a:prstGeom prst="rect">
             <a:avLst/>
@@ -7321,7 +7473,23 @@
             </a:r>
             <a:r>
               <a:rPr lang="en-US" dirty="0" smtClean="0"/>
-              <a:t> Add it in your </a:t>
+              <a:t> </a:t>
+            </a:r>
+            <a:r>
+              <a:rPr lang="en-US" dirty="0">
+                <a:solidFill>
+                  <a:srgbClr val="171B65"/>
+                </a:solidFill>
+              </a:rPr>
+              <a:t>Initialize</a:t>
+            </a:r>
+            <a:r>
+              <a:rPr lang="en-US" dirty="0" smtClean="0"/>
+              <a:t> </a:t>
+            </a:r>
+            <a:r>
+              <a:rPr lang="en-US" dirty="0" smtClean="0"/>
+              <a:t>it in </a:t>
             </a:r>
             <a:r>
               <a:rPr lang="en-US" dirty="0" err="1" smtClean="0"/>
@@ -7377,7 +7545,7 @@
           </p:cNvPicPr>
           <p:nvPr/>
         </p:nvPicPr>
-        <p:blipFill>
+        <p:blipFill rotWithShape="1">
           <a:blip r:embed="rId3">
             <a:extLst>
               <a:ext uri="{28A0092B-C50C-407E-A947-70E740481C1C}">
@@ -7385,14 +7553,13 @@
               </a:ext>
             </a:extLst>
           </a:blip>
-          <a:stretch>
-            <a:fillRect/>
-          </a:stretch>
+          <a:srcRect t="2233" b="1027"/>
+          <a:stretch/>
         </p:blipFill>
         <p:spPr>
           <a:xfrm>
-            <a:off x="469787" y="1498754"/>
-            <a:ext cx="8169956" cy="4544859"/>
+            <a:off x="469786" y="1498754"/>
+            <a:ext cx="7599793" cy="4498187"/>
           </a:xfrm>
           <a:prstGeom prst="rect">
             <a:avLst/>
@@ -7466,7 +7633,23 @@
             </a:r>
             <a:r>
               <a:rPr lang="en-US" dirty="0" smtClean="0"/>
-              <a:t> Add it in your </a:t>
+              <a:t> </a:t>
+            </a:r>
+            <a:r>
+              <a:rPr lang="en-US" dirty="0">
+                <a:solidFill>
+                  <a:srgbClr val="171B65"/>
+                </a:solidFill>
+              </a:rPr>
+              <a:t>Initialize</a:t>
+            </a:r>
+            <a:r>
+              <a:rPr lang="en-US" dirty="0" smtClean="0"/>
+              <a:t> </a:t>
+            </a:r>
+            <a:r>
+              <a:rPr lang="en-US" dirty="0" smtClean="0"/>
+              <a:t>it in </a:t>
             </a:r>
             <a:r>
               <a:rPr lang="en-US" dirty="0" err="1" smtClean="0"/>
@@ -7484,7 +7667,7 @@
         </p:nvSpPr>
         <p:spPr>
           <a:xfrm>
-            <a:off x="504258" y="1125267"/>
+            <a:off x="469786" y="1125267"/>
             <a:ext cx="3917483" cy="369332"/>
           </a:xfrm>
           <a:prstGeom prst="rect">
@@ -7535,7 +7718,7 @@
         </p:blipFill>
         <p:spPr>
           <a:xfrm>
-            <a:off x="5557699" y="6057901"/>
+            <a:off x="5557698" y="5872651"/>
             <a:ext cx="2429014" cy="545668"/>
           </a:xfrm>
           <a:prstGeom prst="rect">
@@ -7551,7 +7734,7 @@
           </p:cNvPicPr>
           <p:nvPr/>
         </p:nvPicPr>
-        <p:blipFill>
+        <p:blipFill rotWithShape="1">
           <a:blip r:embed="rId4">
             <a:extLst>
               <a:ext uri="{28A0092B-C50C-407E-A947-70E740481C1C}">
@@ -7559,14 +7742,13 @@
               </a:ext>
             </a:extLst>
           </a:blip>
-          <a:stretch>
-            <a:fillRect/>
-          </a:stretch>
+          <a:srcRect t="10497" b="4676"/>
+          <a:stretch/>
         </p:blipFill>
         <p:spPr>
           <a:xfrm>
-            <a:off x="504257" y="1494599"/>
-            <a:ext cx="7482455" cy="4563302"/>
+            <a:off x="469786" y="1494599"/>
+            <a:ext cx="7482455" cy="4197541"/>
           </a:xfrm>
           <a:prstGeom prst="rect">
             <a:avLst/>
@@ -7640,7 +7822,27 @@
             </a:r>
             <a:r>
               <a:rPr lang="en-US" dirty="0" smtClean="0"/>
-              <a:t> Add it in your </a:t>
+              <a:t> </a:t>
+            </a:r>
+            <a:r>
+              <a:rPr lang="en-US" dirty="0">
+                <a:solidFill>
+                  <a:srgbClr val="171B65"/>
+                </a:solidFill>
+              </a:rPr>
+              <a:t>Initialize</a:t>
+            </a:r>
+            <a:r>
+              <a:rPr lang="en-US" dirty="0" smtClean="0"/>
+              <a:t> </a:t>
+            </a:r>
+            <a:r>
+              <a:rPr lang="en-US" dirty="0" smtClean="0"/>
+              <a:t>it </a:t>
+            </a:r>
+            <a:r>
+              <a:rPr lang="en-US" dirty="0" smtClean="0"/>
+              <a:t>in </a:t>
             </a:r>
             <a:r>
               <a:rPr lang="en-US" dirty="0" err="1" smtClean="0"/>
@@ -7696,7 +7898,7 @@
           </p:cNvPicPr>
           <p:nvPr/>
         </p:nvPicPr>
-        <p:blipFill>
+        <p:blipFill rotWithShape="1">
           <a:blip r:embed="rId3">
             <a:extLst>
               <a:ext uri="{28A0092B-C50C-407E-A947-70E740481C1C}">
@@ -7704,14 +7906,13 @@
               </a:ext>
             </a:extLst>
           </a:blip>
-          <a:stretch>
-            <a:fillRect/>
-          </a:stretch>
+          <a:srcRect l="402" t="10312" r="-402" b="21899"/>
+          <a:stretch/>
         </p:blipFill>
         <p:spPr>
           <a:xfrm>
             <a:off x="469786" y="1498754"/>
-            <a:ext cx="7574077" cy="4530571"/>
+            <a:ext cx="8077818" cy="3644745"/>
           </a:xfrm>
           <a:prstGeom prst="rect">
             <a:avLst/>
@@ -7808,7 +8009,7 @@
         <p:spPr>
           <a:xfrm>
             <a:off x="469786" y="1129422"/>
-            <a:ext cx="1331262" cy="369332"/>
+            <a:ext cx="1542858" cy="369332"/>
           </a:xfrm>
           <a:prstGeom prst="rect">
             <a:avLst/>
@@ -7827,7 +8028,15 @@
                   <a:srgbClr val="000000"/>
                 </a:solidFill>
               </a:rPr>
-              <a:t>And it does</a:t>
+              <a:t>…And </a:t>
+            </a:r>
+            <a:r>
+              <a:rPr lang="en-US" dirty="0" smtClean="0">
+                <a:solidFill>
+                  <a:srgbClr val="000000"/>
+                </a:solidFill>
+              </a:rPr>
+              <a:t>it does</a:t>
             </a:r>
             <a:endParaRPr lang="en-US" dirty="0">
               <a:solidFill>
@@ -7845,7 +8054,7 @@
           </p:cNvPicPr>
           <p:nvPr/>
         </p:nvPicPr>
-        <p:blipFill>
+        <p:blipFill rotWithShape="1">
           <a:blip r:embed="rId3">
             <a:extLst>
               <a:ext uri="{28A0092B-C50C-407E-A947-70E740481C1C}">
@@ -7853,20 +8062,57 @@
               </a:ext>
             </a:extLst>
           </a:blip>
-          <a:stretch>
-            <a:fillRect/>
-          </a:stretch>
+          <a:srcRect l="-369"/>
+          <a:stretch/>
         </p:blipFill>
         <p:spPr>
           <a:xfrm>
-            <a:off x="169747" y="2613179"/>
-            <a:ext cx="8797959" cy="2015971"/>
+            <a:off x="469786" y="1498755"/>
+            <a:ext cx="8262734" cy="1861666"/>
           </a:xfrm>
           <a:prstGeom prst="rect">
             <a:avLst/>
           </a:prstGeom>
         </p:spPr>
       </p:pic>
+      <p:sp>
+        <p:nvSpPr>
+          <p:cNvPr id="2" name="TextBox 1"/>
+          <p:cNvSpPr txBox="1"/>
+          <p:nvPr/>
+        </p:nvSpPr>
+        <p:spPr>
+          <a:xfrm>
+            <a:off x="1645247" y="4657608"/>
+            <a:ext cx="6123408" cy="369332"/>
+          </a:xfrm>
+          <a:prstGeom prst="rect">
+            <a:avLst/>
+          </a:prstGeom>
+          <a:noFill/>
+        </p:spPr>
+        <p:txBody>
+          <a:bodyPr wrap="none" rtlCol="0">
+            <a:spAutoFit/>
+          </a:bodyPr>
+          <a:lstStyle/>
+          <a:p>
+            <a:r>
+              <a:rPr lang="en-US" dirty="0" smtClean="0">
+                <a:solidFill>
+                  <a:srgbClr val="000000"/>
+                </a:solidFill>
+              </a:rPr>
+              <a:t>Though, this is not the only way you can store your logs…</a:t>
+            </a:r>
+            <a:endParaRPr lang="en-US" dirty="0">
+              <a:solidFill>
+                <a:srgbClr val="000000"/>
+              </a:solidFill>
+            </a:endParaRPr>
+          </a:p>
+        </p:txBody>
+      </p:sp>
     </p:spTree>
     <p:extLst>
       <p:ext uri="{BB962C8B-B14F-4D97-AF65-F5344CB8AC3E}">
@@ -7906,6 +8152,376 @@
       </p:grpSpPr>
       <p:sp>
         <p:nvSpPr>
+          <p:cNvPr id="6" name="Заголовок 5"/>
+          <p:cNvSpPr>
+            <a:spLocks noGrp="1"/>
+          </p:cNvSpPr>
+          <p:nvPr>
+            <p:ph type="title"/>
+          </p:nvPr>
+        </p:nvSpPr>
+        <p:spPr>
+          <a:xfrm>
+            <a:off x="469786" y="295516"/>
+            <a:ext cx="8674214" cy="1018572"/>
+          </a:xfrm>
+        </p:spPr>
+        <p:txBody>
+          <a:bodyPr/>
+          <a:lstStyle/>
+          <a:p>
+            <a:r>
+              <a:rPr lang="en-US" dirty="0" smtClean="0">
+                <a:solidFill>
+                  <a:srgbClr val="171B65"/>
+                </a:solidFill>
+              </a:rPr>
+              <a:t>There are more</a:t>
+            </a:r>
+            <a:endParaRPr lang="uk-UA" dirty="0">
+              <a:solidFill>
+                <a:srgbClr val="171B65"/>
+              </a:solidFill>
+            </a:endParaRPr>
+          </a:p>
+        </p:txBody>
+      </p:sp>
+      <p:sp>
+        <p:nvSpPr>
+          <p:cNvPr id="5" name="TextBox 4"/>
+          <p:cNvSpPr txBox="1"/>
+          <p:nvPr/>
+        </p:nvSpPr>
+        <p:spPr>
+          <a:xfrm>
+            <a:off x="469786" y="1103574"/>
+            <a:ext cx="5589094" cy="646331"/>
+          </a:xfrm>
+          <a:prstGeom prst="rect">
+            <a:avLst/>
+          </a:prstGeom>
+          <a:noFill/>
+        </p:spPr>
+        <p:txBody>
+          <a:bodyPr wrap="none" rtlCol="0">
+            <a:spAutoFit/>
+          </a:bodyPr>
+          <a:lstStyle/>
+          <a:p>
+            <a:r>
+              <a:rPr lang="en-US" dirty="0" smtClean="0">
+                <a:solidFill>
+                  <a:srgbClr val="000000"/>
+                </a:solidFill>
+              </a:rPr>
+              <a:t>MSSQL:</a:t>
+            </a:r>
+          </a:p>
+          <a:p>
+            <a:r>
+              <a:rPr lang="en-US" dirty="0" smtClean="0">
+                <a:solidFill>
+                  <a:srgbClr val="000000"/>
+                </a:solidFill>
+              </a:rPr>
+              <a:t>Download </a:t>
+            </a:r>
+            <a:r>
+              <a:rPr lang="en-US" dirty="0" err="1" smtClean="0">
+                <a:solidFill>
+                  <a:srgbClr val="000000"/>
+                </a:solidFill>
+              </a:rPr>
+              <a:t>Serilog.Sinks.MSSqlServer</a:t>
+            </a:r>
+            <a:r>
+              <a:rPr lang="en-US" dirty="0" smtClean="0">
+                <a:solidFill>
+                  <a:srgbClr val="000000"/>
+                </a:solidFill>
+              </a:rPr>
+              <a:t> </a:t>
+            </a:r>
+            <a:r>
+              <a:rPr lang="en-US" dirty="0" err="1">
+                <a:solidFill>
+                  <a:srgbClr val="000000"/>
+                </a:solidFill>
+              </a:rPr>
+              <a:t>N</a:t>
+            </a:r>
+            <a:r>
+              <a:rPr lang="en-US" dirty="0" err="1" smtClean="0">
+                <a:solidFill>
+                  <a:srgbClr val="000000"/>
+                </a:solidFill>
+              </a:rPr>
+              <a:t>uGet</a:t>
+            </a:r>
+            <a:r>
+              <a:rPr lang="en-US" dirty="0" smtClean="0">
+                <a:solidFill>
+                  <a:srgbClr val="000000"/>
+                </a:solidFill>
+              </a:rPr>
+              <a:t> package </a:t>
+            </a:r>
+            <a:endParaRPr lang="en-US" dirty="0">
+              <a:solidFill>
+                <a:srgbClr val="000000"/>
+              </a:solidFill>
+            </a:endParaRPr>
+          </a:p>
+        </p:txBody>
+      </p:sp>
+      <p:pic>
+        <p:nvPicPr>
+          <p:cNvPr id="2" name="Рисунок 1"/>
+          <p:cNvPicPr>
+            <a:picLocks noChangeAspect="1"/>
+          </p:cNvPicPr>
+          <p:nvPr/>
+        </p:nvPicPr>
+        <p:blipFill rotWithShape="1">
+          <a:blip r:embed="rId3">
+            <a:extLst>
+              <a:ext uri="{28A0092B-C50C-407E-A947-70E740481C1C}">
+                <a14:useLocalDpi xmlns:a14="http://schemas.microsoft.com/office/drawing/2010/main" val="0"/>
+              </a:ext>
+            </a:extLst>
+          </a:blip>
+          <a:srcRect l="1710" t="26760" r="3930" b="10970"/>
+          <a:stretch/>
+        </p:blipFill>
+        <p:spPr>
+          <a:xfrm>
+            <a:off x="469786" y="1775753"/>
+            <a:ext cx="6454140" cy="1257594"/>
+          </a:xfrm>
+          <a:prstGeom prst="rect">
+            <a:avLst/>
+          </a:prstGeom>
+        </p:spPr>
+      </p:pic>
+      <p:sp>
+        <p:nvSpPr>
+          <p:cNvPr id="7" name="TextBox 6"/>
+          <p:cNvSpPr txBox="1"/>
+          <p:nvPr/>
+        </p:nvSpPr>
+        <p:spPr>
+          <a:xfrm>
+            <a:off x="469786" y="3033347"/>
+            <a:ext cx="4848763" cy="646331"/>
+          </a:xfrm>
+          <a:prstGeom prst="rect">
+            <a:avLst/>
+          </a:prstGeom>
+          <a:noFill/>
+        </p:spPr>
+        <p:txBody>
+          <a:bodyPr wrap="none" rtlCol="0">
+            <a:spAutoFit/>
+          </a:bodyPr>
+          <a:lstStyle/>
+          <a:p>
+            <a:r>
+              <a:rPr lang="en-US" dirty="0" smtClean="0">
+                <a:solidFill>
+                  <a:srgbClr val="000000"/>
+                </a:solidFill>
+              </a:rPr>
+              <a:t>Email:</a:t>
+            </a:r>
+          </a:p>
+          <a:p>
+            <a:r>
+              <a:rPr lang="en-US" dirty="0" smtClean="0">
+                <a:solidFill>
+                  <a:srgbClr val="000000"/>
+                </a:solidFill>
+              </a:rPr>
+              <a:t>Download </a:t>
+            </a:r>
+            <a:r>
+              <a:rPr lang="en-US" dirty="0" err="1" smtClean="0">
+                <a:solidFill>
+                  <a:srgbClr val="000000"/>
+                </a:solidFill>
+              </a:rPr>
+              <a:t>Serilog.Sinks.Email</a:t>
+            </a:r>
+            <a:r>
+              <a:rPr lang="en-US" dirty="0" smtClean="0">
+                <a:solidFill>
+                  <a:srgbClr val="000000"/>
+                </a:solidFill>
+              </a:rPr>
+              <a:t> </a:t>
+            </a:r>
+            <a:r>
+              <a:rPr lang="en-US" dirty="0" err="1" smtClean="0">
+                <a:solidFill>
+                  <a:srgbClr val="000000"/>
+                </a:solidFill>
+              </a:rPr>
+              <a:t>NuGet</a:t>
+            </a:r>
+            <a:r>
+              <a:rPr lang="en-US" dirty="0" smtClean="0">
+                <a:solidFill>
+                  <a:srgbClr val="000000"/>
+                </a:solidFill>
+              </a:rPr>
+              <a:t> package </a:t>
+            </a:r>
+            <a:endParaRPr lang="en-US" dirty="0">
+              <a:solidFill>
+                <a:srgbClr val="000000"/>
+              </a:solidFill>
+            </a:endParaRPr>
+          </a:p>
+        </p:txBody>
+      </p:sp>
+      <p:pic>
+        <p:nvPicPr>
+          <p:cNvPr id="4" name="Рисунок 3"/>
+          <p:cNvPicPr>
+            <a:picLocks noChangeAspect="1"/>
+          </p:cNvPicPr>
+          <p:nvPr/>
+        </p:nvPicPr>
+        <p:blipFill>
+          <a:blip r:embed="rId4">
+            <a:extLst>
+              <a:ext uri="{28A0092B-C50C-407E-A947-70E740481C1C}">
+                <a14:useLocalDpi xmlns:a14="http://schemas.microsoft.com/office/drawing/2010/main" val="0"/>
+              </a:ext>
+            </a:extLst>
+          </a:blip>
+          <a:stretch>
+            <a:fillRect/>
+          </a:stretch>
+        </p:blipFill>
+        <p:spPr>
+          <a:xfrm>
+            <a:off x="469786" y="3705526"/>
+            <a:ext cx="3088754" cy="1181265"/>
+          </a:xfrm>
+          <a:prstGeom prst="rect">
+            <a:avLst/>
+          </a:prstGeom>
+        </p:spPr>
+      </p:pic>
+      <p:sp>
+        <p:nvSpPr>
+          <p:cNvPr id="8" name="TextBox 7"/>
+          <p:cNvSpPr txBox="1"/>
+          <p:nvPr/>
+        </p:nvSpPr>
+        <p:spPr>
+          <a:xfrm>
+            <a:off x="469786" y="4886791"/>
+            <a:ext cx="7650480" cy="646331"/>
+          </a:xfrm>
+          <a:prstGeom prst="rect">
+            <a:avLst/>
+          </a:prstGeom>
+          <a:noFill/>
+        </p:spPr>
+        <p:txBody>
+          <a:bodyPr wrap="square" rtlCol="0">
+            <a:spAutoFit/>
+          </a:bodyPr>
+          <a:lstStyle/>
+          <a:p>
+            <a:r>
+              <a:rPr lang="en-US" dirty="0" smtClean="0">
+                <a:solidFill>
+                  <a:srgbClr val="000000"/>
+                </a:solidFill>
+              </a:rPr>
+              <a:t>And far more, just open your </a:t>
+            </a:r>
+            <a:r>
+              <a:rPr lang="en-US" dirty="0" err="1" smtClean="0">
+                <a:solidFill>
+                  <a:srgbClr val="000000"/>
+                </a:solidFill>
+              </a:rPr>
+              <a:t>NuGet</a:t>
+            </a:r>
+            <a:r>
+              <a:rPr lang="en-US" dirty="0" smtClean="0">
+                <a:solidFill>
+                  <a:srgbClr val="000000"/>
+                </a:solidFill>
+              </a:rPr>
+              <a:t> manager, and type </a:t>
+            </a:r>
+            <a:r>
+              <a:rPr lang="en-US" dirty="0" err="1" smtClean="0">
+                <a:solidFill>
+                  <a:srgbClr val="000000"/>
+                </a:solidFill>
+              </a:rPr>
+              <a:t>Serilog.Sinks</a:t>
+            </a:r>
+            <a:r>
+              <a:rPr lang="en-US" dirty="0" smtClean="0">
+                <a:solidFill>
+                  <a:srgbClr val="000000"/>
+                </a:solidFill>
+              </a:rPr>
+              <a:t> to find option you need.</a:t>
+            </a:r>
+            <a:endParaRPr lang="en-US" dirty="0">
+              <a:solidFill>
+                <a:srgbClr val="000000"/>
+              </a:solidFill>
+            </a:endParaRPr>
+          </a:p>
+        </p:txBody>
+      </p:sp>
+    </p:spTree>
+    <p:extLst>
+      <p:ext uri="{BB962C8B-B14F-4D97-AF65-F5344CB8AC3E}">
+        <p14:creationId xmlns:p14="http://schemas.microsoft.com/office/powerpoint/2010/main" val="2995513576"/>
+      </p:ext>
+    </p:extLst>
+  </p:cSld>
+  <p:clrMapOvr>
+    <a:masterClrMapping/>
+  </p:clrMapOvr>
+  <p:timing>
+    <p:tnLst>
+      <p:par>
+        <p:cTn id="1" dur="indefinite" restart="never" nodeType="tmRoot"/>
+      </p:par>
+    </p:tnLst>
+  </p:timing>
+</p:sld>
+</file>
+
+<file path=ppt/slides/slide19.xml><?xml version="1.0" encoding="utf-8"?>
+<p:sld xmlns:a="http://schemas.openxmlformats.org/drawingml/2006/main" xmlns:r="http://schemas.openxmlformats.org/officeDocument/2006/relationships" xmlns:p="http://schemas.openxmlformats.org/presentationml/2006/main">
+  <p:cSld>
+    <p:spTree>
+      <p:nvGrpSpPr>
+        <p:cNvPr id="1" name=""/>
+        <p:cNvGrpSpPr/>
+        <p:nvPr/>
+      </p:nvGrpSpPr>
+      <p:grpSpPr>
+        <a:xfrm>
+          <a:off x="0" y="0"/>
+          <a:ext cx="0" cy="0"/>
+          <a:chOff x="0" y="0"/>
+          <a:chExt cx="0" cy="0"/>
+        </a:xfrm>
+      </p:grpSpPr>
+      <p:sp>
+        <p:nvSpPr>
           <p:cNvPr id="2" name="Заголовок 1"/>
           <p:cNvSpPr>
             <a:spLocks noGrp="1"/>
@@ -7928,11 +8544,7 @@
           <a:p>
             <a:r>
               <a:rPr lang="en-US" sz="4900" dirty="0" smtClean="0"/>
-              <a:t>That’s about it for now</a:t>
-            </a:r>
-            <a:r>
-              <a:rPr lang="en-US" sz="4900" dirty="0" smtClean="0"/>
-              <a:t>!</a:t>
+              <a:t>That’s about it for now!</a:t>
             </a:r>
             <a:br>
               <a:rPr lang="en-US" sz="4900" dirty="0" smtClean="0"/>
@@ -9332,11 +9944,6 @@
               </a:rPr>
               <a:t> Error logging library with various features </a:t>
             </a:r>
-            <a:endParaRPr lang="en-US" dirty="0" smtClean="0">
-              <a:solidFill>
-                <a:srgbClr val="000000"/>
-              </a:solidFill>
-            </a:endParaRPr>
           </a:p>
         </p:txBody>
       </p:sp>

</xml_diff>